<commit_message>
adding references for web/books;
</commit_message>
<xml_diff>
--- a/Presentation/Better Business Logic with Typescript.pptx
+++ b/Presentation/Better Business Logic with Typescript.pptx
@@ -13,6 +13,9 @@
     <p:sldId id="261" r:id="rId7"/>
     <p:sldId id="262" r:id="rId8"/>
     <p:sldId id="263" r:id="rId9"/>
+    <p:sldId id="265" r:id="rId10"/>
+    <p:sldId id="264" r:id="rId11"/>
+    <p:sldId id="266" r:id="rId12"/>
   </p:sldIdLst>
   <p:sldSz cx="12192000" cy="6858000"/>
   <p:notesSz cx="6858000" cy="9144000"/>
@@ -1507,10 +1510,9 @@
           </a:lstStyle>
           <a:p>
             <a:r>
-              <a:rPr lang="en-US"/>
+              <a:rPr lang="en-US" dirty="0"/>
               <a:t>Click icon to add picture</a:t>
             </a:r>
-            <a:endParaRPr lang="en-US" dirty="0"/>
           </a:p>
         </p:txBody>
       </p:sp>
@@ -5328,10 +5330,9 @@
           </a:lstStyle>
           <a:p>
             <a:r>
-              <a:rPr lang="en-US"/>
+              <a:rPr lang="en-US" dirty="0"/>
               <a:t>Click icon to add picture</a:t>
             </a:r>
-            <a:endParaRPr lang="en-US" dirty="0"/>
           </a:p>
         </p:txBody>
       </p:sp>
@@ -5545,10 +5546,9 @@
           </a:lstStyle>
           <a:p>
             <a:r>
-              <a:rPr lang="en-US"/>
+              <a:rPr lang="en-US" dirty="0"/>
               <a:t>Click icon to add picture</a:t>
             </a:r>
-            <a:endParaRPr lang="en-US" dirty="0"/>
           </a:p>
         </p:txBody>
       </p:sp>
@@ -5762,10 +5762,9 @@
           </a:lstStyle>
           <a:p>
             <a:r>
-              <a:rPr lang="en-US"/>
+              <a:rPr lang="en-US" dirty="0"/>
               <a:t>Click icon to add picture</a:t>
             </a:r>
-            <a:endParaRPr lang="en-US" dirty="0"/>
           </a:p>
         </p:txBody>
       </p:sp>
@@ -10874,10 +10873,9 @@
           </a:lstStyle>
           <a:p>
             <a:r>
-              <a:rPr lang="en-US"/>
+              <a:rPr lang="en-US" dirty="0"/>
               <a:t>Click icon to add picture</a:t>
             </a:r>
-            <a:endParaRPr lang="en-US" dirty="0"/>
           </a:p>
         </p:txBody>
       </p:sp>
@@ -12507,6 +12505,406 @@
 </p:sld>
 </file>
 
+<file path=ppt/slides/slide10.xml><?xml version="1.0" encoding="utf-8"?>
+<p:sld xmlns:a="http://schemas.openxmlformats.org/drawingml/2006/main" xmlns:r="http://schemas.openxmlformats.org/officeDocument/2006/relationships" xmlns:p="http://schemas.openxmlformats.org/presentationml/2006/main">
+  <p:cSld>
+    <p:spTree>
+      <p:nvGrpSpPr>
+        <p:cNvPr id="1" name=""/>
+        <p:cNvGrpSpPr/>
+        <p:nvPr/>
+      </p:nvGrpSpPr>
+      <p:grpSpPr>
+        <a:xfrm>
+          <a:off x="0" y="0"/>
+          <a:ext cx="0" cy="0"/>
+          <a:chOff x="0" y="0"/>
+          <a:chExt cx="0" cy="0"/>
+        </a:xfrm>
+      </p:grpSpPr>
+      <p:sp>
+        <p:nvSpPr>
+          <p:cNvPr id="2" name="Title 1">
+            <a:extLst>
+              <a:ext uri="{FF2B5EF4-FFF2-40B4-BE49-F238E27FC236}">
+                <a16:creationId xmlns:a16="http://schemas.microsoft.com/office/drawing/2014/main" id="{7D8AF8FB-793E-41BD-8CC5-A923B5A8209E}"/>
+              </a:ext>
+            </a:extLst>
+          </p:cNvPr>
+          <p:cNvSpPr>
+            <a:spLocks noGrp="1"/>
+          </p:cNvSpPr>
+          <p:nvPr>
+            <p:ph type="title"/>
+          </p:nvPr>
+        </p:nvSpPr>
+        <p:spPr/>
+        <p:txBody>
+          <a:bodyPr/>
+          <a:lstStyle/>
+          <a:p>
+            <a:r>
+              <a:rPr lang="en-US" dirty="0"/>
+              <a:t>Web References</a:t>
+            </a:r>
+          </a:p>
+        </p:txBody>
+      </p:sp>
+      <p:sp>
+        <p:nvSpPr>
+          <p:cNvPr id="3" name="Content Placeholder 2">
+            <a:extLst>
+              <a:ext uri="{FF2B5EF4-FFF2-40B4-BE49-F238E27FC236}">
+                <a16:creationId xmlns:a16="http://schemas.microsoft.com/office/drawing/2014/main" id="{3975127B-114D-4B36-BA13-4EB6781A2CEB}"/>
+              </a:ext>
+            </a:extLst>
+          </p:cNvPr>
+          <p:cNvSpPr>
+            <a:spLocks noGrp="1"/>
+          </p:cNvSpPr>
+          <p:nvPr>
+            <p:ph idx="1"/>
+          </p:nvPr>
+        </p:nvSpPr>
+        <p:spPr/>
+        <p:txBody>
+          <a:bodyPr>
+            <a:normAutofit/>
+          </a:bodyPr>
+          <a:lstStyle/>
+          <a:p>
+            <a:r>
+              <a:rPr lang="en-US" dirty="0" err="1">
+                <a:hlinkClick r:id="rId2"/>
+              </a:rPr>
+              <a:t>GoF</a:t>
+            </a:r>
+            <a:r>
+              <a:rPr lang="en-US" dirty="0">
+                <a:hlinkClick r:id="rId2"/>
+              </a:rPr>
+              <a:t> Design patterns in .NET/C#</a:t>
+            </a:r>
+            <a:endParaRPr lang="en-US" dirty="0"/>
+          </a:p>
+          <a:p>
+            <a:r>
+              <a:rPr lang="en-US" dirty="0">
+                <a:hlinkClick r:id="rId3"/>
+              </a:rPr>
+              <a:t>Design Patterns General</a:t>
+            </a:r>
+            <a:endParaRPr lang="en-US" dirty="0"/>
+          </a:p>
+          <a:p>
+            <a:pPr lvl="1"/>
+            <a:r>
+              <a:rPr lang="en-US" dirty="0">
+                <a:hlinkClick r:id="rId3"/>
+              </a:rPr>
+              <a:t>Creational</a:t>
+            </a:r>
+            <a:endParaRPr lang="en-US" dirty="0"/>
+          </a:p>
+          <a:p>
+            <a:pPr lvl="1"/>
+            <a:r>
+              <a:rPr lang="en-US" dirty="0">
+                <a:hlinkClick r:id="rId4"/>
+              </a:rPr>
+              <a:t>Structural</a:t>
+            </a:r>
+            <a:endParaRPr lang="en-US" dirty="0"/>
+          </a:p>
+          <a:p>
+            <a:pPr lvl="1"/>
+            <a:r>
+              <a:rPr lang="en-US" dirty="0">
+                <a:hlinkClick r:id="rId5"/>
+              </a:rPr>
+              <a:t>Behavioral</a:t>
+            </a:r>
+            <a:endParaRPr lang="en-US" dirty="0"/>
+          </a:p>
+          <a:p>
+            <a:r>
+              <a:rPr lang="en-US" dirty="0"/>
+              <a:t>Principles:</a:t>
+            </a:r>
+          </a:p>
+          <a:p>
+            <a:pPr lvl="1"/>
+            <a:r>
+              <a:rPr lang="en-US" dirty="0">
+                <a:hlinkClick r:id="rId6"/>
+              </a:rPr>
+              <a:t>Single Responsibility</a:t>
+            </a:r>
+            <a:endParaRPr lang="en-US" dirty="0"/>
+          </a:p>
+          <a:p>
+            <a:pPr lvl="1"/>
+            <a:r>
+              <a:rPr lang="en-US" dirty="0">
+                <a:hlinkClick r:id="rId7"/>
+              </a:rPr>
+              <a:t>Separation of Concerns</a:t>
+            </a:r>
+            <a:endParaRPr lang="en-US" dirty="0"/>
+          </a:p>
+          <a:p>
+            <a:pPr lvl="1"/>
+            <a:r>
+              <a:rPr lang="en-US" dirty="0">
+                <a:hlinkClick r:id="rId8"/>
+              </a:rPr>
+              <a:t>S.O.L.I.D Principles</a:t>
+            </a:r>
+            <a:endParaRPr lang="en-US" dirty="0"/>
+          </a:p>
+          <a:p>
+            <a:endParaRPr lang="en-US" dirty="0"/>
+          </a:p>
+        </p:txBody>
+      </p:sp>
+    </p:spTree>
+    <p:extLst>
+      <p:ext uri="{BB962C8B-B14F-4D97-AF65-F5344CB8AC3E}">
+        <p14:creationId xmlns:p14="http://schemas.microsoft.com/office/powerpoint/2010/main" val="1961233773"/>
+      </p:ext>
+    </p:extLst>
+  </p:cSld>
+  <p:clrMapOvr>
+    <a:masterClrMapping/>
+  </p:clrMapOvr>
+</p:sld>
+</file>
+
+<file path=ppt/slides/slide11.xml><?xml version="1.0" encoding="utf-8"?>
+<p:sld xmlns:a="http://schemas.openxmlformats.org/drawingml/2006/main" xmlns:r="http://schemas.openxmlformats.org/officeDocument/2006/relationships" xmlns:p="http://schemas.openxmlformats.org/presentationml/2006/main">
+  <p:cSld>
+    <p:spTree>
+      <p:nvGrpSpPr>
+        <p:cNvPr id="1" name=""/>
+        <p:cNvGrpSpPr/>
+        <p:nvPr/>
+      </p:nvGrpSpPr>
+      <p:grpSpPr>
+        <a:xfrm>
+          <a:off x="0" y="0"/>
+          <a:ext cx="0" cy="0"/>
+          <a:chOff x="0" y="0"/>
+          <a:chExt cx="0" cy="0"/>
+        </a:xfrm>
+      </p:grpSpPr>
+      <p:sp>
+        <p:nvSpPr>
+          <p:cNvPr id="2" name="Title 1">
+            <a:extLst>
+              <a:ext uri="{FF2B5EF4-FFF2-40B4-BE49-F238E27FC236}">
+                <a16:creationId xmlns:a16="http://schemas.microsoft.com/office/drawing/2014/main" id="{7D8AF8FB-793E-41BD-8CC5-A923B5A8209E}"/>
+              </a:ext>
+            </a:extLst>
+          </p:cNvPr>
+          <p:cNvSpPr>
+            <a:spLocks noGrp="1"/>
+          </p:cNvSpPr>
+          <p:nvPr>
+            <p:ph type="title"/>
+          </p:nvPr>
+        </p:nvSpPr>
+        <p:spPr/>
+        <p:txBody>
+          <a:bodyPr/>
+          <a:lstStyle/>
+          <a:p>
+            <a:r>
+              <a:rPr lang="en-US" dirty="0"/>
+              <a:t>Book References</a:t>
+            </a:r>
+          </a:p>
+        </p:txBody>
+      </p:sp>
+      <p:sp>
+        <p:nvSpPr>
+          <p:cNvPr id="3" name="Content Placeholder 2">
+            <a:extLst>
+              <a:ext uri="{FF2B5EF4-FFF2-40B4-BE49-F238E27FC236}">
+                <a16:creationId xmlns:a16="http://schemas.microsoft.com/office/drawing/2014/main" id="{3975127B-114D-4B36-BA13-4EB6781A2CEB}"/>
+              </a:ext>
+            </a:extLst>
+          </p:cNvPr>
+          <p:cNvSpPr>
+            <a:spLocks noGrp="1"/>
+          </p:cNvSpPr>
+          <p:nvPr>
+            <p:ph idx="1"/>
+          </p:nvPr>
+        </p:nvSpPr>
+        <p:spPr/>
+        <p:txBody>
+          <a:bodyPr>
+            <a:normAutofit fontScale="92500" lnSpcReduction="20000"/>
+          </a:bodyPr>
+          <a:lstStyle/>
+          <a:p>
+            <a:r>
+              <a:rPr lang="en-US" dirty="0">
+                <a:hlinkClick r:id="rId2"/>
+              </a:rPr>
+              <a:t>Design Patterns : Elements of Reusable Object-Oriented Software</a:t>
+            </a:r>
+            <a:endParaRPr lang="en-US" dirty="0"/>
+          </a:p>
+          <a:p>
+            <a:pPr lvl="1"/>
+            <a:r>
+              <a:rPr lang="en-US" b="1" dirty="0"/>
+              <a:t>ISBN-13:</a:t>
+            </a:r>
+            <a:r>
+              <a:rPr lang="en-US" dirty="0"/>
+              <a:t> 978-0201633610, </a:t>
+            </a:r>
+            <a:r>
+              <a:rPr lang="en-US" b="1" dirty="0"/>
+              <a:t>ISBN-10:</a:t>
+            </a:r>
+            <a:r>
+              <a:rPr lang="en-US" dirty="0"/>
+              <a:t> 0201633612</a:t>
+            </a:r>
+          </a:p>
+          <a:p>
+            <a:r>
+              <a:rPr lang="en-US" dirty="0">
+                <a:hlinkClick r:id="rId3"/>
+              </a:rPr>
+              <a:t>Head First Design Patterns</a:t>
+            </a:r>
+            <a:endParaRPr lang="en-US" dirty="0"/>
+          </a:p>
+          <a:p>
+            <a:pPr lvl="1"/>
+            <a:r>
+              <a:rPr lang="en-US" b="1" dirty="0"/>
+              <a:t>ISBN-13:</a:t>
+            </a:r>
+            <a:r>
+              <a:rPr lang="en-US" dirty="0"/>
+              <a:t> 978-0596007126, </a:t>
+            </a:r>
+            <a:r>
+              <a:rPr lang="en-US" b="1" dirty="0"/>
+              <a:t>ISBN-10:</a:t>
+            </a:r>
+            <a:r>
+              <a:rPr lang="en-US" dirty="0"/>
+              <a:t> 0596007124</a:t>
+            </a:r>
+          </a:p>
+          <a:p>
+            <a:r>
+              <a:rPr lang="en-US" dirty="0">
+                <a:hlinkClick r:id="rId4"/>
+              </a:rPr>
+              <a:t>Clean Code</a:t>
+            </a:r>
+            <a:endParaRPr lang="en-US" dirty="0"/>
+          </a:p>
+          <a:p>
+            <a:pPr lvl="1"/>
+            <a:r>
+              <a:rPr lang="en-US" b="1" dirty="0"/>
+              <a:t>ISBN-13:</a:t>
+            </a:r>
+            <a:r>
+              <a:rPr lang="en-US" dirty="0"/>
+              <a:t> 978-0132350884, </a:t>
+            </a:r>
+            <a:r>
+              <a:rPr lang="en-US" b="1" dirty="0"/>
+              <a:t>ISBN-10:</a:t>
+            </a:r>
+            <a:r>
+              <a:rPr lang="en-US" dirty="0"/>
+              <a:t> 0132350882</a:t>
+            </a:r>
+          </a:p>
+          <a:p>
+            <a:r>
+              <a:rPr lang="en-US" dirty="0">
+                <a:hlinkClick r:id="rId5"/>
+              </a:rPr>
+              <a:t>The Pragmatic Programmer</a:t>
+            </a:r>
+            <a:endParaRPr lang="en-US" dirty="0"/>
+          </a:p>
+          <a:p>
+            <a:pPr lvl="1"/>
+            <a:r>
+              <a:rPr lang="en-US" b="1" dirty="0"/>
+              <a:t>ISBN-13:</a:t>
+            </a:r>
+            <a:r>
+              <a:rPr lang="en-US" dirty="0"/>
+              <a:t> 978-0201616224, </a:t>
+            </a:r>
+            <a:r>
+              <a:rPr lang="en-US" b="1" dirty="0"/>
+              <a:t>ISBN-10:</a:t>
+            </a:r>
+            <a:r>
+              <a:rPr lang="en-US" dirty="0"/>
+              <a:t> 020161622X</a:t>
+            </a:r>
+          </a:p>
+          <a:p>
+            <a:r>
+              <a:rPr lang="en-US" dirty="0">
+                <a:hlinkClick r:id="rId6"/>
+              </a:rPr>
+              <a:t>Patterns of Enterprise Application Architecture</a:t>
+            </a:r>
+            <a:endParaRPr lang="en-US" dirty="0"/>
+          </a:p>
+          <a:p>
+            <a:pPr lvl="1"/>
+            <a:r>
+              <a:rPr lang="en-US" b="1" dirty="0"/>
+              <a:t>ISBN-13:</a:t>
+            </a:r>
+            <a:r>
+              <a:rPr lang="en-US" dirty="0"/>
+              <a:t> 978-0321127426, </a:t>
+            </a:r>
+            <a:r>
+              <a:rPr lang="en-US" b="1" dirty="0"/>
+              <a:t>ISBN-10:</a:t>
+            </a:r>
+            <a:r>
+              <a:rPr lang="en-US" dirty="0"/>
+              <a:t> 0321127420</a:t>
+            </a:r>
+          </a:p>
+          <a:p>
+            <a:endParaRPr lang="en-US" dirty="0"/>
+          </a:p>
+        </p:txBody>
+      </p:sp>
+    </p:spTree>
+    <p:extLst>
+      <p:ext uri="{BB962C8B-B14F-4D97-AF65-F5344CB8AC3E}">
+        <p14:creationId xmlns:p14="http://schemas.microsoft.com/office/powerpoint/2010/main" val="214986796"/>
+      </p:ext>
+    </p:extLst>
+  </p:cSld>
+  <p:clrMapOvr>
+    <a:masterClrMapping/>
+  </p:clrMapOvr>
+</p:sld>
+</file>
+
 <file path=ppt/slides/slide2.xml><?xml version="1.0" encoding="utf-8"?>
 <p:sld xmlns:a="http://schemas.openxmlformats.org/drawingml/2006/main" xmlns:r="http://schemas.openxmlformats.org/officeDocument/2006/relationships" xmlns:p="http://schemas.openxmlformats.org/presentationml/2006/main">
   <p:cSld>
@@ -13200,7 +13598,7 @@
             </a:r>
             <a:r>
               <a:rPr lang="en-US" dirty="0"/>
-              <a:t> </a:t>
+              <a:t> in </a:t>
             </a:r>
             <a:r>
               <a:rPr lang="en-US" dirty="0">
@@ -13362,36 +13760,15 @@
               <a:t>: </a:t>
             </a:r>
             <a:r>
-              <a:rPr lang="en-US" dirty="0" err="1">
+              <a:rPr lang="en-US" dirty="0">
                 <a:hlinkClick r:id="rId3"/>
               </a:rPr>
               <a:t>ngOnChanges</a:t>
             </a:r>
             <a:r>
               <a:rPr lang="en-US" dirty="0"/>
-              <a:t>, </a:t>
-            </a:r>
-            <a:r>
-              <a:rPr lang="en-US" dirty="0" err="1"/>
-              <a:t>ngOnInit</a:t>
-            </a:r>
-            <a:r>
-              <a:rPr lang="en-US" dirty="0"/>
-              <a:t>, </a:t>
-            </a:r>
-            <a:r>
-              <a:rPr lang="en-US" dirty="0" err="1"/>
-              <a:t>ngDoCheck</a:t>
-            </a:r>
-            <a:r>
-              <a:rPr lang="en-US" dirty="0"/>
-              <a:t>, and </a:t>
-            </a:r>
-            <a:r>
-              <a:rPr lang="en-US" dirty="0" err="1"/>
-              <a:t>ngOnDestroy</a:t>
-            </a:r>
-            <a:endParaRPr lang="en-US" dirty="0"/>
+              <a:t>, ngOnInit, ngDoCheck, and ngOnDestroy</a:t>
+            </a:r>
           </a:p>
           <a:p>
             <a:r>
@@ -13458,15 +13835,7 @@
           <a:p>
             <a:r>
               <a:rPr lang="en-US" dirty="0"/>
-              <a:t>Dependency Injection (Inversion of Control – </a:t>
-            </a:r>
-            <a:r>
-              <a:rPr lang="en-US" dirty="0" err="1"/>
-              <a:t>IoC</a:t>
-            </a:r>
-            <a:r>
-              <a:rPr lang="en-US" dirty="0"/>
-              <a:t>)</a:t>
+              <a:t>Dependency Injection (Inversion of Control – IoC)</a:t>
             </a:r>
           </a:p>
           <a:p>
@@ -13482,6 +13851,102 @@
     <p:extLst>
       <p:ext uri="{BB962C8B-B14F-4D97-AF65-F5344CB8AC3E}">
         <p14:creationId xmlns:p14="http://schemas.microsoft.com/office/powerpoint/2010/main" val="505401962"/>
+      </p:ext>
+    </p:extLst>
+  </p:cSld>
+  <p:clrMapOvr>
+    <a:masterClrMapping/>
+  </p:clrMapOvr>
+</p:sld>
+</file>
+
+<file path=ppt/slides/slide9.xml><?xml version="1.0" encoding="utf-8"?>
+<p:sld xmlns:a="http://schemas.openxmlformats.org/drawingml/2006/main" xmlns:r="http://schemas.openxmlformats.org/officeDocument/2006/relationships" xmlns:p="http://schemas.openxmlformats.org/presentationml/2006/main">
+  <p:cSld>
+    <p:spTree>
+      <p:nvGrpSpPr>
+        <p:cNvPr id="1" name=""/>
+        <p:cNvGrpSpPr/>
+        <p:nvPr/>
+      </p:nvGrpSpPr>
+      <p:grpSpPr>
+        <a:xfrm>
+          <a:off x="0" y="0"/>
+          <a:ext cx="0" cy="0"/>
+          <a:chOff x="0" y="0"/>
+          <a:chExt cx="0" cy="0"/>
+        </a:xfrm>
+      </p:grpSpPr>
+      <p:sp>
+        <p:nvSpPr>
+          <p:cNvPr id="2" name="Title 1">
+            <a:extLst>
+              <a:ext uri="{FF2B5EF4-FFF2-40B4-BE49-F238E27FC236}">
+                <a16:creationId xmlns:a16="http://schemas.microsoft.com/office/drawing/2014/main" id="{4D26C1FD-D049-416D-9C47-E3F3500B7FBE}"/>
+              </a:ext>
+            </a:extLst>
+          </p:cNvPr>
+          <p:cNvSpPr>
+            <a:spLocks noGrp="1"/>
+          </p:cNvSpPr>
+          <p:nvPr>
+            <p:ph type="title"/>
+          </p:nvPr>
+        </p:nvSpPr>
+        <p:spPr/>
+        <p:txBody>
+          <a:bodyPr/>
+          <a:lstStyle/>
+          <a:p>
+            <a:r>
+              <a:rPr lang="en-US" dirty="0"/>
+              <a:t>Miscellaneous</a:t>
+            </a:r>
+          </a:p>
+        </p:txBody>
+      </p:sp>
+      <p:sp>
+        <p:nvSpPr>
+          <p:cNvPr id="3" name="Content Placeholder 2">
+            <a:extLst>
+              <a:ext uri="{FF2B5EF4-FFF2-40B4-BE49-F238E27FC236}">
+                <a16:creationId xmlns:a16="http://schemas.microsoft.com/office/drawing/2014/main" id="{E6782E6C-3EEC-49F3-B248-5C89306E3EEB}"/>
+              </a:ext>
+            </a:extLst>
+          </p:cNvPr>
+          <p:cNvSpPr>
+            <a:spLocks noGrp="1"/>
+          </p:cNvSpPr>
+          <p:nvPr>
+            <p:ph idx="1"/>
+          </p:nvPr>
+        </p:nvSpPr>
+        <p:spPr/>
+        <p:txBody>
+          <a:bodyPr/>
+          <a:lstStyle/>
+          <a:p>
+            <a:r>
+              <a:rPr lang="en-US" dirty="0"/>
+              <a:t>“Good programmers write good code. Great programmers steal.” - Unknown</a:t>
+            </a:r>
+          </a:p>
+          <a:p>
+            <a:pPr lvl="1"/>
+            <a:r>
+              <a:rPr lang="en-US" dirty="0"/>
+              <a:t>Learn, Use, Copy, Borrow, and/or Steal.</a:t>
+            </a:r>
+          </a:p>
+          <a:p>
+            <a:endParaRPr lang="en-US" dirty="0"/>
+          </a:p>
+        </p:txBody>
+      </p:sp>
+    </p:spTree>
+    <p:extLst>
+      <p:ext uri="{BB962C8B-B14F-4D97-AF65-F5344CB8AC3E}">
+        <p14:creationId xmlns:p14="http://schemas.microsoft.com/office/powerpoint/2010/main" val="1613193946"/>
       </p:ext>
     </p:extLst>
   </p:cSld>

</xml_diff>

<commit_message>
initial commit of the template-method pattern example;
</commit_message>
<xml_diff>
--- a/Presentation/Better Business Logic with Typescript.pptx
+++ b/Presentation/Better Business Logic with Typescript.pptx
@@ -18,10 +18,20 @@
     <p:sldId id="261" r:id="rId12"/>
     <p:sldId id="262" r:id="rId13"/>
     <p:sldId id="263" r:id="rId14"/>
-    <p:sldId id="268" r:id="rId15"/>
-    <p:sldId id="264" r:id="rId16"/>
-    <p:sldId id="266" r:id="rId17"/>
-    <p:sldId id="265" r:id="rId18"/>
+    <p:sldId id="270" r:id="rId15"/>
+    <p:sldId id="269" r:id="rId16"/>
+    <p:sldId id="271" r:id="rId17"/>
+    <p:sldId id="272" r:id="rId18"/>
+    <p:sldId id="273" r:id="rId19"/>
+    <p:sldId id="268" r:id="rId20"/>
+    <p:sldId id="274" r:id="rId21"/>
+    <p:sldId id="275" r:id="rId22"/>
+    <p:sldId id="276" r:id="rId23"/>
+    <p:sldId id="277" r:id="rId24"/>
+    <p:sldId id="278" r:id="rId25"/>
+    <p:sldId id="264" r:id="rId26"/>
+    <p:sldId id="266" r:id="rId27"/>
+    <p:sldId id="265" r:id="rId28"/>
   </p:sldIdLst>
   <p:sldSz cx="12192000" cy="6858000"/>
   <p:notesSz cx="6858000" cy="9144000"/>
@@ -134,7 +144,17 @@
             <p14:sldId id="261"/>
             <p14:sldId id="262"/>
             <p14:sldId id="263"/>
+            <p14:sldId id="270"/>
+            <p14:sldId id="269"/>
+            <p14:sldId id="271"/>
+            <p14:sldId id="272"/>
+            <p14:sldId id="273"/>
             <p14:sldId id="268"/>
+            <p14:sldId id="274"/>
+            <p14:sldId id="275"/>
+            <p14:sldId id="276"/>
+            <p14:sldId id="277"/>
+            <p14:sldId id="278"/>
             <p14:sldId id="264"/>
             <p14:sldId id="266"/>
             <p14:sldId id="265"/>
@@ -17329,7 +17349,7 @@
           <a:effectLst/>
           <a:extLst>
             <a:ext uri="{91240B29-F687-4f45-9708-019B960494DF}">
-              <a14:hiddenLine xmlns:a14="http://schemas.microsoft.com/office/drawing/2010/main" xmlns="" w="9525">
+              <a14:hiddenLine xmlns="" xmlns:a14="http://schemas.microsoft.com/office/drawing/2010/main" w="9525">
                 <a:solidFill>
                   <a:srgbClr val="000000"/>
                 </a:solidFill>
@@ -17678,7 +17698,7 @@
           <a:ln/>
           <a:extLst>
             <a:ext uri="{91240B29-F687-4f45-9708-019B960494DF}">
-              <a14:hiddenLine xmlns:a14="http://schemas.microsoft.com/office/drawing/2010/main" xmlns="" w="9525">
+              <a14:hiddenLine xmlns="" xmlns:a14="http://schemas.microsoft.com/office/drawing/2010/main" w="9525">
                 <a:solidFill>
                   <a:srgbClr val="000000"/>
                 </a:solidFill>
@@ -18308,7 +18328,7 @@
           <a:ln/>
           <a:extLst>
             <a:ext uri="{91240B29-F687-4f45-9708-019B960494DF}">
-              <a14:hiddenLine xmlns:a14="http://schemas.microsoft.com/office/drawing/2010/main" xmlns="" w="9525">
+              <a14:hiddenLine xmlns="" xmlns:a14="http://schemas.microsoft.com/office/drawing/2010/main" w="9525">
                 <a:solidFill>
                   <a:srgbClr val="000000"/>
                 </a:solidFill>
@@ -18647,7 +18667,7 @@
           <a:ln/>
           <a:extLst>
             <a:ext uri="{91240B29-F687-4f45-9708-019B960494DF}">
-              <a14:hiddenLine xmlns:a14="http://schemas.microsoft.com/office/drawing/2010/main" xmlns="" w="9525">
+              <a14:hiddenLine xmlns="" xmlns:a14="http://schemas.microsoft.com/office/drawing/2010/main" w="9525">
                 <a:solidFill>
                   <a:srgbClr val="000000"/>
                 </a:solidFill>
@@ -19126,7 +19146,7 @@
           <a:ln/>
           <a:extLst>
             <a:ext uri="{91240B29-F687-4f45-9708-019B960494DF}">
-              <a14:hiddenLine xmlns:a14="http://schemas.microsoft.com/office/drawing/2010/main" xmlns="" w="9525">
+              <a14:hiddenLine xmlns="" xmlns:a14="http://schemas.microsoft.com/office/drawing/2010/main" w="9525">
                 <a:solidFill>
                   <a:srgbClr val="000000"/>
                 </a:solidFill>
@@ -19656,7 +19676,7 @@
           <a:ln/>
           <a:extLst>
             <a:ext uri="{91240B29-F687-4f45-9708-019B960494DF}">
-              <a14:hiddenLine xmlns:a14="http://schemas.microsoft.com/office/drawing/2010/main" xmlns="" w="9525">
+              <a14:hiddenLine xmlns="" xmlns:a14="http://schemas.microsoft.com/office/drawing/2010/main" w="9525">
                 <a:solidFill>
                   <a:srgbClr val="000000"/>
                 </a:solidFill>
@@ -21516,7 +21536,7 @@
           <a:ln/>
           <a:extLst>
             <a:ext uri="{91240B29-F687-4f45-9708-019B960494DF}">
-              <a14:hiddenLine xmlns:a14="http://schemas.microsoft.com/office/drawing/2010/main" xmlns="" w="9525">
+              <a14:hiddenLine xmlns="" xmlns:a14="http://schemas.microsoft.com/office/drawing/2010/main" w="9525">
                 <a:solidFill>
                   <a:srgbClr val="000000"/>
                 </a:solidFill>
@@ -21791,7 +21811,7 @@
           <a:ln/>
           <a:extLst>
             <a:ext uri="{91240B29-F687-4f45-9708-019B960494DF}">
-              <a14:hiddenLine xmlns:a14="http://schemas.microsoft.com/office/drawing/2010/main" xmlns="" w="9525">
+              <a14:hiddenLine xmlns="" xmlns:a14="http://schemas.microsoft.com/office/drawing/2010/main" w="9525">
                 <a:solidFill>
                   <a:srgbClr val="000000"/>
                 </a:solidFill>
@@ -26905,7 +26925,7 @@
           <p:cNvPr id="2" name="Title 1">
             <a:extLst>
               <a:ext uri="{FF2B5EF4-FFF2-40B4-BE49-F238E27FC236}">
-                <a16:creationId xmlns:a16="http://schemas.microsoft.com/office/drawing/2014/main" id="{D5B3B675-DFDC-4B31-AD37-48232641A740}"/>
+                <a16:creationId xmlns:a16="http://schemas.microsoft.com/office/drawing/2014/main" id="{A1758B1B-621D-40A5-9B33-D3B725F77E89}"/>
               </a:ext>
             </a:extLst>
           </p:cNvPr>
@@ -26923,7 +26943,7 @@
           <a:p>
             <a:r>
               <a:rPr lang="en-US" dirty="0"/>
-              <a:t>Service End Points :: Façade Pattern</a:t>
+              <a:t>Principle(s):</a:t>
             </a:r>
           </a:p>
         </p:txBody>
@@ -26933,7 +26953,7 @@
           <p:cNvPr id="3" name="Content Placeholder 2">
             <a:extLst>
               <a:ext uri="{FF2B5EF4-FFF2-40B4-BE49-F238E27FC236}">
-                <a16:creationId xmlns:a16="http://schemas.microsoft.com/office/drawing/2014/main" id="{BA948533-938B-4FD7-9D96-6458BADD4F6C}"/>
+                <a16:creationId xmlns:a16="http://schemas.microsoft.com/office/drawing/2014/main" id="{D86370B2-B5B6-40A8-8D85-00B0D638C5FB}"/>
               </a:ext>
             </a:extLst>
           </p:cNvPr>
@@ -26951,38 +26971,111 @@
           <a:p>
             <a:r>
               <a:rPr lang="en-US" dirty="0"/>
-              <a:t>Definition: A single class that represents an entire subsystem.</a:t>
+              <a:t>Do not create what already exists.</a:t>
             </a:r>
           </a:p>
           <a:p>
             <a:r>
               <a:rPr lang="en-US" dirty="0"/>
-              <a:t>Useful in API design</a:t>
-            </a:r>
-          </a:p>
-          <a:p>
+              <a:t>Use the elements in the Angular Framework</a:t>
+            </a:r>
+          </a:p>
+          <a:p>
+            <a:pPr lvl="1"/>
             <a:r>
               <a:rPr lang="en-US" dirty="0"/>
-              <a:t>Useful in Service Oriented Architectures (SOA)</a:t>
-            </a:r>
-          </a:p>
-          <a:p>
+              <a:t>Modules</a:t>
+            </a:r>
+          </a:p>
+          <a:p>
+            <a:pPr lvl="1"/>
             <a:r>
               <a:rPr lang="en-US" dirty="0"/>
-              <a:t>Typically implements an </a:t>
-            </a:r>
-            <a:r>
-              <a:rPr lang="en-US" i="1" dirty="0"/>
-              <a:t>Interface</a:t>
-            </a:r>
-            <a:endParaRPr lang="en-US" dirty="0"/>
+              <a:t>Services</a:t>
+            </a:r>
+          </a:p>
+          <a:p>
+            <a:pPr lvl="1"/>
+            <a:r>
+              <a:rPr lang="en-US" dirty="0"/>
+              <a:t>Components</a:t>
+            </a:r>
+          </a:p>
+          <a:p>
+            <a:pPr lvl="1"/>
+            <a:r>
+              <a:rPr lang="en-US" dirty="0"/>
+              <a:t>Dependency Injection</a:t>
+            </a:r>
+          </a:p>
+          <a:p>
+            <a:pPr lvl="2"/>
+            <a:r>
+              <a:rPr lang="en-US" dirty="0"/>
+              <a:t>Code Smell: </a:t>
+            </a:r>
+            <a:r>
+              <a:rPr lang="en-US" dirty="0" err="1">
+                <a:latin typeface="Source Code Pro Light" panose="020B0409030403020204" pitchFamily="49" charset="0"/>
+                <a:ea typeface="Source Code Pro Light" panose="020B0409030403020204" pitchFamily="49" charset="0"/>
+              </a:rPr>
+              <a:t>var</a:t>
+            </a:r>
+            <a:r>
+              <a:rPr lang="en-US" dirty="0">
+                <a:latin typeface="Source Code Pro Light" panose="020B0409030403020204" pitchFamily="49" charset="0"/>
+                <a:ea typeface="Source Code Pro Light" panose="020B0409030403020204" pitchFamily="49" charset="0"/>
+              </a:rPr>
+              <a:t> </a:t>
+            </a:r>
+            <a:r>
+              <a:rPr lang="en-US" dirty="0" err="1">
+                <a:latin typeface="Source Code Pro Light" panose="020B0409030403020204" pitchFamily="49" charset="0"/>
+                <a:ea typeface="Source Code Pro Light" panose="020B0409030403020204" pitchFamily="49" charset="0"/>
+              </a:rPr>
+              <a:t>thingService</a:t>
+            </a:r>
+            <a:r>
+              <a:rPr lang="en-US" dirty="0">
+                <a:latin typeface="Source Code Pro Light" panose="020B0409030403020204" pitchFamily="49" charset="0"/>
+                <a:ea typeface="Source Code Pro Light" panose="020B0409030403020204" pitchFamily="49" charset="0"/>
+              </a:rPr>
+              <a:t> = new </a:t>
+            </a:r>
+            <a:r>
+              <a:rPr lang="en-US" dirty="0" err="1">
+                <a:latin typeface="Source Code Pro Light" panose="020B0409030403020204" pitchFamily="49" charset="0"/>
+                <a:ea typeface="Source Code Pro Light" panose="020B0409030403020204" pitchFamily="49" charset="0"/>
+              </a:rPr>
+              <a:t>ThingService</a:t>
+            </a:r>
+            <a:r>
+              <a:rPr lang="en-US" dirty="0">
+                <a:latin typeface="Source Code Pro Light" panose="020B0409030403020204" pitchFamily="49" charset="0"/>
+                <a:ea typeface="Source Code Pro Light" panose="020B0409030403020204" pitchFamily="49" charset="0"/>
+              </a:rPr>
+              <a:t>(..);</a:t>
+            </a:r>
+          </a:p>
+          <a:p>
+            <a:r>
+              <a:rPr lang="en-US" dirty="0"/>
+              <a:t>Use the “force” – Use the “ng”.</a:t>
+            </a:r>
+          </a:p>
+          <a:p>
+            <a:pPr lvl="1"/>
+            <a:r>
+              <a:rPr lang="en-US" dirty="0"/>
+              <a:t>If there is a way to do it in Angular, learn use that mechanism.</a:t>
+            </a:r>
           </a:p>
         </p:txBody>
       </p:sp>
     </p:spTree>
     <p:extLst>
       <p:ext uri="{BB962C8B-B14F-4D97-AF65-F5344CB8AC3E}">
-        <p14:creationId xmlns:p14="http://schemas.microsoft.com/office/powerpoint/2010/main" val="1957383248"/>
+        <p14:creationId xmlns:p14="http://schemas.microsoft.com/office/powerpoint/2010/main" val="818836091"/>
       </p:ext>
     </p:extLst>
   </p:cSld>
@@ -27014,7 +27107,7 @@
           <p:cNvPr id="2" name="Title 1">
             <a:extLst>
               <a:ext uri="{FF2B5EF4-FFF2-40B4-BE49-F238E27FC236}">
-                <a16:creationId xmlns:a16="http://schemas.microsoft.com/office/drawing/2014/main" id="{7D8AF8FB-793E-41BD-8CC5-A923B5A8209E}"/>
+                <a16:creationId xmlns:a16="http://schemas.microsoft.com/office/drawing/2014/main" id="{1279AF16-888B-4F97-979D-D7623C123C6B}"/>
               </a:ext>
             </a:extLst>
           </p:cNvPr>
@@ -27031,19 +27124,18 @@
           <a:lstStyle/>
           <a:p>
             <a:r>
-              <a:rPr lang="en-US"/>
-              <a:t>Web References</a:t>
-            </a:r>
-            <a:endParaRPr lang="en-US" dirty="0"/>
-          </a:p>
-        </p:txBody>
-      </p:sp>
-      <p:sp>
-        <p:nvSpPr>
-          <p:cNvPr id="3" name="Content Placeholder 2">
+              <a:rPr lang="en-US" dirty="0"/>
+              <a:t>Angular Application</a:t>
+            </a:r>
+          </a:p>
+        </p:txBody>
+      </p:sp>
+      <p:sp>
+        <p:nvSpPr>
+          <p:cNvPr id="4" name="Content Placeholder 3">
             <a:extLst>
               <a:ext uri="{FF2B5EF4-FFF2-40B4-BE49-F238E27FC236}">
-                <a16:creationId xmlns:a16="http://schemas.microsoft.com/office/drawing/2014/main" id="{3975127B-114D-4B36-BA13-4EB6781A2CEB}"/>
+                <a16:creationId xmlns:a16="http://schemas.microsoft.com/office/drawing/2014/main" id="{74543BF9-B651-4C32-AD11-ABBE05E6E045}"/>
               </a:ext>
             </a:extLst>
           </p:cNvPr>
@@ -27056,103 +27148,50 @@
         </p:nvSpPr>
         <p:spPr/>
         <p:txBody>
-          <a:bodyPr>
-            <a:normAutofit/>
-          </a:bodyPr>
-          <a:lstStyle/>
-          <a:p>
-            <a:r>
-              <a:rPr lang="en-US">
-                <a:hlinkClick r:id="rId2"/>
-              </a:rPr>
-              <a:t>GoF Design patterns in .NET/C#</a:t>
-            </a:r>
-            <a:endParaRPr lang="en-US"/>
-          </a:p>
-          <a:p>
-            <a:r>
-              <a:rPr lang="en-US">
-                <a:hlinkClick r:id="rId3"/>
-              </a:rPr>
-              <a:t>Design Patterns General</a:t>
-            </a:r>
-            <a:endParaRPr lang="en-US"/>
-          </a:p>
-          <a:p>
-            <a:pPr lvl="1"/>
-            <a:r>
-              <a:rPr lang="en-US">
-                <a:hlinkClick r:id="rId3"/>
-              </a:rPr>
-              <a:t>Creational</a:t>
-            </a:r>
-            <a:endParaRPr lang="en-US"/>
-          </a:p>
-          <a:p>
-            <a:pPr lvl="1"/>
-            <a:r>
-              <a:rPr lang="en-US">
-                <a:hlinkClick r:id="rId4"/>
-              </a:rPr>
-              <a:t>Structural</a:t>
-            </a:r>
-            <a:endParaRPr lang="en-US"/>
-          </a:p>
-          <a:p>
-            <a:pPr lvl="1"/>
-            <a:r>
-              <a:rPr lang="en-US">
-                <a:hlinkClick r:id="rId5"/>
-              </a:rPr>
-              <a:t>Behavioral</a:t>
-            </a:r>
-            <a:endParaRPr lang="en-US"/>
-          </a:p>
-          <a:p>
-            <a:r>
-              <a:rPr lang="en-US"/>
-              <a:t>Principles:</a:t>
-            </a:r>
-          </a:p>
-          <a:p>
-            <a:pPr lvl="1"/>
-            <a:r>
-              <a:rPr lang="en-US">
-                <a:hlinkClick r:id="rId6"/>
-              </a:rPr>
-              <a:t>Single Responsibility</a:t>
-            </a:r>
-            <a:endParaRPr lang="en-US"/>
-          </a:p>
-          <a:p>
-            <a:pPr lvl="1"/>
-            <a:r>
-              <a:rPr lang="en-US">
-                <a:hlinkClick r:id="rId7"/>
-              </a:rPr>
-              <a:t>Separation of Concerns</a:t>
-            </a:r>
-            <a:endParaRPr lang="en-US"/>
-          </a:p>
-          <a:p>
-            <a:pPr lvl="1"/>
-            <a:r>
-              <a:rPr lang="en-US">
-                <a:hlinkClick r:id="rId8"/>
-              </a:rPr>
-              <a:t>S.O.L.I.D Principles</a:t>
-            </a:r>
-            <a:endParaRPr lang="en-US"/>
-          </a:p>
-          <a:p>
-            <a:endParaRPr lang="en-US" dirty="0"/>
-          </a:p>
-        </p:txBody>
-      </p:sp>
+          <a:bodyPr/>
+          <a:lstStyle/>
+          <a:p>
+            <a:endParaRPr lang="en-US" dirty="0"/>
+          </a:p>
+          <a:p>
+            <a:endParaRPr lang="en-US" dirty="0"/>
+          </a:p>
+        </p:txBody>
+      </p:sp>
+      <p:pic>
+        <p:nvPicPr>
+          <p:cNvPr id="9" name="Picture 8">
+            <a:extLst>
+              <a:ext uri="{FF2B5EF4-FFF2-40B4-BE49-F238E27FC236}">
+                <a16:creationId xmlns:a16="http://schemas.microsoft.com/office/drawing/2014/main" id="{D63B784E-D20A-4009-A631-9B90661094CC}"/>
+              </a:ext>
+            </a:extLst>
+          </p:cNvPr>
+          <p:cNvPicPr>
+            <a:picLocks noChangeAspect="1"/>
+          </p:cNvPicPr>
+          <p:nvPr/>
+        </p:nvPicPr>
+        <p:blipFill>
+          <a:blip r:embed="rId2"/>
+          <a:stretch>
+            <a:fillRect/>
+          </a:stretch>
+        </p:blipFill>
+        <p:spPr>
+          <a:xfrm>
+            <a:off x="1574522" y="2222287"/>
+            <a:ext cx="8892668" cy="4462705"/>
+          </a:xfrm>
+          <a:prstGeom prst="rect">
+            <a:avLst/>
+          </a:prstGeom>
+        </p:spPr>
+      </p:pic>
     </p:spTree>
     <p:extLst>
       <p:ext uri="{BB962C8B-B14F-4D97-AF65-F5344CB8AC3E}">
-        <p14:creationId xmlns:p14="http://schemas.microsoft.com/office/powerpoint/2010/main" val="1961233773"/>
+        <p14:creationId xmlns:p14="http://schemas.microsoft.com/office/powerpoint/2010/main" val="3515010425"/>
       </p:ext>
     </p:extLst>
   </p:cSld>
@@ -27184,7 +27223,7 @@
           <p:cNvPr id="2" name="Title 1">
             <a:extLst>
               <a:ext uri="{FF2B5EF4-FFF2-40B4-BE49-F238E27FC236}">
-                <a16:creationId xmlns:a16="http://schemas.microsoft.com/office/drawing/2014/main" id="{7D8AF8FB-793E-41BD-8CC5-A923B5A8209E}"/>
+                <a16:creationId xmlns:a16="http://schemas.microsoft.com/office/drawing/2014/main" id="{59809628-3F81-4641-AA19-F6962C7C9CA5}"/>
               </a:ext>
             </a:extLst>
           </p:cNvPr>
@@ -27201,10 +27240,9 @@
           <a:lstStyle/>
           <a:p>
             <a:r>
-              <a:rPr lang="en-US"/>
-              <a:t>Book References</a:t>
-            </a:r>
-            <a:endParaRPr lang="en-US" dirty="0"/>
+              <a:rPr lang="en-US" dirty="0"/>
+              <a:t>Angular Application Modules</a:t>
+            </a:r>
           </a:p>
         </p:txBody>
       </p:sp>
@@ -27213,7 +27251,7 @@
           <p:cNvPr id="3" name="Content Placeholder 2">
             <a:extLst>
               <a:ext uri="{FF2B5EF4-FFF2-40B4-BE49-F238E27FC236}">
-                <a16:creationId xmlns:a16="http://schemas.microsoft.com/office/drawing/2014/main" id="{3975127B-114D-4B36-BA13-4EB6781A2CEB}"/>
+                <a16:creationId xmlns:a16="http://schemas.microsoft.com/office/drawing/2014/main" id="{17FEE82D-5D45-4DA9-B363-6BB5EBE0E5BA}"/>
               </a:ext>
             </a:extLst>
           </p:cNvPr>
@@ -27224,101 +27262,331 @@
             <p:ph idx="1"/>
           </p:nvPr>
         </p:nvSpPr>
-        <p:spPr/>
+        <p:spPr>
+          <a:xfrm>
+            <a:off x="818712" y="2222287"/>
+            <a:ext cx="10554574" cy="4334499"/>
+          </a:xfrm>
+        </p:spPr>
         <p:txBody>
           <a:bodyPr>
-            <a:normAutofit fontScale="92500" lnSpcReduction="10000"/>
+            <a:normAutofit fontScale="77500" lnSpcReduction="20000"/>
           </a:bodyPr>
           <a:lstStyle/>
           <a:p>
             <a:r>
-              <a:rPr lang="en-US">
-                <a:hlinkClick r:id="rId2"/>
+              <a:rPr lang="en-US" b="1" dirty="0"/>
+              <a:t>Shared</a:t>
+            </a:r>
+          </a:p>
+          <a:p>
+            <a:pPr lvl="1"/>
+            <a:r>
+              <a:rPr lang="en-US" dirty="0"/>
+              <a:t>Angular: </a:t>
+            </a:r>
+            <a:r>
+              <a:rPr lang="en-US" dirty="0" err="1"/>
+              <a:t>NgModule</a:t>
+            </a:r>
+            <a:r>
+              <a:rPr lang="en-US" dirty="0"/>
+              <a:t>, </a:t>
+            </a:r>
+            <a:r>
+              <a:rPr lang="en-US" dirty="0" err="1"/>
+              <a:t>CommonModule</a:t>
+            </a:r>
+            <a:r>
+              <a:rPr lang="en-US" dirty="0"/>
+              <a:t>, </a:t>
+            </a:r>
+            <a:r>
+              <a:rPr lang="en-US" dirty="0" err="1"/>
+              <a:t>HttpModule</a:t>
+            </a:r>
+            <a:r>
+              <a:rPr lang="en-US" dirty="0"/>
+              <a:t>, </a:t>
+            </a:r>
+            <a:r>
+              <a:rPr lang="en-US" dirty="0" err="1"/>
+              <a:t>FormsModule</a:t>
+            </a:r>
+            <a:r>
+              <a:rPr lang="en-US" dirty="0"/>
+              <a:t>, etc.</a:t>
+            </a:r>
+          </a:p>
+          <a:p>
+            <a:pPr lvl="1"/>
+            <a:r>
+              <a:rPr lang="en-US" dirty="0"/>
+              <a:t>Third-Party: </a:t>
+            </a:r>
+            <a:r>
+              <a:rPr lang="en-US" dirty="0" err="1"/>
+              <a:t>Wijmo</a:t>
+            </a:r>
+            <a:endParaRPr lang="en-US" dirty="0"/>
+          </a:p>
+          <a:p>
+            <a:r>
+              <a:rPr lang="en-US" b="1" dirty="0"/>
+              <a:t>Core</a:t>
+            </a:r>
+            <a:r>
+              <a:rPr lang="en-US" dirty="0"/>
+              <a:t>: Application-Level Modules</a:t>
+            </a:r>
+          </a:p>
+          <a:p>
+            <a:pPr lvl="1"/>
+            <a:r>
+              <a:rPr lang="en-US" dirty="0"/>
+              <a:t>Modules: </a:t>
+            </a:r>
+            <a:r>
+              <a:rPr lang="en-US" dirty="0" err="1">
+                <a:latin typeface="Source Code Pro Light" panose="020B0409030403020204" pitchFamily="49" charset="0"/>
+                <a:ea typeface="Source Code Pro Light" panose="020B0409030403020204" pitchFamily="49" charset="0"/>
               </a:rPr>
-              <a:t>Design Patterns : Elements of Reusable Object-Oriented Software</a:t>
-            </a:r>
-            <a:endParaRPr lang="en-US"/>
+              <a:t>PagesModule</a:t>
+            </a:r>
+            <a:r>
+              <a:rPr lang="en-US" dirty="0">
+                <a:latin typeface="Source Code Pro Light" panose="020B0409030403020204" pitchFamily="49" charset="0"/>
+                <a:ea typeface="Source Code Pro Light" panose="020B0409030403020204" pitchFamily="49" charset="0"/>
+              </a:rPr>
+              <a:t>, </a:t>
+            </a:r>
+            <a:r>
+              <a:rPr lang="en-US" dirty="0" err="1">
+                <a:latin typeface="Source Code Pro Light" panose="020B0409030403020204" pitchFamily="49" charset="0"/>
+                <a:ea typeface="Source Code Pro Light" panose="020B0409030403020204" pitchFamily="49" charset="0"/>
+              </a:rPr>
+              <a:t>SecurityModule</a:t>
+            </a:r>
+            <a:endParaRPr lang="en-US" dirty="0">
+              <a:latin typeface="Source Code Pro Light" panose="020B0409030403020204" pitchFamily="49" charset="0"/>
+              <a:ea typeface="Source Code Pro Light" panose="020B0409030403020204" pitchFamily="49" charset="0"/>
+            </a:endParaRPr>
           </a:p>
           <a:p>
             <a:pPr lvl="1"/>
             <a:r>
-              <a:rPr lang="en-US"/>
-              <a:t>ISBN-13: 978-0201633610, ISBN-10: 0201633612</a:t>
-            </a:r>
-          </a:p>
-          <a:p>
-            <a:r>
-              <a:rPr lang="en-US">
-                <a:hlinkClick r:id="rId3"/>
+              <a:rPr lang="en-US" dirty="0"/>
+              <a:t>Services: </a:t>
+            </a:r>
+            <a:r>
+              <a:rPr lang="en-US" dirty="0" err="1">
+                <a:latin typeface="Source Code Pro Light" panose="020B0409030403020204" pitchFamily="49" charset="0"/>
+                <a:ea typeface="Source Code Pro Light" panose="020B0409030403020204" pitchFamily="49" charset="0"/>
               </a:rPr>
-              <a:t>Head First Design Patterns</a:t>
-            </a:r>
-            <a:endParaRPr lang="en-US"/>
+              <a:t>LoggingService</a:t>
+            </a:r>
+            <a:r>
+              <a:rPr lang="en-US" dirty="0">
+                <a:latin typeface="Source Code Pro Light" panose="020B0409030403020204" pitchFamily="49" charset="0"/>
+                <a:ea typeface="Source Code Pro Light" panose="020B0409030403020204" pitchFamily="49" charset="0"/>
+              </a:rPr>
+              <a:t>, </a:t>
+            </a:r>
+            <a:r>
+              <a:rPr lang="en-US" dirty="0" err="1">
+                <a:latin typeface="Source Code Pro Light" panose="020B0409030403020204" pitchFamily="49" charset="0"/>
+                <a:ea typeface="Source Code Pro Light" panose="020B0409030403020204" pitchFamily="49" charset="0"/>
+              </a:rPr>
+              <a:t>SecurityHttpService</a:t>
+            </a:r>
+            <a:endParaRPr lang="en-US" dirty="0">
+              <a:latin typeface="Source Code Pro Light" panose="020B0409030403020204" pitchFamily="49" charset="0"/>
+              <a:ea typeface="Source Code Pro Light" panose="020B0409030403020204" pitchFamily="49" charset="0"/>
+            </a:endParaRPr>
           </a:p>
           <a:p>
             <a:pPr lvl="1"/>
             <a:r>
-              <a:rPr lang="en-US"/>
-              <a:t>ISBN-13: 978-0596007126, ISBN-10: 0596007124</a:t>
-            </a:r>
-          </a:p>
-          <a:p>
-            <a:r>
-              <a:rPr lang="en-US">
-                <a:hlinkClick r:id="rId4"/>
+              <a:rPr lang="en-US" dirty="0"/>
+              <a:t>Components: </a:t>
+            </a:r>
+            <a:r>
+              <a:rPr lang="en-US" dirty="0" err="1">
+                <a:latin typeface="Source Code Pro Light" panose="020B0409030403020204" pitchFamily="49" charset="0"/>
+                <a:ea typeface="Source Code Pro Light" panose="020B0409030403020204" pitchFamily="49" charset="0"/>
               </a:rPr>
-              <a:t>Clean Code</a:t>
-            </a:r>
-            <a:endParaRPr lang="en-US"/>
+              <a:t>MenuComponent</a:t>
+            </a:r>
+            <a:r>
+              <a:rPr lang="en-US" dirty="0">
+                <a:latin typeface="Source Code Pro Light" panose="020B0409030403020204" pitchFamily="49" charset="0"/>
+                <a:ea typeface="Source Code Pro Light" panose="020B0409030403020204" pitchFamily="49" charset="0"/>
+              </a:rPr>
+              <a:t>, </a:t>
+            </a:r>
+            <a:r>
+              <a:rPr lang="en-US" dirty="0" err="1">
+                <a:latin typeface="Source Code Pro Light" panose="020B0409030403020204" pitchFamily="49" charset="0"/>
+                <a:ea typeface="Source Code Pro Light" panose="020B0409030403020204" pitchFamily="49" charset="0"/>
+              </a:rPr>
+              <a:t>FooterComponent</a:t>
+            </a:r>
+            <a:endParaRPr lang="en-US" dirty="0">
+              <a:latin typeface="Source Code Pro Light" panose="020B0409030403020204" pitchFamily="49" charset="0"/>
+              <a:ea typeface="Source Code Pro Light" panose="020B0409030403020204" pitchFamily="49" charset="0"/>
+            </a:endParaRPr>
+          </a:p>
+          <a:p>
+            <a:r>
+              <a:rPr lang="en-US" b="1" dirty="0"/>
+              <a:t>Domain Service</a:t>
+            </a:r>
+            <a:r>
+              <a:rPr lang="en-US" dirty="0"/>
+              <a:t>: Service-Only</a:t>
+            </a:r>
           </a:p>
           <a:p>
             <a:pPr lvl="1"/>
             <a:r>
-              <a:rPr lang="en-US"/>
-              <a:t>ISBN-13: 978-0132350884, ISBN-10: 0132350882</a:t>
-            </a:r>
-          </a:p>
-          <a:p>
-            <a:r>
-              <a:rPr lang="en-US">
-                <a:hlinkClick r:id="rId5"/>
+              <a:rPr lang="en-US" dirty="0"/>
+              <a:t>Module: </a:t>
+            </a:r>
+            <a:r>
+              <a:rPr lang="en-US" dirty="0">
+                <a:latin typeface="Source Code Pro Light" panose="020B0409030403020204" pitchFamily="49" charset="0"/>
+                <a:ea typeface="Source Code Pro Light" panose="020B0409030403020204" pitchFamily="49" charset="0"/>
               </a:rPr>
-              <a:t>The Pragmatic Programmer</a:t>
-            </a:r>
-            <a:endParaRPr lang="en-US"/>
+              <a:t>Security</a:t>
+            </a:r>
           </a:p>
           <a:p>
             <a:pPr lvl="1"/>
             <a:r>
-              <a:rPr lang="en-US"/>
-              <a:t>ISBN-13: 978-0201616224, ISBN-10: 020161622X</a:t>
-            </a:r>
-          </a:p>
-          <a:p>
-            <a:r>
-              <a:rPr lang="en-US">
-                <a:hlinkClick r:id="rId6"/>
+              <a:rPr lang="en-US" dirty="0"/>
+              <a:t>Service: </a:t>
+            </a:r>
+            <a:r>
+              <a:rPr lang="en-US" dirty="0" err="1">
+                <a:latin typeface="Source Code Pro Light" panose="020B0409030403020204" pitchFamily="49" charset="0"/>
+                <a:ea typeface="Source Code Pro Light" panose="020B0409030403020204" pitchFamily="49" charset="0"/>
               </a:rPr>
-              <a:t>Patterns of Enterprise Application Architecture</a:t>
-            </a:r>
-            <a:endParaRPr lang="en-US"/>
+              <a:t>SecurityService</a:t>
+            </a:r>
+            <a:endParaRPr lang="en-US" dirty="0">
+              <a:latin typeface="Source Code Pro Light" panose="020B0409030403020204" pitchFamily="49" charset="0"/>
+              <a:ea typeface="Source Code Pro Light" panose="020B0409030403020204" pitchFamily="49" charset="0"/>
+            </a:endParaRPr>
           </a:p>
           <a:p>
             <a:pPr lvl="1"/>
             <a:r>
-              <a:rPr lang="en-US"/>
-              <a:t>ISBN-13: 978-0321127426, ISBN-10: 0321127420</a:t>
-            </a:r>
-          </a:p>
-          <a:p>
-            <a:endParaRPr lang="en-US" dirty="0"/>
+              <a:rPr lang="en-US" dirty="0"/>
+              <a:t>Components: none</a:t>
+            </a:r>
+          </a:p>
+          <a:p>
+            <a:r>
+              <a:rPr lang="en-US" b="1" dirty="0"/>
+              <a:t>Domain UI</a:t>
+            </a:r>
+            <a:r>
+              <a:rPr lang="en-US" dirty="0"/>
+              <a:t>: UI-Only</a:t>
+            </a:r>
+          </a:p>
+          <a:p>
+            <a:pPr lvl="1"/>
+            <a:r>
+              <a:rPr lang="en-US" dirty="0"/>
+              <a:t>Module: </a:t>
+            </a:r>
+            <a:r>
+              <a:rPr lang="en-US" dirty="0" err="1">
+                <a:latin typeface="Source Code Pro Light" panose="020B0409030403020204" pitchFamily="49" charset="0"/>
+                <a:ea typeface="Source Code Pro Light" panose="020B0409030403020204" pitchFamily="49" charset="0"/>
+              </a:rPr>
+              <a:t>SecurityUIModule</a:t>
+            </a:r>
+            <a:endParaRPr lang="en-US" dirty="0">
+              <a:latin typeface="Source Code Pro Light" panose="020B0409030403020204" pitchFamily="49" charset="0"/>
+              <a:ea typeface="Source Code Pro Light" panose="020B0409030403020204" pitchFamily="49" charset="0"/>
+            </a:endParaRPr>
+          </a:p>
+          <a:p>
+            <a:pPr lvl="1"/>
+            <a:r>
+              <a:rPr lang="en-US" dirty="0" err="1"/>
+              <a:t>RoutingModule</a:t>
+            </a:r>
+            <a:r>
+              <a:rPr lang="en-US" dirty="0"/>
+              <a:t>: </a:t>
+            </a:r>
+            <a:r>
+              <a:rPr lang="en-US" dirty="0" err="1">
+                <a:latin typeface="Source Code Pro Light" panose="020B0409030403020204" pitchFamily="49" charset="0"/>
+                <a:ea typeface="Source Code Pro Light" panose="020B0409030403020204" pitchFamily="49" charset="0"/>
+              </a:rPr>
+              <a:t>SecurityRoutingModule</a:t>
+            </a:r>
+            <a:endParaRPr lang="en-US" dirty="0">
+              <a:latin typeface="Source Code Pro Light" panose="020B0409030403020204" pitchFamily="49" charset="0"/>
+              <a:ea typeface="Source Code Pro Light" panose="020B0409030403020204" pitchFamily="49" charset="0"/>
+            </a:endParaRPr>
+          </a:p>
+          <a:p>
+            <a:pPr lvl="1"/>
+            <a:r>
+              <a:rPr lang="en-US" dirty="0"/>
+              <a:t>Components: </a:t>
+            </a:r>
+            <a:r>
+              <a:rPr lang="en-US" dirty="0" err="1">
+                <a:latin typeface="Source Code Pro Light" panose="020B0409030403020204" pitchFamily="49" charset="0"/>
+                <a:ea typeface="Source Code Pro Light" panose="020B0409030403020204" pitchFamily="49" charset="0"/>
+              </a:rPr>
+              <a:t>LoginComponent</a:t>
+            </a:r>
+            <a:r>
+              <a:rPr lang="en-US" dirty="0">
+                <a:latin typeface="Source Code Pro Light" panose="020B0409030403020204" pitchFamily="49" charset="0"/>
+                <a:ea typeface="Source Code Pro Light" panose="020B0409030403020204" pitchFamily="49" charset="0"/>
+              </a:rPr>
+              <a:t>, </a:t>
+            </a:r>
+            <a:r>
+              <a:rPr lang="en-US" dirty="0" err="1">
+                <a:latin typeface="Source Code Pro Light" panose="020B0409030403020204" pitchFamily="49" charset="0"/>
+                <a:ea typeface="Source Code Pro Light" panose="020B0409030403020204" pitchFamily="49" charset="0"/>
+              </a:rPr>
+              <a:t>SignUpComponent</a:t>
+            </a:r>
+            <a:r>
+              <a:rPr lang="en-US" dirty="0">
+                <a:latin typeface="Source Code Pro Light" panose="020B0409030403020204" pitchFamily="49" charset="0"/>
+                <a:ea typeface="Source Code Pro Light" panose="020B0409030403020204" pitchFamily="49" charset="0"/>
+              </a:rPr>
+              <a:t>. </a:t>
+            </a:r>
+            <a:r>
+              <a:rPr lang="en-US" dirty="0" err="1">
+                <a:latin typeface="Source Code Pro Light" panose="020B0409030403020204" pitchFamily="49" charset="0"/>
+                <a:ea typeface="Source Code Pro Light" panose="020B0409030403020204" pitchFamily="49" charset="0"/>
+              </a:rPr>
+              <a:t>ResetPassword</a:t>
+            </a:r>
+            <a:endParaRPr lang="en-US" dirty="0">
+              <a:latin typeface="Source Code Pro Light" panose="020B0409030403020204" pitchFamily="49" charset="0"/>
+              <a:ea typeface="Source Code Pro Light" panose="020B0409030403020204" pitchFamily="49" charset="0"/>
+            </a:endParaRPr>
           </a:p>
         </p:txBody>
       </p:sp>
     </p:spTree>
     <p:extLst>
       <p:ext uri="{BB962C8B-B14F-4D97-AF65-F5344CB8AC3E}">
-        <p14:creationId xmlns:p14="http://schemas.microsoft.com/office/powerpoint/2010/main" val="214986796"/>
+        <p14:creationId xmlns:p14="http://schemas.microsoft.com/office/powerpoint/2010/main" val="975586160"/>
       </p:ext>
     </p:extLst>
   </p:cSld>
@@ -27329,6 +27597,99 @@
 </file>
 
 <file path=ppt/slides/slide13.xml><?xml version="1.0" encoding="utf-8"?>
+<p:sld xmlns:a="http://schemas.openxmlformats.org/drawingml/2006/main" xmlns:r="http://schemas.openxmlformats.org/officeDocument/2006/relationships" xmlns:p="http://schemas.openxmlformats.org/presentationml/2006/main">
+  <p:cSld>
+    <p:bg>
+      <p:bgRef idx="1001">
+        <a:schemeClr val="bg2"/>
+      </p:bgRef>
+    </p:bg>
+    <p:spTree>
+      <p:nvGrpSpPr>
+        <p:cNvPr id="1" name=""/>
+        <p:cNvGrpSpPr/>
+        <p:nvPr/>
+      </p:nvGrpSpPr>
+      <p:grpSpPr>
+        <a:xfrm>
+          <a:off x="0" y="0"/>
+          <a:ext cx="0" cy="0"/>
+          <a:chOff x="0" y="0"/>
+          <a:chExt cx="0" cy="0"/>
+        </a:xfrm>
+      </p:grpSpPr>
+      <p:sp>
+        <p:nvSpPr>
+          <p:cNvPr id="5" name="Title 4">
+            <a:extLst>
+              <a:ext uri="{FF2B5EF4-FFF2-40B4-BE49-F238E27FC236}">
+                <a16:creationId xmlns:a16="http://schemas.microsoft.com/office/drawing/2014/main" id="{7B702912-3A8C-4506-B203-4167A6756140}"/>
+              </a:ext>
+            </a:extLst>
+          </p:cNvPr>
+          <p:cNvSpPr>
+            <a:spLocks noGrp="1"/>
+          </p:cNvSpPr>
+          <p:nvPr>
+            <p:ph type="title"/>
+          </p:nvPr>
+        </p:nvSpPr>
+        <p:spPr/>
+        <p:txBody>
+          <a:bodyPr/>
+          <a:lstStyle/>
+          <a:p>
+            <a:r>
+              <a:rPr lang="en-US" dirty="0"/>
+              <a:t>Angular Domain Service Module</a:t>
+            </a:r>
+          </a:p>
+        </p:txBody>
+      </p:sp>
+      <p:pic>
+        <p:nvPicPr>
+          <p:cNvPr id="8" name="Picture 7">
+            <a:extLst>
+              <a:ext uri="{FF2B5EF4-FFF2-40B4-BE49-F238E27FC236}">
+                <a16:creationId xmlns:a16="http://schemas.microsoft.com/office/drawing/2014/main" id="{853EB561-2EAD-4E25-93F2-3C1C956BE5B8}"/>
+              </a:ext>
+            </a:extLst>
+          </p:cNvPr>
+          <p:cNvPicPr>
+            <a:picLocks noChangeAspect="1"/>
+          </p:cNvPicPr>
+          <p:nvPr/>
+        </p:nvPicPr>
+        <p:blipFill>
+          <a:blip r:embed="rId3"/>
+          <a:stretch>
+            <a:fillRect/>
+          </a:stretch>
+        </p:blipFill>
+        <p:spPr>
+          <a:xfrm>
+            <a:off x="809999" y="2297654"/>
+            <a:ext cx="7248519" cy="4217222"/>
+          </a:xfrm>
+          <a:prstGeom prst="rect">
+            <a:avLst/>
+          </a:prstGeom>
+        </p:spPr>
+      </p:pic>
+    </p:spTree>
+    <p:extLst>
+      <p:ext uri="{BB962C8B-B14F-4D97-AF65-F5344CB8AC3E}">
+        <p14:creationId xmlns:p14="http://schemas.microsoft.com/office/powerpoint/2010/main" val="1763282499"/>
+      </p:ext>
+    </p:extLst>
+  </p:cSld>
+  <p:clrMapOvr>
+    <a:overrideClrMapping bg1="dk1" tx1="lt1" bg2="dk2" tx2="lt2" accent1="accent1" accent2="accent2" accent3="accent3" accent4="accent4" accent5="accent5" accent6="accent6" hlink="hlink" folHlink="folHlink"/>
+  </p:clrMapOvr>
+</p:sld>
+</file>
+
+<file path=ppt/slides/slide14.xml><?xml version="1.0" encoding="utf-8"?>
 <p:sld xmlns:a="http://schemas.openxmlformats.org/drawingml/2006/main" xmlns:r="http://schemas.openxmlformats.org/officeDocument/2006/relationships" xmlns:p="http://schemas.openxmlformats.org/presentationml/2006/main">
   <p:cSld>
     <p:spTree>
@@ -27347,10 +27708,123 @@
       </p:grpSpPr>
       <p:sp>
         <p:nvSpPr>
+          <p:cNvPr id="5" name="Title 4">
+            <a:extLst>
+              <a:ext uri="{FF2B5EF4-FFF2-40B4-BE49-F238E27FC236}">
+                <a16:creationId xmlns:a16="http://schemas.microsoft.com/office/drawing/2014/main" id="{7B702912-3A8C-4506-B203-4167A6756140}"/>
+              </a:ext>
+            </a:extLst>
+          </p:cNvPr>
+          <p:cNvSpPr>
+            <a:spLocks noGrp="1"/>
+          </p:cNvSpPr>
+          <p:nvPr>
+            <p:ph type="title"/>
+          </p:nvPr>
+        </p:nvSpPr>
+        <p:spPr/>
+        <p:txBody>
+          <a:bodyPr/>
+          <a:lstStyle/>
+          <a:p>
+            <a:r>
+              <a:rPr lang="en-US" dirty="0"/>
+              <a:t>Angular Domain UI Service Module</a:t>
+            </a:r>
+          </a:p>
+        </p:txBody>
+      </p:sp>
+      <p:sp>
+        <p:nvSpPr>
+          <p:cNvPr id="16" name="Content Placeholder 15">
+            <a:extLst>
+              <a:ext uri="{FF2B5EF4-FFF2-40B4-BE49-F238E27FC236}">
+                <a16:creationId xmlns:a16="http://schemas.microsoft.com/office/drawing/2014/main" id="{D62F5C55-5AB3-46E1-91D5-749CA9B25DE9}"/>
+              </a:ext>
+            </a:extLst>
+          </p:cNvPr>
+          <p:cNvSpPr>
+            <a:spLocks noGrp="1"/>
+          </p:cNvSpPr>
+          <p:nvPr>
+            <p:ph idx="1"/>
+          </p:nvPr>
+        </p:nvSpPr>
+        <p:spPr/>
+        <p:txBody>
+          <a:bodyPr/>
+          <a:lstStyle/>
+          <a:p>
+            <a:endParaRPr lang="en-US" dirty="0"/>
+          </a:p>
+        </p:txBody>
+      </p:sp>
+      <p:pic>
+        <p:nvPicPr>
+          <p:cNvPr id="17" name="Picture 16">
+            <a:extLst>
+              <a:ext uri="{FF2B5EF4-FFF2-40B4-BE49-F238E27FC236}">
+                <a16:creationId xmlns:a16="http://schemas.microsoft.com/office/drawing/2014/main" id="{CB09DB97-EE2D-4308-A095-0C4C6072F73E}"/>
+              </a:ext>
+            </a:extLst>
+          </p:cNvPr>
+          <p:cNvPicPr>
+            <a:picLocks noChangeAspect="1"/>
+          </p:cNvPicPr>
+          <p:nvPr/>
+        </p:nvPicPr>
+        <p:blipFill>
+          <a:blip r:embed="rId2"/>
+          <a:stretch>
+            <a:fillRect/>
+          </a:stretch>
+        </p:blipFill>
+        <p:spPr>
+          <a:xfrm>
+            <a:off x="818712" y="2222286"/>
+            <a:ext cx="8661551" cy="4492045"/>
+          </a:xfrm>
+          <a:prstGeom prst="rect">
+            <a:avLst/>
+          </a:prstGeom>
+        </p:spPr>
+      </p:pic>
+    </p:spTree>
+    <p:extLst>
+      <p:ext uri="{BB962C8B-B14F-4D97-AF65-F5344CB8AC3E}">
+        <p14:creationId xmlns:p14="http://schemas.microsoft.com/office/powerpoint/2010/main" val="3830281041"/>
+      </p:ext>
+    </p:extLst>
+  </p:cSld>
+  <p:clrMapOvr>
+    <a:masterClrMapping/>
+  </p:clrMapOvr>
+</p:sld>
+</file>
+
+<file path=ppt/slides/slide15.xml><?xml version="1.0" encoding="utf-8"?>
+<p:sld xmlns:a="http://schemas.openxmlformats.org/drawingml/2006/main" xmlns:r="http://schemas.openxmlformats.org/officeDocument/2006/relationships" xmlns:p="http://schemas.openxmlformats.org/presentationml/2006/main">
+  <p:cSld>
+    <p:spTree>
+      <p:nvGrpSpPr>
+        <p:cNvPr id="1" name=""/>
+        <p:cNvGrpSpPr/>
+        <p:nvPr/>
+      </p:nvGrpSpPr>
+      <p:grpSpPr>
+        <a:xfrm>
+          <a:off x="0" y="0"/>
+          <a:ext cx="0" cy="0"/>
+          <a:chOff x="0" y="0"/>
+          <a:chExt cx="0" cy="0"/>
+        </a:xfrm>
+      </p:grpSpPr>
+      <p:sp>
+        <p:nvSpPr>
           <p:cNvPr id="2" name="Title 1">
             <a:extLst>
               <a:ext uri="{FF2B5EF4-FFF2-40B4-BE49-F238E27FC236}">
-                <a16:creationId xmlns:a16="http://schemas.microsoft.com/office/drawing/2014/main" id="{4D26C1FD-D049-416D-9C47-E3F3500B7FBE}"/>
+                <a16:creationId xmlns:a16="http://schemas.microsoft.com/office/drawing/2014/main" id="{D5B3B675-DFDC-4B31-AD37-48232641A740}"/>
               </a:ext>
             </a:extLst>
           </p:cNvPr>
@@ -27367,10 +27841,9 @@
           <a:lstStyle/>
           <a:p>
             <a:r>
-              <a:rPr lang="en-US"/>
-              <a:t>Miscellaneous</a:t>
-            </a:r>
-            <a:endParaRPr lang="en-US" dirty="0"/>
+              <a:rPr lang="en-US" dirty="0"/>
+              <a:t>Service End Points :: Façade Pattern</a:t>
+            </a:r>
           </a:p>
         </p:txBody>
       </p:sp>
@@ -27379,7 +27852,7 @@
           <p:cNvPr id="3" name="Content Placeholder 2">
             <a:extLst>
               <a:ext uri="{FF2B5EF4-FFF2-40B4-BE49-F238E27FC236}">
-                <a16:creationId xmlns:a16="http://schemas.microsoft.com/office/drawing/2014/main" id="{E6782E6C-3EEC-49F3-B248-5C89306E3EEB}"/>
+                <a16:creationId xmlns:a16="http://schemas.microsoft.com/office/drawing/2014/main" id="{BA948533-938B-4FD7-9D96-6458BADD4F6C}"/>
               </a:ext>
             </a:extLst>
           </p:cNvPr>
@@ -27396,18 +27869,31 @@
           <a:lstStyle/>
           <a:p>
             <a:r>
-              <a:rPr lang="en-US"/>
-              <a:t>“Good programmers write good code. Great programmers steal.” - Unknown</a:t>
-            </a:r>
-          </a:p>
-          <a:p>
-            <a:pPr lvl="1"/>
-            <a:r>
-              <a:rPr lang="en-US"/>
-              <a:t>Learn, Use, Copy, Borrow, and/or Steal.</a:t>
-            </a:r>
-          </a:p>
-          <a:p>
+              <a:rPr lang="en-US" dirty="0"/>
+              <a:t>Definition: A single class that represents an entire subsystem.</a:t>
+            </a:r>
+          </a:p>
+          <a:p>
+            <a:r>
+              <a:rPr lang="en-US" dirty="0"/>
+              <a:t>Useful in API design</a:t>
+            </a:r>
+          </a:p>
+          <a:p>
+            <a:r>
+              <a:rPr lang="en-US" dirty="0"/>
+              <a:t>Useful in Service Oriented Architectures (SOA)</a:t>
+            </a:r>
+          </a:p>
+          <a:p>
+            <a:r>
+              <a:rPr lang="en-US" dirty="0"/>
+              <a:t>Typically implements an </a:t>
+            </a:r>
+            <a:r>
+              <a:rPr lang="en-US" i="1" dirty="0"/>
+              <a:t>Interface</a:t>
+            </a:r>
             <a:endParaRPr lang="en-US" dirty="0"/>
           </a:p>
         </p:txBody>
@@ -27415,7 +27901,639 @@
     </p:spTree>
     <p:extLst>
       <p:ext uri="{BB962C8B-B14F-4D97-AF65-F5344CB8AC3E}">
-        <p14:creationId xmlns:p14="http://schemas.microsoft.com/office/powerpoint/2010/main" val="1613193946"/>
+        <p14:creationId xmlns:p14="http://schemas.microsoft.com/office/powerpoint/2010/main" val="1957383248"/>
+      </p:ext>
+    </p:extLst>
+  </p:cSld>
+  <p:clrMapOvr>
+    <a:masterClrMapping/>
+  </p:clrMapOvr>
+</p:sld>
+</file>
+
+<file path=ppt/slides/slide16.xml><?xml version="1.0" encoding="utf-8"?>
+<p:sld xmlns:a="http://schemas.openxmlformats.org/drawingml/2006/main" xmlns:r="http://schemas.openxmlformats.org/officeDocument/2006/relationships" xmlns:p="http://schemas.openxmlformats.org/presentationml/2006/main">
+  <p:cSld>
+    <p:spTree>
+      <p:nvGrpSpPr>
+        <p:cNvPr id="1" name=""/>
+        <p:cNvGrpSpPr/>
+        <p:nvPr/>
+      </p:nvGrpSpPr>
+      <p:grpSpPr>
+        <a:xfrm>
+          <a:off x="0" y="0"/>
+          <a:ext cx="0" cy="0"/>
+          <a:chOff x="0" y="0"/>
+          <a:chExt cx="0" cy="0"/>
+        </a:xfrm>
+      </p:grpSpPr>
+      <p:sp>
+        <p:nvSpPr>
+          <p:cNvPr id="2" name="Title 1">
+            <a:extLst>
+              <a:ext uri="{FF2B5EF4-FFF2-40B4-BE49-F238E27FC236}">
+                <a16:creationId xmlns:a16="http://schemas.microsoft.com/office/drawing/2014/main" id="{50404187-2787-44DD-962D-631946531F8B}"/>
+              </a:ext>
+            </a:extLst>
+          </p:cNvPr>
+          <p:cNvSpPr>
+            <a:spLocks noGrp="1"/>
+          </p:cNvSpPr>
+          <p:nvPr>
+            <p:ph type="title"/>
+          </p:nvPr>
+        </p:nvSpPr>
+        <p:spPr/>
+        <p:txBody>
+          <a:bodyPr/>
+          <a:lstStyle/>
+          <a:p>
+            <a:r>
+              <a:rPr lang="en-US" dirty="0"/>
+              <a:t>Business Logic Concerns</a:t>
+            </a:r>
+          </a:p>
+        </p:txBody>
+      </p:sp>
+      <p:sp>
+        <p:nvSpPr>
+          <p:cNvPr id="3" name="Content Placeholder 2">
+            <a:extLst>
+              <a:ext uri="{FF2B5EF4-FFF2-40B4-BE49-F238E27FC236}">
+                <a16:creationId xmlns:a16="http://schemas.microsoft.com/office/drawing/2014/main" id="{44BE3E2E-76CE-4CE6-8F68-636DFEB688C9}"/>
+              </a:ext>
+            </a:extLst>
+          </p:cNvPr>
+          <p:cNvSpPr>
+            <a:spLocks noGrp="1"/>
+          </p:cNvSpPr>
+          <p:nvPr>
+            <p:ph idx="1"/>
+          </p:nvPr>
+        </p:nvSpPr>
+        <p:spPr/>
+        <p:txBody>
+          <a:bodyPr/>
+          <a:lstStyle/>
+          <a:p>
+            <a:r>
+              <a:rPr lang="en-US" dirty="0"/>
+              <a:t>Authorization</a:t>
+            </a:r>
+          </a:p>
+          <a:p>
+            <a:r>
+              <a:rPr lang="en-US" dirty="0"/>
+              <a:t>Business Logic</a:t>
+            </a:r>
+          </a:p>
+          <a:p>
+            <a:r>
+              <a:rPr lang="en-US" dirty="0"/>
+              <a:t>Data Input Validation</a:t>
+            </a:r>
+          </a:p>
+          <a:p>
+            <a:r>
+              <a:rPr lang="en-US" dirty="0"/>
+              <a:t>Business Rule Implementation</a:t>
+            </a:r>
+          </a:p>
+          <a:p>
+            <a:r>
+              <a:rPr lang="en-US" dirty="0"/>
+              <a:t>Using Repositories to retrieve and persist data</a:t>
+            </a:r>
+          </a:p>
+        </p:txBody>
+      </p:sp>
+    </p:spTree>
+    <p:extLst>
+      <p:ext uri="{BB962C8B-B14F-4D97-AF65-F5344CB8AC3E}">
+        <p14:creationId xmlns:p14="http://schemas.microsoft.com/office/powerpoint/2010/main" val="3640983610"/>
+      </p:ext>
+    </p:extLst>
+  </p:cSld>
+  <p:clrMapOvr>
+    <a:masterClrMapping/>
+  </p:clrMapOvr>
+</p:sld>
+</file>
+
+<file path=ppt/slides/slide17.xml><?xml version="1.0" encoding="utf-8"?>
+<p:sld xmlns:a="http://schemas.openxmlformats.org/drawingml/2006/main" xmlns:r="http://schemas.openxmlformats.org/officeDocument/2006/relationships" xmlns:p="http://schemas.openxmlformats.org/presentationml/2006/main">
+  <p:cSld>
+    <p:spTree>
+      <p:nvGrpSpPr>
+        <p:cNvPr id="1" name=""/>
+        <p:cNvGrpSpPr/>
+        <p:nvPr/>
+      </p:nvGrpSpPr>
+      <p:grpSpPr>
+        <a:xfrm>
+          <a:off x="0" y="0"/>
+          <a:ext cx="0" cy="0"/>
+          <a:chOff x="0" y="0"/>
+          <a:chExt cx="0" cy="0"/>
+        </a:xfrm>
+      </p:grpSpPr>
+      <p:sp>
+        <p:nvSpPr>
+          <p:cNvPr id="2" name="Title 1">
+            <a:extLst>
+              <a:ext uri="{FF2B5EF4-FFF2-40B4-BE49-F238E27FC236}">
+                <a16:creationId xmlns:a16="http://schemas.microsoft.com/office/drawing/2014/main" id="{CE638E4E-54DB-4630-A30A-81AF4520E5D3}"/>
+              </a:ext>
+            </a:extLst>
+          </p:cNvPr>
+          <p:cNvSpPr>
+            <a:spLocks noGrp="1"/>
+          </p:cNvSpPr>
+          <p:nvPr>
+            <p:ph type="title"/>
+          </p:nvPr>
+        </p:nvSpPr>
+        <p:spPr/>
+        <p:txBody>
+          <a:bodyPr/>
+          <a:lstStyle/>
+          <a:p>
+            <a:r>
+              <a:rPr lang="en-US" dirty="0"/>
+              <a:t>How can we implement business logic?</a:t>
+            </a:r>
+          </a:p>
+        </p:txBody>
+      </p:sp>
+      <p:sp>
+        <p:nvSpPr>
+          <p:cNvPr id="3" name="Content Placeholder 2">
+            <a:extLst>
+              <a:ext uri="{FF2B5EF4-FFF2-40B4-BE49-F238E27FC236}">
+                <a16:creationId xmlns:a16="http://schemas.microsoft.com/office/drawing/2014/main" id="{66928051-1A7D-475C-9E98-25EE74D6BA30}"/>
+              </a:ext>
+            </a:extLst>
+          </p:cNvPr>
+          <p:cNvSpPr>
+            <a:spLocks noGrp="1"/>
+          </p:cNvSpPr>
+          <p:nvPr>
+            <p:ph idx="1"/>
+          </p:nvPr>
+        </p:nvSpPr>
+        <p:spPr/>
+        <p:txBody>
+          <a:bodyPr/>
+          <a:lstStyle/>
+          <a:p>
+            <a:r>
+              <a:rPr lang="en-US" dirty="0"/>
+              <a:t>Goals:</a:t>
+            </a:r>
+          </a:p>
+          <a:p>
+            <a:pPr lvl="1"/>
+            <a:r>
+              <a:rPr lang="en-US" dirty="0"/>
+              <a:t>Consistent</a:t>
+            </a:r>
+          </a:p>
+          <a:p>
+            <a:pPr lvl="1"/>
+            <a:r>
+              <a:rPr lang="en-US" dirty="0"/>
+              <a:t>Maintainable</a:t>
+            </a:r>
+          </a:p>
+          <a:p>
+            <a:pPr lvl="1"/>
+            <a:r>
+              <a:rPr lang="en-US" dirty="0"/>
+              <a:t>Testable</a:t>
+            </a:r>
+          </a:p>
+          <a:p>
+            <a:pPr lvl="1"/>
+            <a:r>
+              <a:rPr lang="en-US" dirty="0"/>
+              <a:t>Extensible</a:t>
+            </a:r>
+          </a:p>
+          <a:p>
+            <a:pPr lvl="1"/>
+            <a:r>
+              <a:rPr lang="en-US" dirty="0"/>
+              <a:t>High Quality</a:t>
+            </a:r>
+          </a:p>
+          <a:p>
+            <a:r>
+              <a:rPr lang="en-US" dirty="0"/>
+              <a:t>How can we achieve this? </a:t>
+            </a:r>
+          </a:p>
+        </p:txBody>
+      </p:sp>
+    </p:spTree>
+    <p:extLst>
+      <p:ext uri="{BB962C8B-B14F-4D97-AF65-F5344CB8AC3E}">
+        <p14:creationId xmlns:p14="http://schemas.microsoft.com/office/powerpoint/2010/main" val="90553821"/>
+      </p:ext>
+    </p:extLst>
+  </p:cSld>
+  <p:clrMapOvr>
+    <a:masterClrMapping/>
+  </p:clrMapOvr>
+</p:sld>
+</file>
+
+<file path=ppt/slides/slide18.xml><?xml version="1.0" encoding="utf-8"?>
+<p:sld xmlns:a="http://schemas.openxmlformats.org/drawingml/2006/main" xmlns:r="http://schemas.openxmlformats.org/officeDocument/2006/relationships" xmlns:p="http://schemas.openxmlformats.org/presentationml/2006/main">
+  <p:cSld>
+    <p:spTree>
+      <p:nvGrpSpPr>
+        <p:cNvPr id="1" name=""/>
+        <p:cNvGrpSpPr/>
+        <p:nvPr/>
+      </p:nvGrpSpPr>
+      <p:grpSpPr>
+        <a:xfrm>
+          <a:off x="0" y="0"/>
+          <a:ext cx="0" cy="0"/>
+          <a:chOff x="0" y="0"/>
+          <a:chExt cx="0" cy="0"/>
+        </a:xfrm>
+      </p:grpSpPr>
+      <p:sp>
+        <p:nvSpPr>
+          <p:cNvPr id="2" name="Title 1">
+            <a:extLst>
+              <a:ext uri="{FF2B5EF4-FFF2-40B4-BE49-F238E27FC236}">
+                <a16:creationId xmlns:a16="http://schemas.microsoft.com/office/drawing/2014/main" id="{3D57BA2C-1B3C-4C28-BBF4-26D91C9A8F3C}"/>
+              </a:ext>
+            </a:extLst>
+          </p:cNvPr>
+          <p:cNvSpPr>
+            <a:spLocks noGrp="1"/>
+          </p:cNvSpPr>
+          <p:nvPr>
+            <p:ph type="title"/>
+          </p:nvPr>
+        </p:nvSpPr>
+        <p:spPr/>
+        <p:txBody>
+          <a:bodyPr/>
+          <a:lstStyle/>
+          <a:p>
+            <a:r>
+              <a:rPr lang="en-US" dirty="0"/>
+              <a:t>Elevate Your Business Logic</a:t>
+            </a:r>
+          </a:p>
+        </p:txBody>
+      </p:sp>
+      <p:sp>
+        <p:nvSpPr>
+          <p:cNvPr id="3" name="Content Placeholder 2">
+            <a:extLst>
+              <a:ext uri="{FF2B5EF4-FFF2-40B4-BE49-F238E27FC236}">
+                <a16:creationId xmlns:a16="http://schemas.microsoft.com/office/drawing/2014/main" id="{D9F7E00B-AD2A-4935-9D93-5AEB32283487}"/>
+              </a:ext>
+            </a:extLst>
+          </p:cNvPr>
+          <p:cNvSpPr>
+            <a:spLocks noGrp="1"/>
+          </p:cNvSpPr>
+          <p:nvPr>
+            <p:ph idx="1"/>
+          </p:nvPr>
+        </p:nvSpPr>
+        <p:spPr/>
+        <p:txBody>
+          <a:bodyPr>
+            <a:normAutofit lnSpcReduction="10000"/>
+          </a:bodyPr>
+          <a:lstStyle/>
+          <a:p>
+            <a:r>
+              <a:rPr lang="en-US" dirty="0"/>
+              <a:t>Stop the Method Madness</a:t>
+            </a:r>
+          </a:p>
+          <a:p>
+            <a:pPr lvl="1"/>
+            <a:r>
+              <a:rPr lang="en-US" dirty="0"/>
+              <a:t>Use classes to implement your business logic.</a:t>
+            </a:r>
+          </a:p>
+          <a:p>
+            <a:pPr lvl="1"/>
+            <a:r>
+              <a:rPr lang="en-US" dirty="0"/>
+              <a:t>A single class with a single responsibility, a single unit of work.</a:t>
+            </a:r>
+          </a:p>
+          <a:p>
+            <a:pPr lvl="1"/>
+            <a:r>
+              <a:rPr lang="en-US" dirty="0"/>
+              <a:t>This is not the typical Manager class with a bunch of methods chained together.</a:t>
+            </a:r>
+          </a:p>
+          <a:p>
+            <a:r>
+              <a:rPr lang="en-US" dirty="0"/>
+              <a:t>Class Advantage</a:t>
+            </a:r>
+          </a:p>
+          <a:p>
+            <a:pPr lvl="1"/>
+            <a:r>
+              <a:rPr lang="en-US" dirty="0"/>
+              <a:t>Can use one or more </a:t>
+            </a:r>
+            <a:r>
+              <a:rPr lang="en-US" dirty="0">
+                <a:latin typeface="Source Code Pro Light" panose="020B0409030403020204" pitchFamily="49" charset="0"/>
+                <a:ea typeface="Source Code Pro Light" panose="020B0409030403020204" pitchFamily="49" charset="0"/>
+              </a:rPr>
+              <a:t>Constructors</a:t>
+            </a:r>
+            <a:r>
+              <a:rPr lang="en-US" dirty="0"/>
+              <a:t>.</a:t>
+            </a:r>
+          </a:p>
+          <a:p>
+            <a:pPr lvl="1"/>
+            <a:r>
+              <a:rPr lang="en-US" dirty="0"/>
+              <a:t>Can have base classes - </a:t>
+            </a:r>
+            <a:r>
+              <a:rPr lang="en-US" dirty="0">
+                <a:latin typeface="Source Code Pro Light" panose="020B0409030403020204" pitchFamily="49" charset="0"/>
+                <a:ea typeface="Source Code Pro Light" panose="020B0409030403020204" pitchFamily="49" charset="0"/>
+              </a:rPr>
+              <a:t>Inheritance</a:t>
+            </a:r>
+            <a:r>
+              <a:rPr lang="en-US" dirty="0"/>
+              <a:t>.</a:t>
+            </a:r>
+          </a:p>
+          <a:p>
+            <a:pPr lvl="1"/>
+            <a:r>
+              <a:rPr lang="en-US" dirty="0"/>
+              <a:t>Can implement an </a:t>
+            </a:r>
+            <a:r>
+              <a:rPr lang="en-US" dirty="0">
+                <a:latin typeface="Source Code Pro Light" panose="020B0409030403020204" pitchFamily="49" charset="0"/>
+                <a:ea typeface="Source Code Pro Light" panose="020B0409030403020204" pitchFamily="49" charset="0"/>
+              </a:rPr>
+              <a:t>Interface</a:t>
+            </a:r>
+            <a:r>
+              <a:rPr lang="en-US" dirty="0"/>
+              <a:t>.</a:t>
+            </a:r>
+          </a:p>
+          <a:p>
+            <a:pPr lvl="1"/>
+            <a:r>
+              <a:rPr lang="en-US" dirty="0"/>
+              <a:t>Can expose typed </a:t>
+            </a:r>
+            <a:r>
+              <a:rPr lang="en-US" dirty="0">
+                <a:latin typeface="Source Code Pro Light" panose="020B0409030403020204" pitchFamily="49" charset="0"/>
+                <a:ea typeface="Source Code Pro Light" panose="020B0409030403020204" pitchFamily="49" charset="0"/>
+              </a:rPr>
+              <a:t>Properties</a:t>
+            </a:r>
+            <a:r>
+              <a:rPr lang="en-US" dirty="0"/>
+              <a:t>.</a:t>
+            </a:r>
+          </a:p>
+          <a:p>
+            <a:pPr lvl="1"/>
+            <a:r>
+              <a:rPr lang="en-US" dirty="0"/>
+              <a:t>Can encapsulate members using </a:t>
+            </a:r>
+            <a:r>
+              <a:rPr lang="en-US" dirty="0">
+                <a:latin typeface="Source Code Pro Light" panose="020B0409030403020204" pitchFamily="49" charset="0"/>
+                <a:ea typeface="Source Code Pro Light" panose="020B0409030403020204" pitchFamily="49" charset="0"/>
+              </a:rPr>
+              <a:t>private</a:t>
+            </a:r>
+            <a:r>
+              <a:rPr lang="en-US" dirty="0"/>
+              <a:t>.</a:t>
+            </a:r>
+          </a:p>
+          <a:p>
+            <a:pPr lvl="1"/>
+            <a:endParaRPr lang="en-US" dirty="0"/>
+          </a:p>
+        </p:txBody>
+      </p:sp>
+    </p:spTree>
+    <p:extLst>
+      <p:ext uri="{BB962C8B-B14F-4D97-AF65-F5344CB8AC3E}">
+        <p14:creationId xmlns:p14="http://schemas.microsoft.com/office/powerpoint/2010/main" val="2589925573"/>
+      </p:ext>
+    </p:extLst>
+  </p:cSld>
+  <p:clrMapOvr>
+    <a:masterClrMapping/>
+  </p:clrMapOvr>
+</p:sld>
+</file>
+
+<file path=ppt/slides/slide19.xml><?xml version="1.0" encoding="utf-8"?>
+<p:sld xmlns:a="http://schemas.openxmlformats.org/drawingml/2006/main" xmlns:r="http://schemas.openxmlformats.org/officeDocument/2006/relationships" xmlns:p="http://schemas.openxmlformats.org/presentationml/2006/main">
+  <p:cSld>
+    <p:spTree>
+      <p:nvGrpSpPr>
+        <p:cNvPr id="1" name=""/>
+        <p:cNvGrpSpPr/>
+        <p:nvPr/>
+      </p:nvGrpSpPr>
+      <p:grpSpPr>
+        <a:xfrm>
+          <a:off x="0" y="0"/>
+          <a:ext cx="0" cy="0"/>
+          <a:chOff x="0" y="0"/>
+          <a:chExt cx="0" cy="0"/>
+        </a:xfrm>
+      </p:grpSpPr>
+      <p:sp>
+        <p:nvSpPr>
+          <p:cNvPr id="2" name="Title 1">
+            <a:extLst>
+              <a:ext uri="{FF2B5EF4-FFF2-40B4-BE49-F238E27FC236}">
+                <a16:creationId xmlns:a16="http://schemas.microsoft.com/office/drawing/2014/main" id="{3870FFA2-0D63-42F1-818E-025A62D80C80}"/>
+              </a:ext>
+            </a:extLst>
+          </p:cNvPr>
+          <p:cNvSpPr>
+            <a:spLocks noGrp="1"/>
+          </p:cNvSpPr>
+          <p:nvPr>
+            <p:ph type="title"/>
+          </p:nvPr>
+        </p:nvSpPr>
+        <p:spPr/>
+        <p:txBody>
+          <a:bodyPr/>
+          <a:lstStyle/>
+          <a:p>
+            <a:r>
+              <a:rPr lang="en-US" dirty="0"/>
+              <a:t>Template Method Pattern</a:t>
+            </a:r>
+          </a:p>
+        </p:txBody>
+      </p:sp>
+      <p:sp>
+        <p:nvSpPr>
+          <p:cNvPr id="3" name="Content Placeholder 2">
+            <a:extLst>
+              <a:ext uri="{FF2B5EF4-FFF2-40B4-BE49-F238E27FC236}">
+                <a16:creationId xmlns:a16="http://schemas.microsoft.com/office/drawing/2014/main" id="{123C8FF3-B8F9-4BD6-A517-8DEA0AC6853F}"/>
+              </a:ext>
+            </a:extLst>
+          </p:cNvPr>
+          <p:cNvSpPr>
+            <a:spLocks noGrp="1"/>
+          </p:cNvSpPr>
+          <p:nvPr>
+            <p:ph idx="1"/>
+          </p:nvPr>
+        </p:nvSpPr>
+        <p:spPr/>
+        <p:txBody>
+          <a:bodyPr/>
+          <a:lstStyle/>
+          <a:p>
+            <a:r>
+              <a:rPr lang="en-US" dirty="0"/>
+              <a:t>Where have you seen this one?</a:t>
+            </a:r>
+          </a:p>
+          <a:p>
+            <a:pPr lvl="1"/>
+            <a:r>
+              <a:rPr lang="en-US" dirty="0"/>
+              <a:t>ASP.NET Forms circa 2001: </a:t>
+            </a:r>
+            <a:r>
+              <a:rPr lang="en-US" dirty="0" err="1"/>
+              <a:t>PreInit</a:t>
+            </a:r>
+            <a:r>
+              <a:rPr lang="en-US" dirty="0"/>
+              <a:t>, </a:t>
+            </a:r>
+            <a:r>
+              <a:rPr lang="en-US" dirty="0" err="1"/>
+              <a:t>Init</a:t>
+            </a:r>
+            <a:r>
+              <a:rPr lang="en-US" dirty="0"/>
+              <a:t>, </a:t>
+            </a:r>
+            <a:r>
+              <a:rPr lang="en-US" dirty="0" err="1"/>
+              <a:t>InitComplete</a:t>
+            </a:r>
+            <a:r>
+              <a:rPr lang="en-US" dirty="0"/>
+              <a:t>, </a:t>
+            </a:r>
+            <a:r>
+              <a:rPr lang="en-US" dirty="0" err="1"/>
+              <a:t>PreLoad</a:t>
+            </a:r>
+            <a:r>
+              <a:rPr lang="en-US" dirty="0"/>
+              <a:t>, Load, </a:t>
+            </a:r>
+            <a:r>
+              <a:rPr lang="en-US" dirty="0" err="1"/>
+              <a:t>LoadComplete</a:t>
+            </a:r>
+            <a:r>
+              <a:rPr lang="en-US" dirty="0"/>
+              <a:t>, </a:t>
+            </a:r>
+            <a:r>
+              <a:rPr lang="en-US" dirty="0" err="1"/>
+              <a:t>PreRender</a:t>
+            </a:r>
+            <a:r>
+              <a:rPr lang="en-US" dirty="0"/>
+              <a:t>, etc.</a:t>
+            </a:r>
+          </a:p>
+          <a:p>
+            <a:pPr lvl="1"/>
+            <a:r>
+              <a:rPr lang="en-US" dirty="0"/>
+              <a:t>Angular 2: </a:t>
+            </a:r>
+            <a:r>
+              <a:rPr lang="en-US" dirty="0" err="1"/>
+              <a:t>ngOnChanges</a:t>
+            </a:r>
+            <a:r>
+              <a:rPr lang="en-US" dirty="0"/>
+              <a:t>, </a:t>
+            </a:r>
+            <a:r>
+              <a:rPr lang="en-US" dirty="0" err="1"/>
+              <a:t>ngOnit</a:t>
+            </a:r>
+            <a:r>
+              <a:rPr lang="en-US" dirty="0"/>
+              <a:t>, </a:t>
+            </a:r>
+            <a:r>
+              <a:rPr lang="en-US" dirty="0" err="1"/>
+              <a:t>ngDoCheck</a:t>
+            </a:r>
+            <a:r>
+              <a:rPr lang="en-US" dirty="0"/>
+              <a:t>, </a:t>
+            </a:r>
+            <a:r>
+              <a:rPr lang="en-US" dirty="0" err="1"/>
+              <a:t>ngOnDestroy</a:t>
+            </a:r>
+            <a:endParaRPr lang="en-US" dirty="0"/>
+          </a:p>
+          <a:p>
+            <a:r>
+              <a:rPr lang="en-US" dirty="0"/>
+              <a:t>If it is good enough for managing components and web forms with millions of different implementations – but, all using the same algorithm.</a:t>
+            </a:r>
+          </a:p>
+          <a:p>
+            <a:endParaRPr lang="en-US" dirty="0"/>
+          </a:p>
+        </p:txBody>
+      </p:sp>
+    </p:spTree>
+    <p:extLst>
+      <p:ext uri="{BB962C8B-B14F-4D97-AF65-F5344CB8AC3E}">
+        <p14:creationId xmlns:p14="http://schemas.microsoft.com/office/powerpoint/2010/main" val="448475438"/>
       </p:ext>
     </p:extLst>
   </p:cSld>
@@ -27570,6 +28688,553 @@
     <p:extLst>
       <p:ext uri="{BB962C8B-B14F-4D97-AF65-F5344CB8AC3E}">
         <p14:creationId xmlns:p14="http://schemas.microsoft.com/office/powerpoint/2010/main" val="411051127"/>
+      </p:ext>
+    </p:extLst>
+  </p:cSld>
+  <p:clrMapOvr>
+    <a:masterClrMapping/>
+  </p:clrMapOvr>
+</p:sld>
+</file>
+
+<file path=ppt/slides/slide20.xml><?xml version="1.0" encoding="utf-8"?>
+<p:sld xmlns:a="http://schemas.openxmlformats.org/drawingml/2006/main" xmlns:r="http://schemas.openxmlformats.org/officeDocument/2006/relationships" xmlns:p="http://schemas.openxmlformats.org/presentationml/2006/main">
+  <p:cSld>
+    <p:spTree>
+      <p:nvGrpSpPr>
+        <p:cNvPr id="1" name=""/>
+        <p:cNvGrpSpPr/>
+        <p:nvPr/>
+      </p:nvGrpSpPr>
+      <p:grpSpPr>
+        <a:xfrm>
+          <a:off x="0" y="0"/>
+          <a:ext cx="0" cy="0"/>
+          <a:chOff x="0" y="0"/>
+          <a:chExt cx="0" cy="0"/>
+        </a:xfrm>
+      </p:grpSpPr>
+      <p:sp>
+        <p:nvSpPr>
+          <p:cNvPr id="2" name="Title 1">
+            <a:extLst>
+              <a:ext uri="{FF2B5EF4-FFF2-40B4-BE49-F238E27FC236}">
+                <a16:creationId xmlns:a16="http://schemas.microsoft.com/office/drawing/2014/main" id="{FA1BCB59-0789-48A4-8783-E209DA86CB32}"/>
+              </a:ext>
+            </a:extLst>
+          </p:cNvPr>
+          <p:cNvSpPr>
+            <a:spLocks noGrp="1"/>
+          </p:cNvSpPr>
+          <p:nvPr>
+            <p:ph type="title"/>
+          </p:nvPr>
+        </p:nvSpPr>
+        <p:spPr/>
+        <p:txBody>
+          <a:bodyPr/>
+          <a:lstStyle/>
+          <a:p>
+            <a:r>
+              <a:rPr lang="en-US" dirty="0"/>
+              <a:t>Template Method Pattern :: Details</a:t>
+            </a:r>
+          </a:p>
+        </p:txBody>
+      </p:sp>
+      <p:sp>
+        <p:nvSpPr>
+          <p:cNvPr id="3" name="Content Placeholder 2">
+            <a:extLst>
+              <a:ext uri="{FF2B5EF4-FFF2-40B4-BE49-F238E27FC236}">
+                <a16:creationId xmlns:a16="http://schemas.microsoft.com/office/drawing/2014/main" id="{A01FBAB8-C7B4-43CB-89BE-BEACC68BD6FE}"/>
+              </a:ext>
+            </a:extLst>
+          </p:cNvPr>
+          <p:cNvSpPr>
+            <a:spLocks noGrp="1"/>
+          </p:cNvSpPr>
+          <p:nvPr>
+            <p:ph idx="1"/>
+          </p:nvPr>
+        </p:nvSpPr>
+        <p:spPr/>
+        <p:txBody>
+          <a:bodyPr/>
+          <a:lstStyle/>
+          <a:p>
+            <a:r>
+              <a:rPr lang="en-US" b="1" dirty="0"/>
+              <a:t>Definition</a:t>
+            </a:r>
+            <a:r>
+              <a:rPr lang="en-US" dirty="0"/>
+              <a:t>: defines an algorithm (i.e., pipeline of methods and/or events) that can be implemented with concrete classes without changing the structure of the algorithm.</a:t>
+            </a:r>
+          </a:p>
+          <a:p>
+            <a:r>
+              <a:rPr lang="en-US" dirty="0"/>
+              <a:t>Creates a consistent well-defined flow – that also enables default or shared behaviors to be implemented for all implementing classes.</a:t>
+            </a:r>
+          </a:p>
+          <a:p>
+            <a:r>
+              <a:rPr lang="en-US" dirty="0"/>
+              <a:t>Allows for customized implementations of pipeline items within the algorithm.</a:t>
+            </a:r>
+          </a:p>
+          <a:p>
+            <a:r>
+              <a:rPr lang="en-US" dirty="0"/>
+              <a:t>Allows for extensibility end points without disturbing the structure of the algorithm.</a:t>
+            </a:r>
+          </a:p>
+          <a:p>
+            <a:r>
+              <a:rPr lang="en-US" dirty="0"/>
+              <a:t>Simplifies the target concrete implementation by allowing other non-essential details to be handled by the base/abstract classes that define and implement the template algorithm.</a:t>
+            </a:r>
+          </a:p>
+        </p:txBody>
+      </p:sp>
+    </p:spTree>
+    <p:extLst>
+      <p:ext uri="{BB962C8B-B14F-4D97-AF65-F5344CB8AC3E}">
+        <p14:creationId xmlns:p14="http://schemas.microsoft.com/office/powerpoint/2010/main" val="3371732980"/>
+      </p:ext>
+    </p:extLst>
+  </p:cSld>
+  <p:clrMapOvr>
+    <a:masterClrMapping/>
+  </p:clrMapOvr>
+</p:sld>
+</file>
+
+<file path=ppt/slides/slide21.xml><?xml version="1.0" encoding="utf-8"?>
+<p:sld xmlns:a="http://schemas.openxmlformats.org/drawingml/2006/main" xmlns:r="http://schemas.openxmlformats.org/officeDocument/2006/relationships" xmlns:p="http://schemas.openxmlformats.org/presentationml/2006/main">
+  <p:cSld>
+    <p:spTree>
+      <p:nvGrpSpPr>
+        <p:cNvPr id="1" name=""/>
+        <p:cNvGrpSpPr/>
+        <p:nvPr/>
+      </p:nvGrpSpPr>
+      <p:grpSpPr>
+        <a:xfrm>
+          <a:off x="0" y="0"/>
+          <a:ext cx="0" cy="0"/>
+          <a:chOff x="0" y="0"/>
+          <a:chExt cx="0" cy="0"/>
+        </a:xfrm>
+      </p:grpSpPr>
+      <p:sp>
+        <p:nvSpPr>
+          <p:cNvPr id="2" name="Title 1">
+            <a:extLst>
+              <a:ext uri="{FF2B5EF4-FFF2-40B4-BE49-F238E27FC236}">
+                <a16:creationId xmlns:a16="http://schemas.microsoft.com/office/drawing/2014/main" id="{7D8AF8FB-793E-41BD-8CC5-A923B5A8209E}"/>
+              </a:ext>
+            </a:extLst>
+          </p:cNvPr>
+          <p:cNvSpPr>
+            <a:spLocks noGrp="1"/>
+          </p:cNvSpPr>
+          <p:nvPr>
+            <p:ph type="title"/>
+          </p:nvPr>
+        </p:nvSpPr>
+        <p:spPr/>
+        <p:txBody>
+          <a:bodyPr/>
+          <a:lstStyle/>
+          <a:p>
+            <a:r>
+              <a:rPr lang="en-US"/>
+              <a:t>Web References</a:t>
+            </a:r>
+            <a:endParaRPr lang="en-US" dirty="0"/>
+          </a:p>
+        </p:txBody>
+      </p:sp>
+      <p:sp>
+        <p:nvSpPr>
+          <p:cNvPr id="3" name="Content Placeholder 2">
+            <a:extLst>
+              <a:ext uri="{FF2B5EF4-FFF2-40B4-BE49-F238E27FC236}">
+                <a16:creationId xmlns:a16="http://schemas.microsoft.com/office/drawing/2014/main" id="{3975127B-114D-4B36-BA13-4EB6781A2CEB}"/>
+              </a:ext>
+            </a:extLst>
+          </p:cNvPr>
+          <p:cNvSpPr>
+            <a:spLocks noGrp="1"/>
+          </p:cNvSpPr>
+          <p:nvPr>
+            <p:ph idx="1"/>
+          </p:nvPr>
+        </p:nvSpPr>
+        <p:spPr/>
+        <p:txBody>
+          <a:bodyPr>
+            <a:normAutofit/>
+          </a:bodyPr>
+          <a:lstStyle/>
+          <a:p>
+            <a:r>
+              <a:rPr lang="en-US">
+                <a:hlinkClick r:id="rId2"/>
+              </a:rPr>
+              <a:t>GoF Design patterns in .NET/C#</a:t>
+            </a:r>
+            <a:endParaRPr lang="en-US"/>
+          </a:p>
+          <a:p>
+            <a:r>
+              <a:rPr lang="en-US">
+                <a:hlinkClick r:id="rId3"/>
+              </a:rPr>
+              <a:t>Design Patterns General</a:t>
+            </a:r>
+            <a:endParaRPr lang="en-US"/>
+          </a:p>
+          <a:p>
+            <a:pPr lvl="1"/>
+            <a:r>
+              <a:rPr lang="en-US">
+                <a:hlinkClick r:id="rId3"/>
+              </a:rPr>
+              <a:t>Creational</a:t>
+            </a:r>
+            <a:endParaRPr lang="en-US"/>
+          </a:p>
+          <a:p>
+            <a:pPr lvl="1"/>
+            <a:r>
+              <a:rPr lang="en-US">
+                <a:hlinkClick r:id="rId4"/>
+              </a:rPr>
+              <a:t>Structural</a:t>
+            </a:r>
+            <a:endParaRPr lang="en-US"/>
+          </a:p>
+          <a:p>
+            <a:pPr lvl="1"/>
+            <a:r>
+              <a:rPr lang="en-US">
+                <a:hlinkClick r:id="rId5"/>
+              </a:rPr>
+              <a:t>Behavioral</a:t>
+            </a:r>
+            <a:endParaRPr lang="en-US"/>
+          </a:p>
+          <a:p>
+            <a:r>
+              <a:rPr lang="en-US"/>
+              <a:t>Principles:</a:t>
+            </a:r>
+          </a:p>
+          <a:p>
+            <a:pPr lvl="1"/>
+            <a:r>
+              <a:rPr lang="en-US">
+                <a:hlinkClick r:id="rId6"/>
+              </a:rPr>
+              <a:t>Single Responsibility</a:t>
+            </a:r>
+            <a:endParaRPr lang="en-US"/>
+          </a:p>
+          <a:p>
+            <a:pPr lvl="1"/>
+            <a:r>
+              <a:rPr lang="en-US">
+                <a:hlinkClick r:id="rId7"/>
+              </a:rPr>
+              <a:t>Separation of Concerns</a:t>
+            </a:r>
+            <a:endParaRPr lang="en-US"/>
+          </a:p>
+          <a:p>
+            <a:pPr lvl="1"/>
+            <a:r>
+              <a:rPr lang="en-US">
+                <a:hlinkClick r:id="rId8"/>
+              </a:rPr>
+              <a:t>S.O.L.I.D Principles</a:t>
+            </a:r>
+            <a:endParaRPr lang="en-US"/>
+          </a:p>
+          <a:p>
+            <a:endParaRPr lang="en-US" dirty="0"/>
+          </a:p>
+        </p:txBody>
+      </p:sp>
+    </p:spTree>
+    <p:extLst>
+      <p:ext uri="{BB962C8B-B14F-4D97-AF65-F5344CB8AC3E}">
+        <p14:creationId xmlns:p14="http://schemas.microsoft.com/office/powerpoint/2010/main" val="1961233773"/>
+      </p:ext>
+    </p:extLst>
+  </p:cSld>
+  <p:clrMapOvr>
+    <a:masterClrMapping/>
+  </p:clrMapOvr>
+</p:sld>
+</file>
+
+<file path=ppt/slides/slide22.xml><?xml version="1.0" encoding="utf-8"?>
+<p:sld xmlns:a="http://schemas.openxmlformats.org/drawingml/2006/main" xmlns:r="http://schemas.openxmlformats.org/officeDocument/2006/relationships" xmlns:p="http://schemas.openxmlformats.org/presentationml/2006/main">
+  <p:cSld>
+    <p:spTree>
+      <p:nvGrpSpPr>
+        <p:cNvPr id="1" name=""/>
+        <p:cNvGrpSpPr/>
+        <p:nvPr/>
+      </p:nvGrpSpPr>
+      <p:grpSpPr>
+        <a:xfrm>
+          <a:off x="0" y="0"/>
+          <a:ext cx="0" cy="0"/>
+          <a:chOff x="0" y="0"/>
+          <a:chExt cx="0" cy="0"/>
+        </a:xfrm>
+      </p:grpSpPr>
+      <p:sp>
+        <p:nvSpPr>
+          <p:cNvPr id="2" name="Title 1">
+            <a:extLst>
+              <a:ext uri="{FF2B5EF4-FFF2-40B4-BE49-F238E27FC236}">
+                <a16:creationId xmlns:a16="http://schemas.microsoft.com/office/drawing/2014/main" id="{7D8AF8FB-793E-41BD-8CC5-A923B5A8209E}"/>
+              </a:ext>
+            </a:extLst>
+          </p:cNvPr>
+          <p:cNvSpPr>
+            <a:spLocks noGrp="1"/>
+          </p:cNvSpPr>
+          <p:nvPr>
+            <p:ph type="title"/>
+          </p:nvPr>
+        </p:nvSpPr>
+        <p:spPr/>
+        <p:txBody>
+          <a:bodyPr/>
+          <a:lstStyle/>
+          <a:p>
+            <a:r>
+              <a:rPr lang="en-US"/>
+              <a:t>Book References</a:t>
+            </a:r>
+            <a:endParaRPr lang="en-US" dirty="0"/>
+          </a:p>
+        </p:txBody>
+      </p:sp>
+      <p:sp>
+        <p:nvSpPr>
+          <p:cNvPr id="3" name="Content Placeholder 2">
+            <a:extLst>
+              <a:ext uri="{FF2B5EF4-FFF2-40B4-BE49-F238E27FC236}">
+                <a16:creationId xmlns:a16="http://schemas.microsoft.com/office/drawing/2014/main" id="{3975127B-114D-4B36-BA13-4EB6781A2CEB}"/>
+              </a:ext>
+            </a:extLst>
+          </p:cNvPr>
+          <p:cNvSpPr>
+            <a:spLocks noGrp="1"/>
+          </p:cNvSpPr>
+          <p:nvPr>
+            <p:ph idx="1"/>
+          </p:nvPr>
+        </p:nvSpPr>
+        <p:spPr/>
+        <p:txBody>
+          <a:bodyPr>
+            <a:normAutofit fontScale="92500" lnSpcReduction="10000"/>
+          </a:bodyPr>
+          <a:lstStyle/>
+          <a:p>
+            <a:r>
+              <a:rPr lang="en-US">
+                <a:hlinkClick r:id="rId2"/>
+              </a:rPr>
+              <a:t>Design Patterns : Elements of Reusable Object-Oriented Software</a:t>
+            </a:r>
+            <a:endParaRPr lang="en-US"/>
+          </a:p>
+          <a:p>
+            <a:pPr lvl="1"/>
+            <a:r>
+              <a:rPr lang="en-US"/>
+              <a:t>ISBN-13: 978-0201633610, ISBN-10: 0201633612</a:t>
+            </a:r>
+          </a:p>
+          <a:p>
+            <a:r>
+              <a:rPr lang="en-US">
+                <a:hlinkClick r:id="rId3"/>
+              </a:rPr>
+              <a:t>Head First Design Patterns</a:t>
+            </a:r>
+            <a:endParaRPr lang="en-US"/>
+          </a:p>
+          <a:p>
+            <a:pPr lvl="1"/>
+            <a:r>
+              <a:rPr lang="en-US"/>
+              <a:t>ISBN-13: 978-0596007126, ISBN-10: 0596007124</a:t>
+            </a:r>
+          </a:p>
+          <a:p>
+            <a:r>
+              <a:rPr lang="en-US">
+                <a:hlinkClick r:id="rId4"/>
+              </a:rPr>
+              <a:t>Clean Code</a:t>
+            </a:r>
+            <a:endParaRPr lang="en-US"/>
+          </a:p>
+          <a:p>
+            <a:pPr lvl="1"/>
+            <a:r>
+              <a:rPr lang="en-US"/>
+              <a:t>ISBN-13: 978-0132350884, ISBN-10: 0132350882</a:t>
+            </a:r>
+          </a:p>
+          <a:p>
+            <a:r>
+              <a:rPr lang="en-US">
+                <a:hlinkClick r:id="rId5"/>
+              </a:rPr>
+              <a:t>The Pragmatic Programmer</a:t>
+            </a:r>
+            <a:endParaRPr lang="en-US"/>
+          </a:p>
+          <a:p>
+            <a:pPr lvl="1"/>
+            <a:r>
+              <a:rPr lang="en-US"/>
+              <a:t>ISBN-13: 978-0201616224, ISBN-10: 020161622X</a:t>
+            </a:r>
+          </a:p>
+          <a:p>
+            <a:r>
+              <a:rPr lang="en-US">
+                <a:hlinkClick r:id="rId6"/>
+              </a:rPr>
+              <a:t>Patterns of Enterprise Application Architecture</a:t>
+            </a:r>
+            <a:endParaRPr lang="en-US"/>
+          </a:p>
+          <a:p>
+            <a:pPr lvl="1"/>
+            <a:r>
+              <a:rPr lang="en-US"/>
+              <a:t>ISBN-13: 978-0321127426, ISBN-10: 0321127420</a:t>
+            </a:r>
+          </a:p>
+          <a:p>
+            <a:endParaRPr lang="en-US" dirty="0"/>
+          </a:p>
+        </p:txBody>
+      </p:sp>
+    </p:spTree>
+    <p:extLst>
+      <p:ext uri="{BB962C8B-B14F-4D97-AF65-F5344CB8AC3E}">
+        <p14:creationId xmlns:p14="http://schemas.microsoft.com/office/powerpoint/2010/main" val="214986796"/>
+      </p:ext>
+    </p:extLst>
+  </p:cSld>
+  <p:clrMapOvr>
+    <a:masterClrMapping/>
+  </p:clrMapOvr>
+</p:sld>
+</file>
+
+<file path=ppt/slides/slide23.xml><?xml version="1.0" encoding="utf-8"?>
+<p:sld xmlns:a="http://schemas.openxmlformats.org/drawingml/2006/main" xmlns:r="http://schemas.openxmlformats.org/officeDocument/2006/relationships" xmlns:p="http://schemas.openxmlformats.org/presentationml/2006/main">
+  <p:cSld>
+    <p:spTree>
+      <p:nvGrpSpPr>
+        <p:cNvPr id="1" name=""/>
+        <p:cNvGrpSpPr/>
+        <p:nvPr/>
+      </p:nvGrpSpPr>
+      <p:grpSpPr>
+        <a:xfrm>
+          <a:off x="0" y="0"/>
+          <a:ext cx="0" cy="0"/>
+          <a:chOff x="0" y="0"/>
+          <a:chExt cx="0" cy="0"/>
+        </a:xfrm>
+      </p:grpSpPr>
+      <p:sp>
+        <p:nvSpPr>
+          <p:cNvPr id="2" name="Title 1">
+            <a:extLst>
+              <a:ext uri="{FF2B5EF4-FFF2-40B4-BE49-F238E27FC236}">
+                <a16:creationId xmlns:a16="http://schemas.microsoft.com/office/drawing/2014/main" id="{4D26C1FD-D049-416D-9C47-E3F3500B7FBE}"/>
+              </a:ext>
+            </a:extLst>
+          </p:cNvPr>
+          <p:cNvSpPr>
+            <a:spLocks noGrp="1"/>
+          </p:cNvSpPr>
+          <p:nvPr>
+            <p:ph type="title"/>
+          </p:nvPr>
+        </p:nvSpPr>
+        <p:spPr/>
+        <p:txBody>
+          <a:bodyPr/>
+          <a:lstStyle/>
+          <a:p>
+            <a:r>
+              <a:rPr lang="en-US"/>
+              <a:t>Miscellaneous</a:t>
+            </a:r>
+            <a:endParaRPr lang="en-US" dirty="0"/>
+          </a:p>
+        </p:txBody>
+      </p:sp>
+      <p:sp>
+        <p:nvSpPr>
+          <p:cNvPr id="3" name="Content Placeholder 2">
+            <a:extLst>
+              <a:ext uri="{FF2B5EF4-FFF2-40B4-BE49-F238E27FC236}">
+                <a16:creationId xmlns:a16="http://schemas.microsoft.com/office/drawing/2014/main" id="{E6782E6C-3EEC-49F3-B248-5C89306E3EEB}"/>
+              </a:ext>
+            </a:extLst>
+          </p:cNvPr>
+          <p:cNvSpPr>
+            <a:spLocks noGrp="1"/>
+          </p:cNvSpPr>
+          <p:nvPr>
+            <p:ph idx="1"/>
+          </p:nvPr>
+        </p:nvSpPr>
+        <p:spPr/>
+        <p:txBody>
+          <a:bodyPr/>
+          <a:lstStyle/>
+          <a:p>
+            <a:r>
+              <a:rPr lang="en-US"/>
+              <a:t>“Good programmers write good code. Great programmers steal.” - Unknown</a:t>
+            </a:r>
+          </a:p>
+          <a:p>
+            <a:pPr lvl="1"/>
+            <a:r>
+              <a:rPr lang="en-US"/>
+              <a:t>Learn, Use, Copy, Borrow, and/or Steal.</a:t>
+            </a:r>
+          </a:p>
+          <a:p>
+            <a:endParaRPr lang="en-US" dirty="0"/>
+          </a:p>
+        </p:txBody>
+      </p:sp>
+    </p:spTree>
+    <p:extLst>
+      <p:ext uri="{BB962C8B-B14F-4D97-AF65-F5344CB8AC3E}">
+        <p14:creationId xmlns:p14="http://schemas.microsoft.com/office/powerpoint/2010/main" val="1613193946"/>
       </p:ext>
     </p:extLst>
   </p:cSld>
@@ -29929,4 +31594,47 @@
     </a:ext>
   </a:extLst>
 </a:theme>
+</file>
+
+<file path=ppt/theme/themeOverride1.xml><?xml version="1.0" encoding="utf-8"?>
+<a:themeOverride xmlns:a="http://schemas.openxmlformats.org/drawingml/2006/main">
+  <a:clrScheme name="Quotable">
+    <a:dk1>
+      <a:sysClr val="windowText" lastClr="000000"/>
+    </a:dk1>
+    <a:lt1>
+      <a:sysClr val="window" lastClr="FFFFFF"/>
+    </a:lt1>
+    <a:dk2>
+      <a:srgbClr val="212121"/>
+    </a:dk2>
+    <a:lt2>
+      <a:srgbClr val="636363"/>
+    </a:lt2>
+    <a:accent1>
+      <a:srgbClr val="00C6BB"/>
+    </a:accent1>
+    <a:accent2>
+      <a:srgbClr val="6FEBA0"/>
+    </a:accent2>
+    <a:accent3>
+      <a:srgbClr val="B6DF5E"/>
+    </a:accent3>
+    <a:accent4>
+      <a:srgbClr val="EFB251"/>
+    </a:accent4>
+    <a:accent5>
+      <a:srgbClr val="EF755F"/>
+    </a:accent5>
+    <a:accent6>
+      <a:srgbClr val="ED515C"/>
+    </a:accent6>
+    <a:hlink>
+      <a:srgbClr val="8F8F8F"/>
+    </a:hlink>
+    <a:folHlink>
+      <a:srgbClr val="A5A5A5"/>
+    </a:folHlink>
+  </a:clrScheme>
+</a:themeOverride>
 </file>
</xml_diff>

<commit_message>
more details for presentation;
</commit_message>
<xml_diff>
--- a/Presentation/Better Business Logic with Typescript.pptx
+++ b/Presentation/Better Business Logic with Typescript.pptx
@@ -36,11 +36,14 @@
     <p:sldId id="276" r:id="rId30"/>
     <p:sldId id="277" r:id="rId31"/>
     <p:sldId id="278" r:id="rId32"/>
-    <p:sldId id="280" r:id="rId33"/>
-    <p:sldId id="264" r:id="rId34"/>
-    <p:sldId id="266" r:id="rId35"/>
-    <p:sldId id="283" r:id="rId36"/>
-    <p:sldId id="265" r:id="rId37"/>
+    <p:sldId id="291" r:id="rId33"/>
+    <p:sldId id="290" r:id="rId34"/>
+    <p:sldId id="280" r:id="rId35"/>
+    <p:sldId id="292" r:id="rId36"/>
+    <p:sldId id="264" r:id="rId37"/>
+    <p:sldId id="266" r:id="rId38"/>
+    <p:sldId id="283" r:id="rId39"/>
+    <p:sldId id="265" r:id="rId40"/>
   </p:sldIdLst>
   <p:sldSz cx="12192000" cy="6858000"/>
   <p:notesSz cx="6858000" cy="9144000"/>
@@ -195,7 +198,10 @@
             <p14:sldId id="276"/>
             <p14:sldId id="277"/>
             <p14:sldId id="278"/>
+            <p14:sldId id="291"/>
+            <p14:sldId id="290"/>
             <p14:sldId id="280"/>
+            <p14:sldId id="292"/>
           </p14:sldIdLst>
         </p14:section>
         <p14:section name="References" id="{5423D470-F98F-46CC-AAC0-7790DAF9F850}">
@@ -30149,6 +30155,383 @@
           <a:chExt cx="0" cy="0"/>
         </a:xfrm>
       </p:grpSpPr>
+      <p:sp>
+        <p:nvSpPr>
+          <p:cNvPr id="2" name="Title 1">
+            <a:extLst>
+              <a:ext uri="{FF2B5EF4-FFF2-40B4-BE49-F238E27FC236}">
+                <a16:creationId xmlns:a16="http://schemas.microsoft.com/office/drawing/2014/main" id="{FA1BCB59-0789-48A4-8783-E209DA86CB32}"/>
+              </a:ext>
+            </a:extLst>
+          </p:cNvPr>
+          <p:cNvSpPr>
+            <a:spLocks noGrp="1"/>
+          </p:cNvSpPr>
+          <p:nvPr>
+            <p:ph type="title"/>
+          </p:nvPr>
+        </p:nvSpPr>
+        <p:spPr/>
+        <p:txBody>
+          <a:bodyPr/>
+          <a:lstStyle/>
+          <a:p>
+            <a:r>
+              <a:rPr lang="en-US" dirty="0"/>
+              <a:t>DEMO :: Taco Template</a:t>
+            </a:r>
+          </a:p>
+        </p:txBody>
+      </p:sp>
+      <p:sp>
+        <p:nvSpPr>
+          <p:cNvPr id="3" name="Content Placeholder 2">
+            <a:extLst>
+              <a:ext uri="{FF2B5EF4-FFF2-40B4-BE49-F238E27FC236}">
+                <a16:creationId xmlns:a16="http://schemas.microsoft.com/office/drawing/2014/main" id="{A01FBAB8-C7B4-43CB-89BE-BEACC68BD6FE}"/>
+              </a:ext>
+            </a:extLst>
+          </p:cNvPr>
+          <p:cNvSpPr>
+            <a:spLocks noGrp="1"/>
+          </p:cNvSpPr>
+          <p:nvPr>
+            <p:ph idx="1"/>
+          </p:nvPr>
+        </p:nvSpPr>
+        <p:spPr/>
+        <p:txBody>
+          <a:bodyPr/>
+          <a:lstStyle/>
+          <a:p>
+            <a:endParaRPr lang="en-US" dirty="0"/>
+          </a:p>
+        </p:txBody>
+      </p:sp>
+      <p:pic>
+        <p:nvPicPr>
+          <p:cNvPr id="1026" name="Picture 2" descr="Image result for taco">
+            <a:extLst>
+              <a:ext uri="{FF2B5EF4-FFF2-40B4-BE49-F238E27FC236}">
+                <a16:creationId xmlns:a16="http://schemas.microsoft.com/office/drawing/2014/main" id="{F3708CAD-144F-4598-85C7-7B04391F4BD1}"/>
+              </a:ext>
+            </a:extLst>
+          </p:cNvPr>
+          <p:cNvPicPr>
+            <a:picLocks noChangeAspect="1" noChangeArrowheads="1"/>
+          </p:cNvPicPr>
+          <p:nvPr/>
+        </p:nvPicPr>
+        <p:blipFill>
+          <a:blip r:embed="rId2">
+            <a:extLst>
+              <a:ext uri="{28A0092B-C50C-407E-A947-70E740481C1C}">
+                <a14:useLocalDpi xmlns:a14="http://schemas.microsoft.com/office/drawing/2010/main" val="0"/>
+              </a:ext>
+            </a:extLst>
+          </a:blip>
+          <a:srcRect/>
+          <a:stretch>
+            <a:fillRect/>
+          </a:stretch>
+        </p:blipFill>
+        <p:spPr bwMode="auto">
+          <a:xfrm>
+            <a:off x="3078499" y="2611792"/>
+            <a:ext cx="4714875" cy="2857500"/>
+          </a:xfrm>
+          <a:prstGeom prst="rect">
+            <a:avLst/>
+          </a:prstGeom>
+          <a:noFill/>
+          <a:extLst>
+            <a:ext uri="{909E8E84-426E-40DD-AFC4-6F175D3DCCD1}">
+              <a14:hiddenFill xmlns:a14="http://schemas.microsoft.com/office/drawing/2010/main">
+                <a:solidFill>
+                  <a:srgbClr val="FFFFFF"/>
+                </a:solidFill>
+              </a14:hiddenFill>
+            </a:ext>
+          </a:extLst>
+        </p:spPr>
+      </p:pic>
+    </p:spTree>
+    <p:extLst>
+      <p:ext uri="{BB962C8B-B14F-4D97-AF65-F5344CB8AC3E}">
+        <p14:creationId xmlns:p14="http://schemas.microsoft.com/office/powerpoint/2010/main" val="494287696"/>
+      </p:ext>
+    </p:extLst>
+  </p:cSld>
+  <p:clrMapOvr>
+    <a:masterClrMapping/>
+  </p:clrMapOvr>
+</p:sld>
+</file>
+
+<file path=ppt/slides/slide29.xml><?xml version="1.0" encoding="utf-8"?>
+<p:sld xmlns:a="http://schemas.openxmlformats.org/drawingml/2006/main" xmlns:r="http://schemas.openxmlformats.org/officeDocument/2006/relationships" xmlns:p="http://schemas.openxmlformats.org/presentationml/2006/main">
+  <p:cSld>
+    <p:spTree>
+      <p:nvGrpSpPr>
+        <p:cNvPr id="1" name=""/>
+        <p:cNvGrpSpPr/>
+        <p:nvPr/>
+      </p:nvGrpSpPr>
+      <p:grpSpPr>
+        <a:xfrm>
+          <a:off x="0" y="0"/>
+          <a:ext cx="0" cy="0"/>
+          <a:chOff x="0" y="0"/>
+          <a:chExt cx="0" cy="0"/>
+        </a:xfrm>
+      </p:grpSpPr>
+      <p:sp>
+        <p:nvSpPr>
+          <p:cNvPr id="2" name="Title 1">
+            <a:extLst>
+              <a:ext uri="{FF2B5EF4-FFF2-40B4-BE49-F238E27FC236}">
+                <a16:creationId xmlns:a16="http://schemas.microsoft.com/office/drawing/2014/main" id="{FA1BCB59-0789-48A4-8783-E209DA86CB32}"/>
+              </a:ext>
+            </a:extLst>
+          </p:cNvPr>
+          <p:cNvSpPr>
+            <a:spLocks noGrp="1"/>
+          </p:cNvSpPr>
+          <p:nvPr>
+            <p:ph type="title"/>
+          </p:nvPr>
+        </p:nvSpPr>
+        <p:spPr/>
+        <p:txBody>
+          <a:bodyPr/>
+          <a:lstStyle/>
+          <a:p>
+            <a:r>
+              <a:rPr lang="en-US" dirty="0"/>
+              <a:t>DEMO</a:t>
+            </a:r>
+          </a:p>
+        </p:txBody>
+      </p:sp>
+      <p:sp>
+        <p:nvSpPr>
+          <p:cNvPr id="3" name="Content Placeholder 2">
+            <a:extLst>
+              <a:ext uri="{FF2B5EF4-FFF2-40B4-BE49-F238E27FC236}">
+                <a16:creationId xmlns:a16="http://schemas.microsoft.com/office/drawing/2014/main" id="{A01FBAB8-C7B4-43CB-89BE-BEACC68BD6FE}"/>
+              </a:ext>
+            </a:extLst>
+          </p:cNvPr>
+          <p:cNvSpPr>
+            <a:spLocks noGrp="1"/>
+          </p:cNvSpPr>
+          <p:nvPr>
+            <p:ph idx="1"/>
+          </p:nvPr>
+        </p:nvSpPr>
+        <p:spPr/>
+        <p:txBody>
+          <a:bodyPr/>
+          <a:lstStyle/>
+          <a:p>
+            <a:r>
+              <a:rPr lang="en-US" b="1" dirty="0">
+                <a:hlinkClick r:id="rId2"/>
+              </a:rPr>
+              <a:t>http://dev.hybridmobileapp.net</a:t>
+            </a:r>
+            <a:r>
+              <a:rPr lang="en-US" b="1" dirty="0"/>
+              <a:t> </a:t>
+            </a:r>
+            <a:endParaRPr lang="en-US" dirty="0"/>
+          </a:p>
+        </p:txBody>
+      </p:sp>
+    </p:spTree>
+    <p:extLst>
+      <p:ext uri="{BB962C8B-B14F-4D97-AF65-F5344CB8AC3E}">
+        <p14:creationId xmlns:p14="http://schemas.microsoft.com/office/powerpoint/2010/main" val="1244110402"/>
+      </p:ext>
+    </p:extLst>
+  </p:cSld>
+  <p:clrMapOvr>
+    <a:masterClrMapping/>
+  </p:clrMapOvr>
+</p:sld>
+</file>
+
+<file path=ppt/slides/slide3.xml><?xml version="1.0" encoding="utf-8"?>
+<p:sld xmlns:a="http://schemas.openxmlformats.org/drawingml/2006/main" xmlns:r="http://schemas.openxmlformats.org/officeDocument/2006/relationships" xmlns:p="http://schemas.openxmlformats.org/presentationml/2006/main">
+  <p:cSld>
+    <p:spTree>
+      <p:nvGrpSpPr>
+        <p:cNvPr id="1" name=""/>
+        <p:cNvGrpSpPr/>
+        <p:nvPr/>
+      </p:nvGrpSpPr>
+      <p:grpSpPr>
+        <a:xfrm>
+          <a:off x="0" y="0"/>
+          <a:ext cx="0" cy="0"/>
+          <a:chOff x="0" y="0"/>
+          <a:chExt cx="0" cy="0"/>
+        </a:xfrm>
+      </p:grpSpPr>
+      <p:sp>
+        <p:nvSpPr>
+          <p:cNvPr id="2" name="Title 1">
+            <a:extLst>
+              <a:ext uri="{FF2B5EF4-FFF2-40B4-BE49-F238E27FC236}">
+                <a16:creationId xmlns:a16="http://schemas.microsoft.com/office/drawing/2014/main" id="{22A2A588-9EDC-459E-9F15-343ACBB411B2}"/>
+              </a:ext>
+            </a:extLst>
+          </p:cNvPr>
+          <p:cNvSpPr>
+            <a:spLocks noGrp="1"/>
+          </p:cNvSpPr>
+          <p:nvPr>
+            <p:ph type="title"/>
+          </p:nvPr>
+        </p:nvSpPr>
+        <p:spPr/>
+        <p:txBody>
+          <a:bodyPr/>
+          <a:lstStyle/>
+          <a:p>
+            <a:r>
+              <a:rPr lang="en-US"/>
+              <a:t>Contact Information</a:t>
+            </a:r>
+            <a:endParaRPr lang="en-US" dirty="0"/>
+          </a:p>
+        </p:txBody>
+      </p:sp>
+      <p:sp>
+        <p:nvSpPr>
+          <p:cNvPr id="3" name="Content Placeholder 2">
+            <a:extLst>
+              <a:ext uri="{FF2B5EF4-FFF2-40B4-BE49-F238E27FC236}">
+                <a16:creationId xmlns:a16="http://schemas.microsoft.com/office/drawing/2014/main" id="{069F119E-B9EC-4B81-815E-AF84F5C550A3}"/>
+              </a:ext>
+            </a:extLst>
+          </p:cNvPr>
+          <p:cNvSpPr>
+            <a:spLocks noGrp="1"/>
+          </p:cNvSpPr>
+          <p:nvPr>
+            <p:ph idx="1"/>
+          </p:nvPr>
+        </p:nvSpPr>
+        <p:spPr/>
+        <p:txBody>
+          <a:bodyPr>
+            <a:normAutofit/>
+          </a:bodyPr>
+          <a:lstStyle/>
+          <a:p>
+            <a:r>
+              <a:rPr lang="en-US"/>
+              <a:t>Matt Vaughn</a:t>
+            </a:r>
+          </a:p>
+          <a:p>
+            <a:pPr lvl="1"/>
+            <a:r>
+              <a:rPr lang="en-US"/>
+              <a:t>E: </a:t>
+            </a:r>
+            <a:r>
+              <a:rPr lang="en-US">
+                <a:hlinkClick r:id="rId2"/>
+              </a:rPr>
+              <a:t>matt.vaughn@buildmotion.com</a:t>
+            </a:r>
+            <a:endParaRPr lang="en-US"/>
+          </a:p>
+          <a:p>
+            <a:pPr lvl="1"/>
+            <a:r>
+              <a:rPr lang="en-US"/>
+              <a:t>W: </a:t>
+            </a:r>
+            <a:r>
+              <a:rPr lang="en-US">
+                <a:hlinkClick r:id="rId3"/>
+              </a:rPr>
+              <a:t>www.buildmotion.com</a:t>
+            </a:r>
+            <a:endParaRPr lang="en-US"/>
+          </a:p>
+          <a:p>
+            <a:pPr lvl="1"/>
+            <a:r>
+              <a:rPr lang="en-US"/>
+              <a:t>GitHub: </a:t>
+            </a:r>
+            <a:r>
+              <a:rPr lang="en-US">
+                <a:hlinkClick r:id="rId4"/>
+              </a:rPr>
+              <a:t>https://github.com/buildmotion</a:t>
+            </a:r>
+            <a:r>
+              <a:rPr lang="en-US"/>
+              <a:t> </a:t>
+            </a:r>
+          </a:p>
+          <a:p>
+            <a:r>
+              <a:rPr lang="en-US"/>
+              <a:t>Code Samples and Presentation</a:t>
+            </a:r>
+          </a:p>
+          <a:p>
+            <a:pPr lvl="1"/>
+            <a:r>
+              <a:rPr lang="en-US"/>
+              <a:t>GitHub: </a:t>
+            </a:r>
+            <a:r>
+              <a:rPr lang="en-US">
+                <a:hlinkClick r:id="rId5"/>
+              </a:rPr>
+              <a:t>https://github.com/buildmotion/better-business-logic-with-typescript</a:t>
+            </a:r>
+            <a:endParaRPr lang="en-US" dirty="0"/>
+          </a:p>
+        </p:txBody>
+      </p:sp>
+    </p:spTree>
+    <p:extLst>
+      <p:ext uri="{BB962C8B-B14F-4D97-AF65-F5344CB8AC3E}">
+        <p14:creationId xmlns:p14="http://schemas.microsoft.com/office/powerpoint/2010/main" val="411051127"/>
+      </p:ext>
+    </p:extLst>
+  </p:cSld>
+  <p:clrMapOvr>
+    <a:masterClrMapping/>
+  </p:clrMapOvr>
+</p:sld>
+</file>
+
+<file path=ppt/slides/slide30.xml><?xml version="1.0" encoding="utf-8"?>
+<p:sld xmlns:a="http://schemas.openxmlformats.org/drawingml/2006/main" xmlns:r="http://schemas.openxmlformats.org/officeDocument/2006/relationships" xmlns:p="http://schemas.openxmlformats.org/presentationml/2006/main">
+  <p:cSld>
+    <p:spTree>
+      <p:nvGrpSpPr>
+        <p:cNvPr id="1" name=""/>
+        <p:cNvGrpSpPr/>
+        <p:nvPr/>
+      </p:nvGrpSpPr>
+      <p:grpSpPr>
+        <a:xfrm>
+          <a:off x="0" y="0"/>
+          <a:ext cx="0" cy="0"/>
+          <a:chOff x="0" y="0"/>
+          <a:chExt cx="0" cy="0"/>
+        </a:xfrm>
+      </p:grpSpPr>
       <p:pic>
         <p:nvPicPr>
           <p:cNvPr id="6" name="Picture 5">
@@ -30222,496 +30605,6 @@
 </p:sld>
 </file>
 
-<file path=ppt/slides/slide29.xml><?xml version="1.0" encoding="utf-8"?>
-<p:sld xmlns:a="http://schemas.openxmlformats.org/drawingml/2006/main" xmlns:r="http://schemas.openxmlformats.org/officeDocument/2006/relationships" xmlns:p="http://schemas.openxmlformats.org/presentationml/2006/main">
-  <p:cSld>
-    <p:spTree>
-      <p:nvGrpSpPr>
-        <p:cNvPr id="1" name=""/>
-        <p:cNvGrpSpPr/>
-        <p:nvPr/>
-      </p:nvGrpSpPr>
-      <p:grpSpPr>
-        <a:xfrm>
-          <a:off x="0" y="0"/>
-          <a:ext cx="0" cy="0"/>
-          <a:chOff x="0" y="0"/>
-          <a:chExt cx="0" cy="0"/>
-        </a:xfrm>
-      </p:grpSpPr>
-      <p:sp>
-        <p:nvSpPr>
-          <p:cNvPr id="2" name="Title 1">
-            <a:extLst>
-              <a:ext uri="{FF2B5EF4-FFF2-40B4-BE49-F238E27FC236}">
-                <a16:creationId xmlns:a16="http://schemas.microsoft.com/office/drawing/2014/main" id="{7D8AF8FB-793E-41BD-8CC5-A923B5A8209E}"/>
-              </a:ext>
-            </a:extLst>
-          </p:cNvPr>
-          <p:cNvSpPr>
-            <a:spLocks noGrp="1"/>
-          </p:cNvSpPr>
-          <p:nvPr>
-            <p:ph type="title"/>
-          </p:nvPr>
-        </p:nvSpPr>
-        <p:spPr/>
-        <p:txBody>
-          <a:bodyPr/>
-          <a:lstStyle/>
-          <a:p>
-            <a:r>
-              <a:rPr lang="en-US"/>
-              <a:t>Web References</a:t>
-            </a:r>
-            <a:endParaRPr lang="en-US" dirty="0"/>
-          </a:p>
-        </p:txBody>
-      </p:sp>
-      <p:sp>
-        <p:nvSpPr>
-          <p:cNvPr id="3" name="Content Placeholder 2">
-            <a:extLst>
-              <a:ext uri="{FF2B5EF4-FFF2-40B4-BE49-F238E27FC236}">
-                <a16:creationId xmlns:a16="http://schemas.microsoft.com/office/drawing/2014/main" id="{3975127B-114D-4B36-BA13-4EB6781A2CEB}"/>
-              </a:ext>
-            </a:extLst>
-          </p:cNvPr>
-          <p:cNvSpPr>
-            <a:spLocks noGrp="1"/>
-          </p:cNvSpPr>
-          <p:nvPr>
-            <p:ph idx="1"/>
-          </p:nvPr>
-        </p:nvSpPr>
-        <p:spPr/>
-        <p:txBody>
-          <a:bodyPr>
-            <a:normAutofit/>
-          </a:bodyPr>
-          <a:lstStyle/>
-          <a:p>
-            <a:r>
-              <a:rPr lang="en-US">
-                <a:hlinkClick r:id="rId2"/>
-              </a:rPr>
-              <a:t>GoF Design patterns in .NET/C#</a:t>
-            </a:r>
-            <a:endParaRPr lang="en-US"/>
-          </a:p>
-          <a:p>
-            <a:r>
-              <a:rPr lang="en-US">
-                <a:hlinkClick r:id="rId3"/>
-              </a:rPr>
-              <a:t>Design Patterns General</a:t>
-            </a:r>
-            <a:endParaRPr lang="en-US"/>
-          </a:p>
-          <a:p>
-            <a:pPr lvl="1"/>
-            <a:r>
-              <a:rPr lang="en-US">
-                <a:hlinkClick r:id="rId3"/>
-              </a:rPr>
-              <a:t>Creational</a:t>
-            </a:r>
-            <a:endParaRPr lang="en-US"/>
-          </a:p>
-          <a:p>
-            <a:pPr lvl="1"/>
-            <a:r>
-              <a:rPr lang="en-US">
-                <a:hlinkClick r:id="rId4"/>
-              </a:rPr>
-              <a:t>Structural</a:t>
-            </a:r>
-            <a:endParaRPr lang="en-US"/>
-          </a:p>
-          <a:p>
-            <a:pPr lvl="1"/>
-            <a:r>
-              <a:rPr lang="en-US">
-                <a:hlinkClick r:id="rId5"/>
-              </a:rPr>
-              <a:t>Behavioral</a:t>
-            </a:r>
-            <a:endParaRPr lang="en-US"/>
-          </a:p>
-          <a:p>
-            <a:r>
-              <a:rPr lang="en-US"/>
-              <a:t>Principles:</a:t>
-            </a:r>
-          </a:p>
-          <a:p>
-            <a:pPr lvl="1"/>
-            <a:r>
-              <a:rPr lang="en-US">
-                <a:hlinkClick r:id="rId6"/>
-              </a:rPr>
-              <a:t>Single Responsibility</a:t>
-            </a:r>
-            <a:endParaRPr lang="en-US"/>
-          </a:p>
-          <a:p>
-            <a:pPr lvl="1"/>
-            <a:r>
-              <a:rPr lang="en-US">
-                <a:hlinkClick r:id="rId7"/>
-              </a:rPr>
-              <a:t>Separation of Concerns</a:t>
-            </a:r>
-            <a:endParaRPr lang="en-US"/>
-          </a:p>
-          <a:p>
-            <a:pPr lvl="1"/>
-            <a:r>
-              <a:rPr lang="en-US">
-                <a:hlinkClick r:id="rId8"/>
-              </a:rPr>
-              <a:t>S.O.L.I.D Principles</a:t>
-            </a:r>
-            <a:endParaRPr lang="en-US"/>
-          </a:p>
-          <a:p>
-            <a:endParaRPr lang="en-US" dirty="0"/>
-          </a:p>
-        </p:txBody>
-      </p:sp>
-    </p:spTree>
-    <p:extLst>
-      <p:ext uri="{BB962C8B-B14F-4D97-AF65-F5344CB8AC3E}">
-        <p14:creationId xmlns:p14="http://schemas.microsoft.com/office/powerpoint/2010/main" val="1961233773"/>
-      </p:ext>
-    </p:extLst>
-  </p:cSld>
-  <p:clrMapOvr>
-    <a:masterClrMapping/>
-  </p:clrMapOvr>
-</p:sld>
-</file>
-
-<file path=ppt/slides/slide3.xml><?xml version="1.0" encoding="utf-8"?>
-<p:sld xmlns:a="http://schemas.openxmlformats.org/drawingml/2006/main" xmlns:r="http://schemas.openxmlformats.org/officeDocument/2006/relationships" xmlns:p="http://schemas.openxmlformats.org/presentationml/2006/main">
-  <p:cSld>
-    <p:spTree>
-      <p:nvGrpSpPr>
-        <p:cNvPr id="1" name=""/>
-        <p:cNvGrpSpPr/>
-        <p:nvPr/>
-      </p:nvGrpSpPr>
-      <p:grpSpPr>
-        <a:xfrm>
-          <a:off x="0" y="0"/>
-          <a:ext cx="0" cy="0"/>
-          <a:chOff x="0" y="0"/>
-          <a:chExt cx="0" cy="0"/>
-        </a:xfrm>
-      </p:grpSpPr>
-      <p:sp>
-        <p:nvSpPr>
-          <p:cNvPr id="2" name="Title 1">
-            <a:extLst>
-              <a:ext uri="{FF2B5EF4-FFF2-40B4-BE49-F238E27FC236}">
-                <a16:creationId xmlns:a16="http://schemas.microsoft.com/office/drawing/2014/main" id="{22A2A588-9EDC-459E-9F15-343ACBB411B2}"/>
-              </a:ext>
-            </a:extLst>
-          </p:cNvPr>
-          <p:cNvSpPr>
-            <a:spLocks noGrp="1"/>
-          </p:cNvSpPr>
-          <p:nvPr>
-            <p:ph type="title"/>
-          </p:nvPr>
-        </p:nvSpPr>
-        <p:spPr/>
-        <p:txBody>
-          <a:bodyPr/>
-          <a:lstStyle/>
-          <a:p>
-            <a:r>
-              <a:rPr lang="en-US"/>
-              <a:t>Contact Information</a:t>
-            </a:r>
-            <a:endParaRPr lang="en-US" dirty="0"/>
-          </a:p>
-        </p:txBody>
-      </p:sp>
-      <p:sp>
-        <p:nvSpPr>
-          <p:cNvPr id="3" name="Content Placeholder 2">
-            <a:extLst>
-              <a:ext uri="{FF2B5EF4-FFF2-40B4-BE49-F238E27FC236}">
-                <a16:creationId xmlns:a16="http://schemas.microsoft.com/office/drawing/2014/main" id="{069F119E-B9EC-4B81-815E-AF84F5C550A3}"/>
-              </a:ext>
-            </a:extLst>
-          </p:cNvPr>
-          <p:cNvSpPr>
-            <a:spLocks noGrp="1"/>
-          </p:cNvSpPr>
-          <p:nvPr>
-            <p:ph idx="1"/>
-          </p:nvPr>
-        </p:nvSpPr>
-        <p:spPr/>
-        <p:txBody>
-          <a:bodyPr>
-            <a:normAutofit/>
-          </a:bodyPr>
-          <a:lstStyle/>
-          <a:p>
-            <a:r>
-              <a:rPr lang="en-US"/>
-              <a:t>Matt Vaughn</a:t>
-            </a:r>
-          </a:p>
-          <a:p>
-            <a:pPr lvl="1"/>
-            <a:r>
-              <a:rPr lang="en-US"/>
-              <a:t>E: </a:t>
-            </a:r>
-            <a:r>
-              <a:rPr lang="en-US">
-                <a:hlinkClick r:id="rId2"/>
-              </a:rPr>
-              <a:t>matt.vaughn@buildmotion.com</a:t>
-            </a:r>
-            <a:endParaRPr lang="en-US"/>
-          </a:p>
-          <a:p>
-            <a:pPr lvl="1"/>
-            <a:r>
-              <a:rPr lang="en-US"/>
-              <a:t>W: </a:t>
-            </a:r>
-            <a:r>
-              <a:rPr lang="en-US">
-                <a:hlinkClick r:id="rId3"/>
-              </a:rPr>
-              <a:t>www.buildmotion.com</a:t>
-            </a:r>
-            <a:endParaRPr lang="en-US"/>
-          </a:p>
-          <a:p>
-            <a:pPr lvl="1"/>
-            <a:r>
-              <a:rPr lang="en-US"/>
-              <a:t>GitHub: </a:t>
-            </a:r>
-            <a:r>
-              <a:rPr lang="en-US">
-                <a:hlinkClick r:id="rId4"/>
-              </a:rPr>
-              <a:t>https://github.com/buildmotion</a:t>
-            </a:r>
-            <a:r>
-              <a:rPr lang="en-US"/>
-              <a:t> </a:t>
-            </a:r>
-          </a:p>
-          <a:p>
-            <a:r>
-              <a:rPr lang="en-US"/>
-              <a:t>Code Samples and Presentation</a:t>
-            </a:r>
-          </a:p>
-          <a:p>
-            <a:pPr lvl="1"/>
-            <a:r>
-              <a:rPr lang="en-US"/>
-              <a:t>GitHub: </a:t>
-            </a:r>
-            <a:r>
-              <a:rPr lang="en-US">
-                <a:hlinkClick r:id="rId5"/>
-              </a:rPr>
-              <a:t>https://github.com/buildmotion/better-business-logic-with-typescript</a:t>
-            </a:r>
-            <a:endParaRPr lang="en-US" dirty="0"/>
-          </a:p>
-        </p:txBody>
-      </p:sp>
-    </p:spTree>
-    <p:extLst>
-      <p:ext uri="{BB962C8B-B14F-4D97-AF65-F5344CB8AC3E}">
-        <p14:creationId xmlns:p14="http://schemas.microsoft.com/office/powerpoint/2010/main" val="411051127"/>
-      </p:ext>
-    </p:extLst>
-  </p:cSld>
-  <p:clrMapOvr>
-    <a:masterClrMapping/>
-  </p:clrMapOvr>
-</p:sld>
-</file>
-
-<file path=ppt/slides/slide30.xml><?xml version="1.0" encoding="utf-8"?>
-<p:sld xmlns:a="http://schemas.openxmlformats.org/drawingml/2006/main" xmlns:r="http://schemas.openxmlformats.org/officeDocument/2006/relationships" xmlns:p="http://schemas.openxmlformats.org/presentationml/2006/main">
-  <p:cSld>
-    <p:spTree>
-      <p:nvGrpSpPr>
-        <p:cNvPr id="1" name=""/>
-        <p:cNvGrpSpPr/>
-        <p:nvPr/>
-      </p:nvGrpSpPr>
-      <p:grpSpPr>
-        <a:xfrm>
-          <a:off x="0" y="0"/>
-          <a:ext cx="0" cy="0"/>
-          <a:chOff x="0" y="0"/>
-          <a:chExt cx="0" cy="0"/>
-        </a:xfrm>
-      </p:grpSpPr>
-      <p:sp>
-        <p:nvSpPr>
-          <p:cNvPr id="2" name="Title 1">
-            <a:extLst>
-              <a:ext uri="{FF2B5EF4-FFF2-40B4-BE49-F238E27FC236}">
-                <a16:creationId xmlns:a16="http://schemas.microsoft.com/office/drawing/2014/main" id="{7D8AF8FB-793E-41BD-8CC5-A923B5A8209E}"/>
-              </a:ext>
-            </a:extLst>
-          </p:cNvPr>
-          <p:cNvSpPr>
-            <a:spLocks noGrp="1"/>
-          </p:cNvSpPr>
-          <p:nvPr>
-            <p:ph type="title"/>
-          </p:nvPr>
-        </p:nvSpPr>
-        <p:spPr/>
-        <p:txBody>
-          <a:bodyPr/>
-          <a:lstStyle/>
-          <a:p>
-            <a:r>
-              <a:rPr lang="en-US"/>
-              <a:t>Book References</a:t>
-            </a:r>
-            <a:endParaRPr lang="en-US" dirty="0"/>
-          </a:p>
-        </p:txBody>
-      </p:sp>
-      <p:sp>
-        <p:nvSpPr>
-          <p:cNvPr id="3" name="Content Placeholder 2">
-            <a:extLst>
-              <a:ext uri="{FF2B5EF4-FFF2-40B4-BE49-F238E27FC236}">
-                <a16:creationId xmlns:a16="http://schemas.microsoft.com/office/drawing/2014/main" id="{3975127B-114D-4B36-BA13-4EB6781A2CEB}"/>
-              </a:ext>
-            </a:extLst>
-          </p:cNvPr>
-          <p:cNvSpPr>
-            <a:spLocks noGrp="1"/>
-          </p:cNvSpPr>
-          <p:nvPr>
-            <p:ph idx="1"/>
-          </p:nvPr>
-        </p:nvSpPr>
-        <p:spPr/>
-        <p:txBody>
-          <a:bodyPr>
-            <a:normAutofit fontScale="92500" lnSpcReduction="10000"/>
-          </a:bodyPr>
-          <a:lstStyle/>
-          <a:p>
-            <a:r>
-              <a:rPr lang="en-US">
-                <a:hlinkClick r:id="rId2"/>
-              </a:rPr>
-              <a:t>Design Patterns : Elements of Reusable Object-Oriented Software</a:t>
-            </a:r>
-            <a:endParaRPr lang="en-US"/>
-          </a:p>
-          <a:p>
-            <a:pPr lvl="1"/>
-            <a:r>
-              <a:rPr lang="en-US"/>
-              <a:t>ISBN-13: 978-0201633610, ISBN-10: 0201633612</a:t>
-            </a:r>
-          </a:p>
-          <a:p>
-            <a:r>
-              <a:rPr lang="en-US">
-                <a:hlinkClick r:id="rId3"/>
-              </a:rPr>
-              <a:t>Head First Design Patterns</a:t>
-            </a:r>
-            <a:endParaRPr lang="en-US"/>
-          </a:p>
-          <a:p>
-            <a:pPr lvl="1"/>
-            <a:r>
-              <a:rPr lang="en-US"/>
-              <a:t>ISBN-13: 978-0596007126, ISBN-10: 0596007124</a:t>
-            </a:r>
-          </a:p>
-          <a:p>
-            <a:r>
-              <a:rPr lang="en-US">
-                <a:hlinkClick r:id="rId4"/>
-              </a:rPr>
-              <a:t>Clean Code</a:t>
-            </a:r>
-            <a:endParaRPr lang="en-US"/>
-          </a:p>
-          <a:p>
-            <a:pPr lvl="1"/>
-            <a:r>
-              <a:rPr lang="en-US"/>
-              <a:t>ISBN-13: 978-0132350884, ISBN-10: 0132350882</a:t>
-            </a:r>
-          </a:p>
-          <a:p>
-            <a:r>
-              <a:rPr lang="en-US">
-                <a:hlinkClick r:id="rId5"/>
-              </a:rPr>
-              <a:t>The Pragmatic Programmer</a:t>
-            </a:r>
-            <a:endParaRPr lang="en-US"/>
-          </a:p>
-          <a:p>
-            <a:pPr lvl="1"/>
-            <a:r>
-              <a:rPr lang="en-US"/>
-              <a:t>ISBN-13: 978-0201616224, ISBN-10: 020161622X</a:t>
-            </a:r>
-          </a:p>
-          <a:p>
-            <a:r>
-              <a:rPr lang="en-US">
-                <a:hlinkClick r:id="rId6"/>
-              </a:rPr>
-              <a:t>Patterns of Enterprise Application Architecture</a:t>
-            </a:r>
-            <a:endParaRPr lang="en-US"/>
-          </a:p>
-          <a:p>
-            <a:pPr lvl="1"/>
-            <a:r>
-              <a:rPr lang="en-US"/>
-              <a:t>ISBN-13: 978-0321127426, ISBN-10: 0321127420</a:t>
-            </a:r>
-          </a:p>
-          <a:p>
-            <a:endParaRPr lang="en-US" dirty="0"/>
-          </a:p>
-        </p:txBody>
-      </p:sp>
-    </p:spTree>
-    <p:extLst>
-      <p:ext uri="{BB962C8B-B14F-4D97-AF65-F5344CB8AC3E}">
-        <p14:creationId xmlns:p14="http://schemas.microsoft.com/office/powerpoint/2010/main" val="214986796"/>
-      </p:ext>
-    </p:extLst>
-  </p:cSld>
-  <p:clrMapOvr>
-    <a:masterClrMapping/>
-  </p:clrMapOvr>
-</p:sld>
-</file>
-
 <file path=ppt/slides/slide31.xml><?xml version="1.0" encoding="utf-8"?>
 <p:sld xmlns:a="http://schemas.openxmlformats.org/drawingml/2006/main" xmlns:r="http://schemas.openxmlformats.org/officeDocument/2006/relationships" xmlns:p="http://schemas.openxmlformats.org/presentationml/2006/main">
   <p:cSld>
@@ -30731,6 +30624,561 @@
       </p:grpSpPr>
       <p:sp>
         <p:nvSpPr>
+          <p:cNvPr id="6" name="Title 5">
+            <a:extLst>
+              <a:ext uri="{FF2B5EF4-FFF2-40B4-BE49-F238E27FC236}">
+                <a16:creationId xmlns:a16="http://schemas.microsoft.com/office/drawing/2014/main" id="{C66EA529-467E-45E3-AE8F-76472241DB03}"/>
+              </a:ext>
+            </a:extLst>
+          </p:cNvPr>
+          <p:cNvSpPr>
+            <a:spLocks noGrp="1"/>
+          </p:cNvSpPr>
+          <p:nvPr>
+            <p:ph type="title"/>
+          </p:nvPr>
+        </p:nvSpPr>
+        <p:spPr/>
+        <p:txBody>
+          <a:bodyPr/>
+          <a:lstStyle/>
+          <a:p>
+            <a:r>
+              <a:rPr lang="en-US" dirty="0"/>
+              <a:t>Action Pipeline</a:t>
+            </a:r>
+          </a:p>
+        </p:txBody>
+      </p:sp>
+      <p:sp>
+        <p:nvSpPr>
+          <p:cNvPr id="7" name="Content Placeholder 6">
+            <a:extLst>
+              <a:ext uri="{FF2B5EF4-FFF2-40B4-BE49-F238E27FC236}">
+                <a16:creationId xmlns:a16="http://schemas.microsoft.com/office/drawing/2014/main" id="{F54AD95E-152B-4C9A-BABE-304B78EBEE75}"/>
+              </a:ext>
+            </a:extLst>
+          </p:cNvPr>
+          <p:cNvSpPr>
+            <a:spLocks noGrp="1"/>
+          </p:cNvSpPr>
+          <p:nvPr>
+            <p:ph idx="1"/>
+          </p:nvPr>
+        </p:nvSpPr>
+        <p:spPr/>
+        <p:txBody>
+          <a:bodyPr/>
+          <a:lstStyle/>
+          <a:p>
+            <a:endParaRPr lang="en-US" dirty="0"/>
+          </a:p>
+        </p:txBody>
+      </p:sp>
+      <p:sp>
+        <p:nvSpPr>
+          <p:cNvPr id="8" name="Text Placeholder 7">
+            <a:extLst>
+              <a:ext uri="{FF2B5EF4-FFF2-40B4-BE49-F238E27FC236}">
+                <a16:creationId xmlns:a16="http://schemas.microsoft.com/office/drawing/2014/main" id="{F757B5AA-B9E2-4409-95DC-190C74C21681}"/>
+              </a:ext>
+            </a:extLst>
+          </p:cNvPr>
+          <p:cNvSpPr>
+            <a:spLocks noGrp="1"/>
+          </p:cNvSpPr>
+          <p:nvPr>
+            <p:ph type="body" sz="half" idx="2"/>
+          </p:nvPr>
+        </p:nvSpPr>
+        <p:spPr/>
+        <p:txBody>
+          <a:bodyPr>
+            <a:normAutofit/>
+          </a:bodyPr>
+          <a:lstStyle/>
+          <a:p>
+            <a:pPr marL="342900" indent="-342900">
+              <a:buFont typeface="+mj-lt"/>
+              <a:buAutoNum type="arabicPeriod"/>
+            </a:pPr>
+            <a:r>
+              <a:rPr lang="en-US" sz="1800" dirty="0"/>
+              <a:t>Service delegates to the Business Layer to process request.</a:t>
+            </a:r>
+          </a:p>
+          <a:p>
+            <a:pPr marL="342900" indent="-342900">
+              <a:buFont typeface="+mj-lt"/>
+              <a:buAutoNum type="arabicPeriod"/>
+            </a:pPr>
+            <a:r>
+              <a:rPr lang="en-US" sz="1800" dirty="0"/>
+              <a:t>The Business Layer initializes a new Action and Executes action.</a:t>
+            </a:r>
+          </a:p>
+          <a:p>
+            <a:pPr marL="342900" indent="-342900">
+              <a:buFont typeface="+mj-lt"/>
+              <a:buAutoNum type="arabicPeriod"/>
+            </a:pPr>
+            <a:r>
+              <a:rPr lang="en-US" sz="1800" dirty="0"/>
+              <a:t>The concrete action implements </a:t>
+            </a:r>
+            <a:r>
+              <a:rPr lang="en-US" sz="1800"/>
+              <a:t>the </a:t>
+            </a:r>
+            <a:r>
+              <a:rPr lang="en-US" sz="1200">
+                <a:solidFill>
+                  <a:srgbClr val="FFC000"/>
+                </a:solidFill>
+                <a:latin typeface="Source Code Pro" panose="020B0509030403020204" pitchFamily="49" charset="0"/>
+                <a:ea typeface="Source Code Pro" panose="020B0509030403020204" pitchFamily="49" charset="0"/>
+              </a:rPr>
+              <a:t>preValidationAction</a:t>
+            </a:r>
+            <a:r>
+              <a:rPr lang="en-US" sz="1200" dirty="0">
+                <a:solidFill>
+                  <a:srgbClr val="FFC000"/>
+                </a:solidFill>
+                <a:latin typeface="Source Code Pro" panose="020B0509030403020204" pitchFamily="49" charset="0"/>
+                <a:ea typeface="Source Code Pro" panose="020B0509030403020204" pitchFamily="49" charset="0"/>
+              </a:rPr>
+              <a:t>()</a:t>
+            </a:r>
+            <a:r>
+              <a:rPr lang="en-US" sz="1800" dirty="0"/>
+              <a:t> method and the </a:t>
+            </a:r>
+            <a:r>
+              <a:rPr lang="en-US" sz="1200" dirty="0" err="1">
+                <a:solidFill>
+                  <a:srgbClr val="FFC000"/>
+                </a:solidFill>
+                <a:latin typeface="Source Code Pro" panose="020B0509030403020204" pitchFamily="49" charset="0"/>
+                <a:ea typeface="Source Code Pro" panose="020B0509030403020204" pitchFamily="49" charset="0"/>
+              </a:rPr>
+              <a:t>performAction</a:t>
+            </a:r>
+            <a:r>
+              <a:rPr lang="en-US" sz="1200" dirty="0">
+                <a:solidFill>
+                  <a:srgbClr val="FFC000"/>
+                </a:solidFill>
+                <a:latin typeface="Source Code Pro" panose="020B0509030403020204" pitchFamily="49" charset="0"/>
+                <a:ea typeface="Source Code Pro" panose="020B0509030403020204" pitchFamily="49" charset="0"/>
+              </a:rPr>
+              <a:t>() </a:t>
+            </a:r>
+            <a:r>
+              <a:rPr lang="en-US" sz="1800" dirty="0"/>
+              <a:t>method.</a:t>
+            </a:r>
+          </a:p>
+        </p:txBody>
+      </p:sp>
+      <p:pic>
+        <p:nvPicPr>
+          <p:cNvPr id="9" name="Picture 8">
+            <a:extLst>
+              <a:ext uri="{FF2B5EF4-FFF2-40B4-BE49-F238E27FC236}">
+                <a16:creationId xmlns:a16="http://schemas.microsoft.com/office/drawing/2014/main" id="{EB9B34DB-2268-4206-BFDF-DC89EE31B5F2}"/>
+              </a:ext>
+            </a:extLst>
+          </p:cNvPr>
+          <p:cNvPicPr>
+            <a:picLocks noChangeAspect="1"/>
+          </p:cNvPicPr>
+          <p:nvPr/>
+        </p:nvPicPr>
+        <p:blipFill>
+          <a:blip r:embed="rId2"/>
+          <a:stretch>
+            <a:fillRect/>
+          </a:stretch>
+        </p:blipFill>
+        <p:spPr>
+          <a:xfrm>
+            <a:off x="5077641" y="511288"/>
+            <a:ext cx="5488426" cy="5284561"/>
+          </a:xfrm>
+          <a:prstGeom prst="rect">
+            <a:avLst/>
+          </a:prstGeom>
+        </p:spPr>
+      </p:pic>
+    </p:spTree>
+    <p:extLst>
+      <p:ext uri="{BB962C8B-B14F-4D97-AF65-F5344CB8AC3E}">
+        <p14:creationId xmlns:p14="http://schemas.microsoft.com/office/powerpoint/2010/main" val="3752534429"/>
+      </p:ext>
+    </p:extLst>
+  </p:cSld>
+  <p:clrMapOvr>
+    <a:masterClrMapping/>
+  </p:clrMapOvr>
+</p:sld>
+</file>
+
+<file path=ppt/slides/slide32.xml><?xml version="1.0" encoding="utf-8"?>
+<p:sld xmlns:a="http://schemas.openxmlformats.org/drawingml/2006/main" xmlns:r="http://schemas.openxmlformats.org/officeDocument/2006/relationships" xmlns:p="http://schemas.openxmlformats.org/presentationml/2006/main">
+  <p:cSld>
+    <p:spTree>
+      <p:nvGrpSpPr>
+        <p:cNvPr id="1" name=""/>
+        <p:cNvGrpSpPr/>
+        <p:nvPr/>
+      </p:nvGrpSpPr>
+      <p:grpSpPr>
+        <a:xfrm>
+          <a:off x="0" y="0"/>
+          <a:ext cx="0" cy="0"/>
+          <a:chOff x="0" y="0"/>
+          <a:chExt cx="0" cy="0"/>
+        </a:xfrm>
+      </p:grpSpPr>
+      <p:sp>
+        <p:nvSpPr>
+          <p:cNvPr id="2" name="Title 1">
+            <a:extLst>
+              <a:ext uri="{FF2B5EF4-FFF2-40B4-BE49-F238E27FC236}">
+                <a16:creationId xmlns:a16="http://schemas.microsoft.com/office/drawing/2014/main" id="{7D8AF8FB-793E-41BD-8CC5-A923B5A8209E}"/>
+              </a:ext>
+            </a:extLst>
+          </p:cNvPr>
+          <p:cNvSpPr>
+            <a:spLocks noGrp="1"/>
+          </p:cNvSpPr>
+          <p:nvPr>
+            <p:ph type="title"/>
+          </p:nvPr>
+        </p:nvSpPr>
+        <p:spPr/>
+        <p:txBody>
+          <a:bodyPr/>
+          <a:lstStyle/>
+          <a:p>
+            <a:r>
+              <a:rPr lang="en-US"/>
+              <a:t>Web References</a:t>
+            </a:r>
+            <a:endParaRPr lang="en-US" dirty="0"/>
+          </a:p>
+        </p:txBody>
+      </p:sp>
+      <p:sp>
+        <p:nvSpPr>
+          <p:cNvPr id="3" name="Content Placeholder 2">
+            <a:extLst>
+              <a:ext uri="{FF2B5EF4-FFF2-40B4-BE49-F238E27FC236}">
+                <a16:creationId xmlns:a16="http://schemas.microsoft.com/office/drawing/2014/main" id="{3975127B-114D-4B36-BA13-4EB6781A2CEB}"/>
+              </a:ext>
+            </a:extLst>
+          </p:cNvPr>
+          <p:cNvSpPr>
+            <a:spLocks noGrp="1"/>
+          </p:cNvSpPr>
+          <p:nvPr>
+            <p:ph idx="1"/>
+          </p:nvPr>
+        </p:nvSpPr>
+        <p:spPr/>
+        <p:txBody>
+          <a:bodyPr>
+            <a:normAutofit/>
+          </a:bodyPr>
+          <a:lstStyle/>
+          <a:p>
+            <a:r>
+              <a:rPr lang="en-US">
+                <a:hlinkClick r:id="rId2"/>
+              </a:rPr>
+              <a:t>GoF Design patterns in .NET/C#</a:t>
+            </a:r>
+            <a:endParaRPr lang="en-US"/>
+          </a:p>
+          <a:p>
+            <a:r>
+              <a:rPr lang="en-US">
+                <a:hlinkClick r:id="rId3"/>
+              </a:rPr>
+              <a:t>Design Patterns General</a:t>
+            </a:r>
+            <a:endParaRPr lang="en-US"/>
+          </a:p>
+          <a:p>
+            <a:pPr lvl="1"/>
+            <a:r>
+              <a:rPr lang="en-US">
+                <a:hlinkClick r:id="rId3"/>
+              </a:rPr>
+              <a:t>Creational</a:t>
+            </a:r>
+            <a:endParaRPr lang="en-US"/>
+          </a:p>
+          <a:p>
+            <a:pPr lvl="1"/>
+            <a:r>
+              <a:rPr lang="en-US">
+                <a:hlinkClick r:id="rId4"/>
+              </a:rPr>
+              <a:t>Structural</a:t>
+            </a:r>
+            <a:endParaRPr lang="en-US"/>
+          </a:p>
+          <a:p>
+            <a:pPr lvl="1"/>
+            <a:r>
+              <a:rPr lang="en-US">
+                <a:hlinkClick r:id="rId5"/>
+              </a:rPr>
+              <a:t>Behavioral</a:t>
+            </a:r>
+            <a:endParaRPr lang="en-US"/>
+          </a:p>
+          <a:p>
+            <a:r>
+              <a:rPr lang="en-US"/>
+              <a:t>Principles:</a:t>
+            </a:r>
+          </a:p>
+          <a:p>
+            <a:pPr lvl="1"/>
+            <a:r>
+              <a:rPr lang="en-US">
+                <a:hlinkClick r:id="rId6"/>
+              </a:rPr>
+              <a:t>Single Responsibility</a:t>
+            </a:r>
+            <a:endParaRPr lang="en-US"/>
+          </a:p>
+          <a:p>
+            <a:pPr lvl="1"/>
+            <a:r>
+              <a:rPr lang="en-US">
+                <a:hlinkClick r:id="rId7"/>
+              </a:rPr>
+              <a:t>Separation of Concerns</a:t>
+            </a:r>
+            <a:endParaRPr lang="en-US"/>
+          </a:p>
+          <a:p>
+            <a:pPr lvl="1"/>
+            <a:r>
+              <a:rPr lang="en-US">
+                <a:hlinkClick r:id="rId8"/>
+              </a:rPr>
+              <a:t>S.O.L.I.D Principles</a:t>
+            </a:r>
+            <a:endParaRPr lang="en-US"/>
+          </a:p>
+          <a:p>
+            <a:endParaRPr lang="en-US" dirty="0"/>
+          </a:p>
+        </p:txBody>
+      </p:sp>
+    </p:spTree>
+    <p:extLst>
+      <p:ext uri="{BB962C8B-B14F-4D97-AF65-F5344CB8AC3E}">
+        <p14:creationId xmlns:p14="http://schemas.microsoft.com/office/powerpoint/2010/main" val="1961233773"/>
+      </p:ext>
+    </p:extLst>
+  </p:cSld>
+  <p:clrMapOvr>
+    <a:masterClrMapping/>
+  </p:clrMapOvr>
+</p:sld>
+</file>
+
+<file path=ppt/slides/slide33.xml><?xml version="1.0" encoding="utf-8"?>
+<p:sld xmlns:a="http://schemas.openxmlformats.org/drawingml/2006/main" xmlns:r="http://schemas.openxmlformats.org/officeDocument/2006/relationships" xmlns:p="http://schemas.openxmlformats.org/presentationml/2006/main">
+  <p:cSld>
+    <p:spTree>
+      <p:nvGrpSpPr>
+        <p:cNvPr id="1" name=""/>
+        <p:cNvGrpSpPr/>
+        <p:nvPr/>
+      </p:nvGrpSpPr>
+      <p:grpSpPr>
+        <a:xfrm>
+          <a:off x="0" y="0"/>
+          <a:ext cx="0" cy="0"/>
+          <a:chOff x="0" y="0"/>
+          <a:chExt cx="0" cy="0"/>
+        </a:xfrm>
+      </p:grpSpPr>
+      <p:sp>
+        <p:nvSpPr>
+          <p:cNvPr id="2" name="Title 1">
+            <a:extLst>
+              <a:ext uri="{FF2B5EF4-FFF2-40B4-BE49-F238E27FC236}">
+                <a16:creationId xmlns:a16="http://schemas.microsoft.com/office/drawing/2014/main" id="{7D8AF8FB-793E-41BD-8CC5-A923B5A8209E}"/>
+              </a:ext>
+            </a:extLst>
+          </p:cNvPr>
+          <p:cNvSpPr>
+            <a:spLocks noGrp="1"/>
+          </p:cNvSpPr>
+          <p:nvPr>
+            <p:ph type="title"/>
+          </p:nvPr>
+        </p:nvSpPr>
+        <p:spPr/>
+        <p:txBody>
+          <a:bodyPr/>
+          <a:lstStyle/>
+          <a:p>
+            <a:r>
+              <a:rPr lang="en-US"/>
+              <a:t>Book References</a:t>
+            </a:r>
+            <a:endParaRPr lang="en-US" dirty="0"/>
+          </a:p>
+        </p:txBody>
+      </p:sp>
+      <p:sp>
+        <p:nvSpPr>
+          <p:cNvPr id="3" name="Content Placeholder 2">
+            <a:extLst>
+              <a:ext uri="{FF2B5EF4-FFF2-40B4-BE49-F238E27FC236}">
+                <a16:creationId xmlns:a16="http://schemas.microsoft.com/office/drawing/2014/main" id="{3975127B-114D-4B36-BA13-4EB6781A2CEB}"/>
+              </a:ext>
+            </a:extLst>
+          </p:cNvPr>
+          <p:cNvSpPr>
+            <a:spLocks noGrp="1"/>
+          </p:cNvSpPr>
+          <p:nvPr>
+            <p:ph idx="1"/>
+          </p:nvPr>
+        </p:nvSpPr>
+        <p:spPr/>
+        <p:txBody>
+          <a:bodyPr>
+            <a:normAutofit fontScale="92500" lnSpcReduction="10000"/>
+          </a:bodyPr>
+          <a:lstStyle/>
+          <a:p>
+            <a:r>
+              <a:rPr lang="en-US">
+                <a:hlinkClick r:id="rId2"/>
+              </a:rPr>
+              <a:t>Design Patterns : Elements of Reusable Object-Oriented Software</a:t>
+            </a:r>
+            <a:endParaRPr lang="en-US"/>
+          </a:p>
+          <a:p>
+            <a:pPr lvl="1"/>
+            <a:r>
+              <a:rPr lang="en-US"/>
+              <a:t>ISBN-13: 978-0201633610, ISBN-10: 0201633612</a:t>
+            </a:r>
+          </a:p>
+          <a:p>
+            <a:r>
+              <a:rPr lang="en-US">
+                <a:hlinkClick r:id="rId3"/>
+              </a:rPr>
+              <a:t>Head First Design Patterns</a:t>
+            </a:r>
+            <a:endParaRPr lang="en-US"/>
+          </a:p>
+          <a:p>
+            <a:pPr lvl="1"/>
+            <a:r>
+              <a:rPr lang="en-US"/>
+              <a:t>ISBN-13: 978-0596007126, ISBN-10: 0596007124</a:t>
+            </a:r>
+          </a:p>
+          <a:p>
+            <a:r>
+              <a:rPr lang="en-US">
+                <a:hlinkClick r:id="rId4"/>
+              </a:rPr>
+              <a:t>Clean Code</a:t>
+            </a:r>
+            <a:endParaRPr lang="en-US"/>
+          </a:p>
+          <a:p>
+            <a:pPr lvl="1"/>
+            <a:r>
+              <a:rPr lang="en-US"/>
+              <a:t>ISBN-13: 978-0132350884, ISBN-10: 0132350882</a:t>
+            </a:r>
+          </a:p>
+          <a:p>
+            <a:r>
+              <a:rPr lang="en-US">
+                <a:hlinkClick r:id="rId5"/>
+              </a:rPr>
+              <a:t>The Pragmatic Programmer</a:t>
+            </a:r>
+            <a:endParaRPr lang="en-US"/>
+          </a:p>
+          <a:p>
+            <a:pPr lvl="1"/>
+            <a:r>
+              <a:rPr lang="en-US"/>
+              <a:t>ISBN-13: 978-0201616224, ISBN-10: 020161622X</a:t>
+            </a:r>
+          </a:p>
+          <a:p>
+            <a:r>
+              <a:rPr lang="en-US">
+                <a:hlinkClick r:id="rId6"/>
+              </a:rPr>
+              <a:t>Patterns of Enterprise Application Architecture</a:t>
+            </a:r>
+            <a:endParaRPr lang="en-US"/>
+          </a:p>
+          <a:p>
+            <a:pPr lvl="1"/>
+            <a:r>
+              <a:rPr lang="en-US"/>
+              <a:t>ISBN-13: 978-0321127426, ISBN-10: 0321127420</a:t>
+            </a:r>
+          </a:p>
+          <a:p>
+            <a:endParaRPr lang="en-US" dirty="0"/>
+          </a:p>
+        </p:txBody>
+      </p:sp>
+    </p:spTree>
+    <p:extLst>
+      <p:ext uri="{BB962C8B-B14F-4D97-AF65-F5344CB8AC3E}">
+        <p14:creationId xmlns:p14="http://schemas.microsoft.com/office/powerpoint/2010/main" val="214986796"/>
+      </p:ext>
+    </p:extLst>
+  </p:cSld>
+  <p:clrMapOvr>
+    <a:masterClrMapping/>
+  </p:clrMapOvr>
+</p:sld>
+</file>
+
+<file path=ppt/slides/slide34.xml><?xml version="1.0" encoding="utf-8"?>
+<p:sld xmlns:a="http://schemas.openxmlformats.org/drawingml/2006/main" xmlns:r="http://schemas.openxmlformats.org/officeDocument/2006/relationships" xmlns:p="http://schemas.openxmlformats.org/presentationml/2006/main">
+  <p:cSld>
+    <p:spTree>
+      <p:nvGrpSpPr>
+        <p:cNvPr id="1" name=""/>
+        <p:cNvGrpSpPr/>
+        <p:nvPr/>
+      </p:nvGrpSpPr>
+      <p:grpSpPr>
+        <a:xfrm>
+          <a:off x="0" y="0"/>
+          <a:ext cx="0" cy="0"/>
+          <a:chOff x="0" y="0"/>
+          <a:chExt cx="0" cy="0"/>
+        </a:xfrm>
+      </p:grpSpPr>
+      <p:sp>
+        <p:nvSpPr>
           <p:cNvPr id="2" name="Title 1">
             <a:extLst>
               <a:ext uri="{FF2B5EF4-FFF2-40B4-BE49-F238E27FC236}">
@@ -30865,7 +31313,7 @@
 </p:sld>
 </file>
 
-<file path=ppt/slides/slide32.xml><?xml version="1.0" encoding="utf-8"?>
+<file path=ppt/slides/slide35.xml><?xml version="1.0" encoding="utf-8"?>
 <p:sld xmlns:a="http://schemas.openxmlformats.org/drawingml/2006/main" xmlns:r="http://schemas.openxmlformats.org/officeDocument/2006/relationships" xmlns:p="http://schemas.openxmlformats.org/presentationml/2006/main">
   <p:cSld>
     <p:spTree>

</xml_diff>

<commit_message>
sync to presentation changes;
</commit_message>
<xml_diff>
--- a/Presentation/Better Business Logic with Typescript.pptx
+++ b/Presentation/Better Business Logic with Typescript.pptx
@@ -45,10 +45,15 @@
     <p:sldId id="294" r:id="rId39"/>
     <p:sldId id="296" r:id="rId40"/>
     <p:sldId id="298" r:id="rId41"/>
-    <p:sldId id="264" r:id="rId42"/>
-    <p:sldId id="266" r:id="rId43"/>
-    <p:sldId id="283" r:id="rId44"/>
-    <p:sldId id="265" r:id="rId45"/>
+    <p:sldId id="299" r:id="rId42"/>
+    <p:sldId id="300" r:id="rId43"/>
+    <p:sldId id="301" r:id="rId44"/>
+    <p:sldId id="302" r:id="rId45"/>
+    <p:sldId id="303" r:id="rId46"/>
+    <p:sldId id="264" r:id="rId47"/>
+    <p:sldId id="266" r:id="rId48"/>
+    <p:sldId id="283" r:id="rId49"/>
+    <p:sldId id="265" r:id="rId50"/>
   </p:sldIdLst>
   <p:sldSz cx="12192000" cy="6858000"/>
   <p:notesSz cx="6858000" cy="9144000"/>
@@ -155,21 +160,21 @@
             <p14:sldId id="285"/>
           </p14:sldIdLst>
         </p14:section>
-        <p14:section name="Introduction" id="{83B04615-31A6-4B7E-878E-686DCDB2A179}">
+        <p14:section name="Introduction (10:30)" id="{83B04615-31A6-4B7E-878E-686DCDB2A179}">
           <p14:sldIdLst>
             <p14:sldId id="256"/>
             <p14:sldId id="267"/>
             <p14:sldId id="259"/>
           </p14:sldIdLst>
         </p14:section>
-        <p14:section name="Business Logic" id="{0CD41555-1EC9-4B9C-BEC5-0B3FF748B9DF}">
+        <p14:section name="Business Logic (10:33)" id="{0CD41555-1EC9-4B9C-BEC5-0B3FF748B9DF}">
           <p14:sldIdLst>
             <p14:sldId id="279"/>
             <p14:sldId id="257"/>
             <p14:sldId id="258"/>
           </p14:sldIdLst>
         </p14:section>
-        <p14:section name="Elements of Angular" id="{5FD040E9-5556-4446-BDF9-560BABFEAF0F}">
+        <p14:section name="Elements of Angular (10:38)" id="{5FD040E9-5556-4446-BDF9-560BABFEAF0F}">
           <p14:sldIdLst>
             <p14:sldId id="286"/>
             <p14:sldId id="284"/>
@@ -180,7 +185,7 @@
             <p14:sldId id="273"/>
           </p14:sldIdLst>
         </p14:section>
-        <p14:section name="Design Pattern Overview" id="{8CADB0D0-EDD8-4373-9246-33425B26B435}">
+        <p14:section name="Design Pattern Overview (10:45)" id="{8CADB0D0-EDD8-4373-9246-33425B26B435}">
           <p14:sldIdLst>
             <p14:sldId id="287"/>
             <p14:sldId id="260"/>
@@ -190,13 +195,13 @@
             <p14:sldId id="270"/>
           </p14:sldIdLst>
         </p14:section>
-        <p14:section name="Facade Pattern" id="{51A8B01A-10DA-481A-9E9C-D957080DFDAC}">
+        <p14:section name="Facade Pattern (10:52)" id="{51A8B01A-10DA-481A-9E9C-D957080DFDAC}">
           <p14:sldIdLst>
             <p14:sldId id="288"/>
             <p14:sldId id="268"/>
           </p14:sldIdLst>
         </p14:section>
-        <p14:section name="Template Method Pattern" id="{39596736-26BB-4349-828A-7BF627366848}">
+        <p14:section name="Template Method Pattern (10:54)" id="{39596736-26BB-4349-828A-7BF627366848}">
           <p14:sldIdLst>
             <p14:sldId id="295"/>
             <p14:sldId id="274"/>
@@ -212,10 +217,19 @@
             <p14:sldId id="294"/>
           </p14:sldIdLst>
         </p14:section>
-        <p14:section name="Composite Pattern" id="{CBE4451F-D89E-422E-9EA7-534CA7CD98A8}">
+        <p14:section name="Composite Pattern (11:20)" id="{CBE4451F-D89E-422E-9EA7-534CA7CD98A8}">
           <p14:sldIdLst>
             <p14:sldId id="296"/>
             <p14:sldId id="298"/>
+            <p14:sldId id="299"/>
+            <p14:sldId id="300"/>
+            <p14:sldId id="301"/>
+          </p14:sldIdLst>
+        </p14:section>
+        <p14:section name="Conclusion (11:36)" id="{55277C3F-C315-4149-BBFC-6D32F5A11FB0}">
+          <p14:sldIdLst>
+            <p14:sldId id="302"/>
+            <p14:sldId id="303"/>
           </p14:sldIdLst>
         </p14:section>
         <p14:section name="References" id="{5423D470-F98F-46CC-AAC0-7790DAF9F850}">
@@ -962,7 +976,7 @@
             <a:fld id="{B61BEF0D-F0BB-DE4B-95CE-6DB70DBA9567}" type="datetimeFigureOut">
               <a:rPr lang="en-US" dirty="0"/>
               <a:pPr/>
-              <a:t>6/22/2017</a:t>
+              <a:t>6/23/2017</a:t>
             </a:fld>
             <a:endParaRPr lang="en-US" dirty="0"/>
           </a:p>
@@ -1215,7 +1229,7 @@
             <a:fld id="{B61BEF0D-F0BB-DE4B-95CE-6DB70DBA9567}" type="datetimeFigureOut">
               <a:rPr lang="en-US" dirty="0"/>
               <a:pPr/>
-              <a:t>6/22/2017</a:t>
+              <a:t>6/23/2017</a:t>
             </a:fld>
             <a:endParaRPr lang="en-US" dirty="0"/>
           </a:p>
@@ -1531,7 +1545,7 @@
             <a:fld id="{B61BEF0D-F0BB-DE4B-95CE-6DB70DBA9567}" type="datetimeFigureOut">
               <a:rPr lang="en-US" dirty="0"/>
               <a:pPr/>
-              <a:t>6/22/2017</a:t>
+              <a:t>6/23/2017</a:t>
             </a:fld>
             <a:endParaRPr lang="en-US" dirty="0"/>
           </a:p>
@@ -1874,7 +1888,7 @@
             <a:fld id="{B61BEF0D-F0BB-DE4B-95CE-6DB70DBA9567}" type="datetimeFigureOut">
               <a:rPr lang="en-US" dirty="0"/>
               <a:pPr/>
-              <a:t>6/22/2017</a:t>
+              <a:t>6/23/2017</a:t>
             </a:fld>
             <a:endParaRPr lang="en-US" dirty="0"/>
           </a:p>
@@ -2190,7 +2204,7 @@
             <a:fld id="{B61BEF0D-F0BB-DE4B-95CE-6DB70DBA9567}" type="datetimeFigureOut">
               <a:rPr lang="en-US" dirty="0"/>
               <a:pPr/>
-              <a:t>6/22/2017</a:t>
+              <a:t>6/23/2017</a:t>
             </a:fld>
             <a:endParaRPr lang="en-US" dirty="0"/>
           </a:p>
@@ -2585,7 +2599,7 @@
             <a:fld id="{B61BEF0D-F0BB-DE4B-95CE-6DB70DBA9567}" type="datetimeFigureOut">
               <a:rPr lang="en-US" dirty="0"/>
               <a:pPr/>
-              <a:t>6/22/2017</a:t>
+              <a:t>6/23/2017</a:t>
             </a:fld>
             <a:endParaRPr lang="en-US" dirty="0"/>
           </a:p>
@@ -2756,7 +2770,7 @@
           <a:p>
             <a:fld id="{55C6B4A9-1611-4792-9094-5F34BCA07E0B}" type="datetimeFigureOut">
               <a:rPr lang="en-US" dirty="0"/>
-              <a:t>6/22/2017</a:t>
+              <a:t>6/23/2017</a:t>
             </a:fld>
             <a:endParaRPr lang="en-US" dirty="0"/>
           </a:p>
@@ -2937,7 +2951,7 @@
             <a:fld id="{B61BEF0D-F0BB-DE4B-95CE-6DB70DBA9567}" type="datetimeFigureOut">
               <a:rPr lang="en-US" dirty="0"/>
               <a:pPr/>
-              <a:t>6/22/2017</a:t>
+              <a:t>6/23/2017</a:t>
             </a:fld>
             <a:endParaRPr lang="en-US" dirty="0"/>
           </a:p>
@@ -3138,7 +3152,7 @@
           <a:p>
             <a:fld id="{48A87A34-81AB-432B-8DAE-1953F412C126}" type="datetimeFigureOut">
               <a:rPr lang="en-US" dirty="0"/>
-              <a:t>6/22/2017</a:t>
+              <a:t>6/23/2017</a:t>
             </a:fld>
             <a:endParaRPr lang="en-US" dirty="0"/>
           </a:p>
@@ -3349,7 +3363,7 @@
           <a:p>
             <a:fld id="{48A87A34-81AB-432B-8DAE-1953F412C126}" type="datetimeFigureOut">
               <a:rPr lang="en-US" dirty="0"/>
-              <a:t>6/22/2017</a:t>
+              <a:t>6/23/2017</a:t>
             </a:fld>
             <a:endParaRPr lang="en-US" dirty="0"/>
           </a:p>
@@ -3628,7 +3642,7 @@
           <a:p>
             <a:fld id="{48A87A34-81AB-432B-8DAE-1953F412C126}" type="datetimeFigureOut">
               <a:rPr lang="en-US" dirty="0"/>
-              <a:t>6/22/2017</a:t>
+              <a:t>6/23/2017</a:t>
             </a:fld>
             <a:endParaRPr lang="en-US" dirty="0"/>
           </a:p>
@@ -3836,7 +3850,7 @@
             <a:fld id="{B61BEF0D-F0BB-DE4B-95CE-6DB70DBA9567}" type="datetimeFigureOut">
               <a:rPr lang="en-US" dirty="0"/>
               <a:pPr/>
-              <a:t>6/22/2017</a:t>
+              <a:t>6/23/2017</a:t>
             </a:fld>
             <a:endParaRPr lang="en-US" dirty="0"/>
           </a:p>
@@ -4074,7 +4088,7 @@
           <a:p>
             <a:fld id="{48A87A34-81AB-432B-8DAE-1953F412C126}" type="datetimeFigureOut">
               <a:rPr lang="en-US" dirty="0"/>
-              <a:t>6/22/2017</a:t>
+              <a:t>6/23/2017</a:t>
             </a:fld>
             <a:endParaRPr lang="en-US" dirty="0"/>
           </a:p>
@@ -4490,7 +4504,7 @@
           <a:p>
             <a:fld id="{48A87A34-81AB-432B-8DAE-1953F412C126}" type="datetimeFigureOut">
               <a:rPr lang="en-US" dirty="0"/>
-              <a:t>6/22/2017</a:t>
+              <a:t>6/23/2017</a:t>
             </a:fld>
             <a:endParaRPr lang="en-US" dirty="0"/>
           </a:p>
@@ -4639,7 +4653,7 @@
           <a:p>
             <a:fld id="{48A87A34-81AB-432B-8DAE-1953F412C126}" type="datetimeFigureOut">
               <a:rPr lang="en-US" dirty="0"/>
-              <a:t>6/22/2017</a:t>
+              <a:t>6/23/2017</a:t>
             </a:fld>
             <a:endParaRPr lang="en-US" dirty="0"/>
           </a:p>
@@ -4765,7 +4779,7 @@
           <a:p>
             <a:fld id="{48A87A34-81AB-432B-8DAE-1953F412C126}" type="datetimeFigureOut">
               <a:rPr lang="en-US" dirty="0"/>
-              <a:t>6/22/2017</a:t>
+              <a:t>6/23/2017</a:t>
             </a:fld>
             <a:endParaRPr lang="en-US" dirty="0"/>
           </a:p>
@@ -5016,7 +5030,7 @@
           <a:p>
             <a:fld id="{48A87A34-81AB-432B-8DAE-1953F412C126}" type="datetimeFigureOut">
               <a:rPr lang="en-US" dirty="0"/>
-              <a:t>6/22/2017</a:t>
+              <a:t>6/23/2017</a:t>
             </a:fld>
             <a:endParaRPr lang="en-US" dirty="0"/>
           </a:p>
@@ -5462,7 +5476,7 @@
             <a:fld id="{48A87A34-81AB-432B-8DAE-1953F412C126}" type="datetimeFigureOut">
               <a:rPr lang="en-US" dirty="0"/>
               <a:pPr/>
-              <a:t>6/22/2017</a:t>
+              <a:t>6/23/2017</a:t>
             </a:fld>
             <a:endParaRPr lang="en-US" dirty="0"/>
           </a:p>
@@ -5668,7 +5682,7 @@
           <a:p>
             <a:fld id="{48A87A34-81AB-432B-8DAE-1953F412C126}" type="datetimeFigureOut">
               <a:rPr lang="en-US" dirty="0"/>
-              <a:t>6/22/2017</a:t>
+              <a:t>6/23/2017</a:t>
             </a:fld>
             <a:endParaRPr lang="en-US" dirty="0"/>
           </a:p>
@@ -5883,7 +5897,7 @@
           <a:p>
             <a:fld id="{48A87A34-81AB-432B-8DAE-1953F412C126}" type="datetimeFigureOut">
               <a:rPr lang="en-US" dirty="0"/>
-              <a:t>6/22/2017</a:t>
+              <a:t>6/23/2017</a:t>
             </a:fld>
             <a:endParaRPr lang="en-US" dirty="0"/>
           </a:p>
@@ -6161,7 +6175,7 @@
           <a:p>
             <a:fld id="{4AAD347D-5ACD-4C99-B74B-A9C85AD731AF}" type="datetimeFigureOut">
               <a:rPr lang="en-US" dirty="0"/>
-              <a:t>6/22/2017</a:t>
+              <a:t>6/23/2017</a:t>
             </a:fld>
             <a:endParaRPr lang="en-US" dirty="0"/>
           </a:p>
@@ -6331,7 +6345,7 @@
           <a:p>
             <a:fld id="{4509A250-FF31-4206-8172-F9D3106AACB1}" type="datetimeFigureOut">
               <a:rPr lang="en-US" dirty="0"/>
-              <a:t>6/22/2017</a:t>
+              <a:t>6/23/2017</a:t>
             </a:fld>
             <a:endParaRPr lang="en-US" dirty="0"/>
           </a:p>
@@ -6579,7 +6593,7 @@
             <a:fld id="{B61BEF0D-F0BB-DE4B-95CE-6DB70DBA9567}" type="datetimeFigureOut">
               <a:rPr lang="en-US" dirty="0"/>
               <a:pPr/>
-              <a:t>6/22/2017</a:t>
+              <a:t>6/23/2017</a:t>
             </a:fld>
             <a:endParaRPr lang="en-US" dirty="0"/>
           </a:p>
@@ -6827,7 +6841,7 @@
           <a:p>
             <a:fld id="{9796027F-7875-4030-9381-8BD8C4F21935}" type="datetimeFigureOut">
               <a:rPr lang="en-US" dirty="0"/>
-              <a:t>6/22/2017</a:t>
+              <a:t>6/23/2017</a:t>
             </a:fld>
             <a:endParaRPr lang="en-US" dirty="0"/>
           </a:p>
@@ -7119,7 +7133,7 @@
           <a:p>
             <a:fld id="{9796027F-7875-4030-9381-8BD8C4F21935}" type="datetimeFigureOut">
               <a:rPr lang="en-US" dirty="0"/>
-              <a:t>6/22/2017</a:t>
+              <a:t>6/23/2017</a:t>
             </a:fld>
             <a:endParaRPr lang="en-US" dirty="0"/>
           </a:p>
@@ -7563,7 +7577,7 @@
           <a:p>
             <a:fld id="{9796027F-7875-4030-9381-8BD8C4F21935}" type="datetimeFigureOut">
               <a:rPr lang="en-US" dirty="0"/>
-              <a:t>6/22/2017</a:t>
+              <a:t>6/23/2017</a:t>
             </a:fld>
             <a:endParaRPr lang="en-US" dirty="0"/>
           </a:p>
@@ -7681,7 +7695,7 @@
           <a:p>
             <a:fld id="{4509A250-FF31-4206-8172-F9D3106AACB1}" type="datetimeFigureOut">
               <a:rPr lang="en-US" dirty="0"/>
-              <a:t>6/22/2017</a:t>
+              <a:t>6/23/2017</a:t>
             </a:fld>
             <a:endParaRPr lang="en-US" dirty="0"/>
           </a:p>
@@ -7776,7 +7790,7 @@
           <a:p>
             <a:fld id="{4509A250-FF31-4206-8172-F9D3106AACB1}" type="datetimeFigureOut">
               <a:rPr lang="en-US" dirty="0"/>
-              <a:t>6/22/2017</a:t>
+              <a:t>6/23/2017</a:t>
             </a:fld>
             <a:endParaRPr lang="en-US" dirty="0"/>
           </a:p>
@@ -8055,7 +8069,7 @@
           <a:p>
             <a:fld id="{4509A250-FF31-4206-8172-F9D3106AACB1}" type="datetimeFigureOut">
               <a:rPr lang="en-US" dirty="0"/>
-              <a:t>6/22/2017</a:t>
+              <a:t>6/23/2017</a:t>
             </a:fld>
             <a:endParaRPr lang="en-US" dirty="0"/>
           </a:p>
@@ -8330,7 +8344,7 @@
           <a:p>
             <a:fld id="{4509A250-FF31-4206-8172-F9D3106AACB1}" type="datetimeFigureOut">
               <a:rPr lang="en-US" dirty="0"/>
-              <a:t>6/22/2017</a:t>
+              <a:t>6/23/2017</a:t>
             </a:fld>
             <a:endParaRPr lang="en-US" dirty="0"/>
           </a:p>
@@ -8605,7 +8619,7 @@
           <a:p>
             <a:fld id="{4509A250-FF31-4206-8172-F9D3106AACB1}" type="datetimeFigureOut">
               <a:rPr lang="en-US" dirty="0"/>
-              <a:t>6/22/2017</a:t>
+              <a:t>6/23/2017</a:t>
             </a:fld>
             <a:endParaRPr lang="en-US" dirty="0"/>
           </a:p>
@@ -8799,7 +8813,7 @@
           <a:p>
             <a:fld id="{4509A250-FF31-4206-8172-F9D3106AACB1}" type="datetimeFigureOut">
               <a:rPr lang="en-US" dirty="0"/>
-              <a:t>6/22/2017</a:t>
+              <a:t>6/23/2017</a:t>
             </a:fld>
             <a:endParaRPr lang="en-US" dirty="0"/>
           </a:p>
@@ -9072,7 +9086,7 @@
           <a:p>
             <a:fld id="{4509A250-FF31-4206-8172-F9D3106AACB1}" type="datetimeFigureOut">
               <a:rPr lang="en-US" dirty="0"/>
-              <a:t>6/22/2017</a:t>
+              <a:t>6/23/2017</a:t>
             </a:fld>
             <a:endParaRPr lang="en-US" dirty="0"/>
           </a:p>
@@ -9398,7 +9412,7 @@
           <a:p>
             <a:fld id="{EB712588-04B1-427B-82EE-E8DB90309F08}" type="datetimeFigureOut">
               <a:rPr lang="en-US" dirty="0"/>
-              <a:t>6/22/2017</a:t>
+              <a:t>6/23/2017</a:t>
             </a:fld>
             <a:endParaRPr lang="en-US" dirty="0"/>
           </a:p>
@@ -9645,7 +9659,7 @@
           <a:p>
             <a:fld id="{4509A250-FF31-4206-8172-F9D3106AACB1}" type="datetimeFigureOut">
               <a:rPr lang="en-US" dirty="0"/>
-              <a:t>6/22/2017</a:t>
+              <a:t>6/23/2017</a:t>
             </a:fld>
             <a:endParaRPr lang="en-US" dirty="0"/>
           </a:p>
@@ -10268,7 +10282,7 @@
           <a:p>
             <a:fld id="{4509A250-FF31-4206-8172-F9D3106AACB1}" type="datetimeFigureOut">
               <a:rPr lang="en-US" dirty="0"/>
-              <a:t>6/22/2017</a:t>
+              <a:t>6/23/2017</a:t>
             </a:fld>
             <a:endParaRPr lang="en-US" dirty="0"/>
           </a:p>
@@ -11128,7 +11142,7 @@
           <a:p>
             <a:fld id="{4509A250-FF31-4206-8172-F9D3106AACB1}" type="datetimeFigureOut">
               <a:rPr lang="en-US" dirty="0"/>
-              <a:t>6/22/2017</a:t>
+              <a:t>6/23/2017</a:t>
             </a:fld>
             <a:endParaRPr lang="en-US" dirty="0"/>
           </a:p>
@@ -11298,7 +11312,7 @@
           <a:p>
             <a:fld id="{4509A250-FF31-4206-8172-F9D3106AACB1}" type="datetimeFigureOut">
               <a:rPr lang="en-US" dirty="0"/>
-              <a:t>6/22/2017</a:t>
+              <a:t>6/23/2017</a:t>
             </a:fld>
             <a:endParaRPr lang="en-US" dirty="0"/>
           </a:p>
@@ -11478,7 +11492,7 @@
           <a:p>
             <a:fld id="{4509A250-FF31-4206-8172-F9D3106AACB1}" type="datetimeFigureOut">
               <a:rPr lang="en-US" dirty="0"/>
-              <a:t>6/22/2017</a:t>
+              <a:t>6/23/2017</a:t>
             </a:fld>
             <a:endParaRPr lang="en-US" dirty="0"/>
           </a:p>
@@ -11635,7 +11649,7 @@
           <a:p>
             <a:fld id="{90786BE5-D2A3-4BF0-8B30-D7403E61B3DC}" type="datetimeFigureOut">
               <a:rPr lang="en-US" smtClean="0"/>
-              <a:t>6/22/2017</a:t>
+              <a:t>6/23/2017</a:t>
             </a:fld>
             <a:endParaRPr lang="en-US" dirty="0"/>
           </a:p>
@@ -11922,7 +11936,7 @@
           <a:p>
             <a:fld id="{4AAD347D-5ACD-4C99-B74B-A9C85AD731AF}" type="datetimeFigureOut">
               <a:rPr lang="en-US" dirty="0"/>
-              <a:t>6/22/2017</a:t>
+              <a:t>6/23/2017</a:t>
             </a:fld>
             <a:endParaRPr lang="en-US" dirty="0"/>
           </a:p>
@@ -12092,7 +12106,7 @@
           <a:p>
             <a:fld id="{4509A250-FF31-4206-8172-F9D3106AACB1}" type="datetimeFigureOut">
               <a:rPr lang="en-US" dirty="0"/>
-              <a:t>6/22/2017</a:t>
+              <a:t>6/23/2017</a:t>
             </a:fld>
             <a:endParaRPr lang="en-US" dirty="0"/>
           </a:p>
@@ -12339,7 +12353,7 @@
           <a:p>
             <a:fld id="{9796027F-7875-4030-9381-8BD8C4F21935}" type="datetimeFigureOut">
               <a:rPr lang="en-US" dirty="0"/>
-              <a:t>6/22/2017</a:t>
+              <a:t>6/23/2017</a:t>
             </a:fld>
             <a:endParaRPr lang="en-US" dirty="0"/>
           </a:p>
@@ -12631,7 +12645,7 @@
           <a:p>
             <a:fld id="{9796027F-7875-4030-9381-8BD8C4F21935}" type="datetimeFigureOut">
               <a:rPr lang="en-US" dirty="0"/>
-              <a:t>6/22/2017</a:t>
+              <a:t>6/23/2017</a:t>
             </a:fld>
             <a:endParaRPr lang="en-US" dirty="0"/>
           </a:p>
@@ -13006,7 +13020,7 @@
             <a:fld id="{B61BEF0D-F0BB-DE4B-95CE-6DB70DBA9567}" type="datetimeFigureOut">
               <a:rPr lang="en-US" dirty="0"/>
               <a:pPr/>
-              <a:t>6/22/2017</a:t>
+              <a:t>6/23/2017</a:t>
             </a:fld>
             <a:endParaRPr lang="en-US" dirty="0"/>
           </a:p>
@@ -13451,7 +13465,7 @@
           <a:p>
             <a:fld id="{9796027F-7875-4030-9381-8BD8C4F21935}" type="datetimeFigureOut">
               <a:rPr lang="en-US" dirty="0"/>
-              <a:t>6/22/2017</a:t>
+              <a:t>6/23/2017</a:t>
             </a:fld>
             <a:endParaRPr lang="en-US" dirty="0"/>
           </a:p>
@@ -13569,7 +13583,7 @@
           <a:p>
             <a:fld id="{4509A250-FF31-4206-8172-F9D3106AACB1}" type="datetimeFigureOut">
               <a:rPr lang="en-US" dirty="0"/>
-              <a:t>6/22/2017</a:t>
+              <a:t>6/23/2017</a:t>
             </a:fld>
             <a:endParaRPr lang="en-US" dirty="0"/>
           </a:p>
@@ -13664,7 +13678,7 @@
           <a:p>
             <a:fld id="{4509A250-FF31-4206-8172-F9D3106AACB1}" type="datetimeFigureOut">
               <a:rPr lang="en-US" dirty="0"/>
-              <a:t>6/22/2017</a:t>
+              <a:t>6/23/2017</a:t>
             </a:fld>
             <a:endParaRPr lang="en-US" dirty="0"/>
           </a:p>
@@ -13943,7 +13957,7 @@
           <a:p>
             <a:fld id="{4509A250-FF31-4206-8172-F9D3106AACB1}" type="datetimeFigureOut">
               <a:rPr lang="en-US" dirty="0"/>
-              <a:t>6/22/2017</a:t>
+              <a:t>6/23/2017</a:t>
             </a:fld>
             <a:endParaRPr lang="en-US" dirty="0"/>
           </a:p>
@@ -14218,7 +14232,7 @@
           <a:p>
             <a:fld id="{4509A250-FF31-4206-8172-F9D3106AACB1}" type="datetimeFigureOut">
               <a:rPr lang="en-US" dirty="0"/>
-              <a:t>6/22/2017</a:t>
+              <a:t>6/23/2017</a:t>
             </a:fld>
             <a:endParaRPr lang="en-US" dirty="0"/>
           </a:p>
@@ -14493,7 +14507,7 @@
           <a:p>
             <a:fld id="{4509A250-FF31-4206-8172-F9D3106AACB1}" type="datetimeFigureOut">
               <a:rPr lang="en-US" dirty="0"/>
-              <a:t>6/22/2017</a:t>
+              <a:t>6/23/2017</a:t>
             </a:fld>
             <a:endParaRPr lang="en-US" dirty="0"/>
           </a:p>
@@ -14687,7 +14701,7 @@
           <a:p>
             <a:fld id="{4509A250-FF31-4206-8172-F9D3106AACB1}" type="datetimeFigureOut">
               <a:rPr lang="en-US" dirty="0"/>
-              <a:t>6/22/2017</a:t>
+              <a:t>6/23/2017</a:t>
             </a:fld>
             <a:endParaRPr lang="en-US" dirty="0"/>
           </a:p>
@@ -14960,7 +14974,7 @@
           <a:p>
             <a:fld id="{4509A250-FF31-4206-8172-F9D3106AACB1}" type="datetimeFigureOut">
               <a:rPr lang="en-US" dirty="0"/>
-              <a:t>6/22/2017</a:t>
+              <a:t>6/23/2017</a:t>
             </a:fld>
             <a:endParaRPr lang="en-US" dirty="0"/>
           </a:p>
@@ -15301,7 +15315,7 @@
           <a:p>
             <a:fld id="{4509A250-FF31-4206-8172-F9D3106AACB1}" type="datetimeFigureOut">
               <a:rPr lang="en-US" dirty="0"/>
-              <a:t>6/22/2017</a:t>
+              <a:t>6/23/2017</a:t>
             </a:fld>
             <a:endParaRPr lang="en-US" dirty="0"/>
           </a:p>
@@ -15924,7 +15938,7 @@
           <a:p>
             <a:fld id="{4509A250-FF31-4206-8172-F9D3106AACB1}" type="datetimeFigureOut">
               <a:rPr lang="en-US" dirty="0"/>
-              <a:t>6/22/2017</a:t>
+              <a:t>6/23/2017</a:t>
             </a:fld>
             <a:endParaRPr lang="en-US" dirty="0"/>
           </a:p>
@@ -16048,7 +16062,7 @@
             <a:fld id="{B61BEF0D-F0BB-DE4B-95CE-6DB70DBA9567}" type="datetimeFigureOut">
               <a:rPr lang="en-US" dirty="0"/>
               <a:pPr/>
-              <a:t>6/22/2017</a:t>
+              <a:t>6/23/2017</a:t>
             </a:fld>
             <a:endParaRPr lang="en-US" dirty="0"/>
           </a:p>
@@ -16909,7 +16923,7 @@
           <a:p>
             <a:fld id="{4509A250-FF31-4206-8172-F9D3106AACB1}" type="datetimeFigureOut">
               <a:rPr lang="en-US" dirty="0"/>
-              <a:t>6/22/2017</a:t>
+              <a:t>6/23/2017</a:t>
             </a:fld>
             <a:endParaRPr lang="en-US" dirty="0"/>
           </a:p>
@@ -17079,7 +17093,7 @@
           <a:p>
             <a:fld id="{4509A250-FF31-4206-8172-F9D3106AACB1}" type="datetimeFigureOut">
               <a:rPr lang="en-US" dirty="0"/>
-              <a:t>6/22/2017</a:t>
+              <a:t>6/23/2017</a:t>
             </a:fld>
             <a:endParaRPr lang="en-US" dirty="0"/>
           </a:p>
@@ -17259,7 +17273,7 @@
           <a:p>
             <a:fld id="{4509A250-FF31-4206-8172-F9D3106AACB1}" type="datetimeFigureOut">
               <a:rPr lang="en-US" dirty="0"/>
-              <a:t>6/22/2017</a:t>
+              <a:t>6/23/2017</a:t>
             </a:fld>
             <a:endParaRPr lang="en-US" dirty="0"/>
           </a:p>
@@ -17415,7 +17429,7 @@
           <a:effectLst/>
           <a:extLst>
             <a:ext uri="{91240B29-F687-4f45-9708-019B960494DF}">
-              <a14:hiddenLine xmlns="" xmlns:a14="http://schemas.microsoft.com/office/drawing/2010/main" w="9525">
+              <a14:hiddenLine xmlns:a14="http://schemas.microsoft.com/office/drawing/2010/main" xmlns="" w="9525">
                 <a:solidFill>
                   <a:srgbClr val="000000"/>
                 </a:solidFill>
@@ -17608,7 +17622,7 @@
             <a:fld id="{B61BEF0D-F0BB-DE4B-95CE-6DB70DBA9567}" type="datetimeFigureOut">
               <a:rPr lang="en-US" smtClean="0"/>
               <a:pPr/>
-              <a:t>6/22/2017</a:t>
+              <a:t>6/23/2017</a:t>
             </a:fld>
             <a:endParaRPr lang="en-US" dirty="0"/>
           </a:p>
@@ -17764,7 +17778,7 @@
           <a:ln/>
           <a:extLst>
             <a:ext uri="{91240B29-F687-4f45-9708-019B960494DF}">
-              <a14:hiddenLine xmlns="" xmlns:a14="http://schemas.microsoft.com/office/drawing/2010/main" w="9525">
+              <a14:hiddenLine xmlns:a14="http://schemas.microsoft.com/office/drawing/2010/main" xmlns="" w="9525">
                 <a:solidFill>
                   <a:srgbClr val="000000"/>
                 </a:solidFill>
@@ -17893,7 +17907,7 @@
             <a:fld id="{B61BEF0D-F0BB-DE4B-95CE-6DB70DBA9567}" type="datetimeFigureOut">
               <a:rPr lang="en-US" smtClean="0"/>
               <a:pPr/>
-              <a:t>6/22/2017</a:t>
+              <a:t>6/23/2017</a:t>
             </a:fld>
             <a:endParaRPr lang="en-US" dirty="0"/>
           </a:p>
@@ -18238,7 +18252,7 @@
             <a:fld id="{B61BEF0D-F0BB-DE4B-95CE-6DB70DBA9567}" type="datetimeFigureOut">
               <a:rPr lang="en-US" smtClean="0"/>
               <a:pPr/>
-              <a:t>6/22/2017</a:t>
+              <a:t>6/23/2017</a:t>
             </a:fld>
             <a:endParaRPr lang="en-US" dirty="0"/>
           </a:p>
@@ -18394,7 +18408,7 @@
           <a:ln/>
           <a:extLst>
             <a:ext uri="{91240B29-F687-4f45-9708-019B960494DF}">
-              <a14:hiddenLine xmlns="" xmlns:a14="http://schemas.microsoft.com/office/drawing/2010/main" w="9525">
+              <a14:hiddenLine xmlns:a14="http://schemas.microsoft.com/office/drawing/2010/main" xmlns="" w="9525">
                 <a:solidFill>
                   <a:srgbClr val="000000"/>
                 </a:solidFill>
@@ -18578,7 +18592,7 @@
           <a:p>
             <a:fld id="{EB712588-04B1-427B-82EE-E8DB90309F08}" type="datetimeFigureOut">
               <a:rPr lang="en-US" smtClean="0"/>
-              <a:t>6/22/2017</a:t>
+              <a:t>6/23/2017</a:t>
             </a:fld>
             <a:endParaRPr lang="en-US" dirty="0"/>
           </a:p>
@@ -18733,7 +18747,7 @@
           <a:ln/>
           <a:extLst>
             <a:ext uri="{91240B29-F687-4f45-9708-019B960494DF}">
-              <a14:hiddenLine xmlns="" xmlns:a14="http://schemas.microsoft.com/office/drawing/2010/main" w="9525">
+              <a14:hiddenLine xmlns:a14="http://schemas.microsoft.com/office/drawing/2010/main" xmlns="" w="9525">
                 <a:solidFill>
                   <a:srgbClr val="000000"/>
                 </a:solidFill>
@@ -19056,7 +19070,7 @@
             <a:fld id="{B61BEF0D-F0BB-DE4B-95CE-6DB70DBA9567}" type="datetimeFigureOut">
               <a:rPr lang="en-US" smtClean="0"/>
               <a:pPr/>
-              <a:t>6/22/2017</a:t>
+              <a:t>6/23/2017</a:t>
             </a:fld>
             <a:endParaRPr lang="en-US" dirty="0"/>
           </a:p>
@@ -19212,7 +19226,7 @@
           <a:ln/>
           <a:extLst>
             <a:ext uri="{91240B29-F687-4f45-9708-019B960494DF}">
-              <a14:hiddenLine xmlns="" xmlns:a14="http://schemas.microsoft.com/office/drawing/2010/main" w="9525">
+              <a14:hiddenLine xmlns:a14="http://schemas.microsoft.com/office/drawing/2010/main" xmlns="" w="9525">
                 <a:solidFill>
                   <a:srgbClr val="000000"/>
                 </a:solidFill>
@@ -19279,7 +19293,7 @@
             <a:fld id="{B61BEF0D-F0BB-DE4B-95CE-6DB70DBA9567}" type="datetimeFigureOut">
               <a:rPr lang="en-US" smtClean="0"/>
               <a:pPr/>
-              <a:t>6/22/2017</a:t>
+              <a:t>6/23/2017</a:t>
             </a:fld>
             <a:endParaRPr lang="en-US" dirty="0"/>
           </a:p>
@@ -19376,7 +19390,7 @@
             <a:fld id="{B61BEF0D-F0BB-DE4B-95CE-6DB70DBA9567}" type="datetimeFigureOut">
               <a:rPr lang="en-US" smtClean="0"/>
               <a:pPr/>
-              <a:t>6/22/2017</a:t>
+              <a:t>6/23/2017</a:t>
             </a:fld>
             <a:endParaRPr lang="en-US" dirty="0"/>
           </a:p>
@@ -19473,7 +19487,7 @@
             <a:fld id="{B61BEF0D-F0BB-DE4B-95CE-6DB70DBA9567}" type="datetimeFigureOut">
               <a:rPr lang="en-US" dirty="0"/>
               <a:pPr/>
-              <a:t>6/22/2017</a:t>
+              <a:t>6/23/2017</a:t>
             </a:fld>
             <a:endParaRPr lang="en-US" dirty="0"/>
           </a:p>
@@ -19742,7 +19756,7 @@
           <a:ln/>
           <a:extLst>
             <a:ext uri="{91240B29-F687-4f45-9708-019B960494DF}">
-              <a14:hiddenLine xmlns="" xmlns:a14="http://schemas.microsoft.com/office/drawing/2010/main" w="9525">
+              <a14:hiddenLine xmlns:a14="http://schemas.microsoft.com/office/drawing/2010/main" xmlns="" w="9525">
                 <a:solidFill>
                   <a:srgbClr val="000000"/>
                 </a:solidFill>
@@ -19941,7 +19955,7 @@
           <a:p>
             <a:fld id="{42A54C80-263E-416B-A8E0-580EDEADCBDC}" type="datetimeFigureOut">
               <a:rPr lang="en-US" smtClean="0"/>
-              <a:t>6/22/2017</a:t>
+              <a:t>6/23/2017</a:t>
             </a:fld>
             <a:endParaRPr lang="en-US" dirty="0"/>
           </a:p>
@@ -20255,7 +20269,7 @@
             <a:fld id="{B61BEF0D-F0BB-DE4B-95CE-6DB70DBA9567}" type="datetimeFigureOut">
               <a:rPr lang="en-US" smtClean="0"/>
               <a:pPr/>
-              <a:t>6/22/2017</a:t>
+              <a:t>6/23/2017</a:t>
             </a:fld>
             <a:endParaRPr lang="en-US" dirty="0"/>
           </a:p>
@@ -20585,7 +20599,7 @@
             <a:fld id="{B61BEF0D-F0BB-DE4B-95CE-6DB70DBA9567}" type="datetimeFigureOut">
               <a:rPr lang="en-US" smtClean="0"/>
               <a:pPr/>
-              <a:t>6/22/2017</a:t>
+              <a:t>6/23/2017</a:t>
             </a:fld>
             <a:endParaRPr lang="en-US" dirty="0"/>
           </a:p>
@@ -21075,7 +21089,7 @@
             <a:fld id="{B61BEF0D-F0BB-DE4B-95CE-6DB70DBA9567}" type="datetimeFigureOut">
               <a:rPr lang="en-US" smtClean="0"/>
               <a:pPr/>
-              <a:t>6/22/2017</a:t>
+              <a:t>6/23/2017</a:t>
             </a:fld>
             <a:endParaRPr lang="en-US" dirty="0"/>
           </a:p>
@@ -21446,7 +21460,7 @@
             <a:fld id="{B61BEF0D-F0BB-DE4B-95CE-6DB70DBA9567}" type="datetimeFigureOut">
               <a:rPr lang="en-US" smtClean="0"/>
               <a:pPr/>
-              <a:t>6/22/2017</a:t>
+              <a:t>6/23/2017</a:t>
             </a:fld>
             <a:endParaRPr lang="en-US" dirty="0"/>
           </a:p>
@@ -21602,7 +21616,7 @@
           <a:ln/>
           <a:extLst>
             <a:ext uri="{91240B29-F687-4f45-9708-019B960494DF}">
-              <a14:hiddenLine xmlns="" xmlns:a14="http://schemas.microsoft.com/office/drawing/2010/main" w="9525">
+              <a14:hiddenLine xmlns:a14="http://schemas.microsoft.com/office/drawing/2010/main" xmlns="" w="9525">
                 <a:solidFill>
                   <a:srgbClr val="000000"/>
                 </a:solidFill>
@@ -21720,7 +21734,7 @@
           <a:p>
             <a:fld id="{55C6B4A9-1611-4792-9094-5F34BCA07E0B}" type="datetimeFigureOut">
               <a:rPr lang="en-US" smtClean="0"/>
-              <a:t>6/22/2017</a:t>
+              <a:t>6/23/2017</a:t>
             </a:fld>
             <a:endParaRPr lang="en-US" dirty="0"/>
           </a:p>
@@ -21877,7 +21891,7 @@
           <a:ln/>
           <a:extLst>
             <a:ext uri="{91240B29-F687-4f45-9708-019B960494DF}">
-              <a14:hiddenLine xmlns="" xmlns:a14="http://schemas.microsoft.com/office/drawing/2010/main" w="9525">
+              <a14:hiddenLine xmlns:a14="http://schemas.microsoft.com/office/drawing/2010/main" xmlns="" w="9525">
                 <a:solidFill>
                   <a:srgbClr val="000000"/>
                 </a:solidFill>
@@ -22006,7 +22020,7 @@
             <a:fld id="{B61BEF0D-F0BB-DE4B-95CE-6DB70DBA9567}" type="datetimeFigureOut">
               <a:rPr lang="en-US" smtClean="0"/>
               <a:pPr/>
-              <a:t>6/22/2017</a:t>
+              <a:t>6/23/2017</a:t>
             </a:fld>
             <a:endParaRPr lang="en-US" dirty="0"/>
           </a:p>
@@ -22262,7 +22276,7 @@
           <a:p>
             <a:fld id="{42A54C80-263E-416B-A8E0-580EDEADCBDC}" type="datetimeFigureOut">
               <a:rPr lang="en-US" dirty="0"/>
-              <a:t>6/22/2017</a:t>
+              <a:t>6/23/2017</a:t>
             </a:fld>
             <a:endParaRPr lang="en-US" dirty="0"/>
           </a:p>
@@ -22526,7 +22540,7 @@
             <a:fld id="{B61BEF0D-F0BB-DE4B-95CE-6DB70DBA9567}" type="datetimeFigureOut">
               <a:rPr lang="en-US" dirty="0"/>
               <a:pPr/>
-              <a:t>6/22/2017</a:t>
+              <a:t>6/23/2017</a:t>
             </a:fld>
             <a:endParaRPr lang="en-US" dirty="0"/>
           </a:p>
@@ -23271,7 +23285,7 @@
             <a:fld id="{B61BEF0D-F0BB-DE4B-95CE-6DB70DBA9567}" type="datetimeFigureOut">
               <a:rPr lang="en-US" dirty="0"/>
               <a:pPr/>
-              <a:t>6/22/2017</a:t>
+              <a:t>6/23/2017</a:t>
             </a:fld>
             <a:endParaRPr lang="en-US" dirty="0"/>
           </a:p>
@@ -24009,7 +24023,7 @@
             <a:fld id="{48A87A34-81AB-432B-8DAE-1953F412C126}" type="datetimeFigureOut">
               <a:rPr lang="en-US" dirty="0"/>
               <a:pPr/>
-              <a:t>6/22/2017</a:t>
+              <a:t>6/23/2017</a:t>
             </a:fld>
             <a:endParaRPr lang="en-US" dirty="0"/>
           </a:p>
@@ -24847,7 +24861,7 @@
           <a:p>
             <a:fld id="{4AAD347D-5ACD-4C99-B74B-A9C85AD731AF}" type="datetimeFigureOut">
               <a:rPr lang="en-US" dirty="0"/>
-              <a:t>6/22/2017</a:t>
+              <a:t>6/23/2017</a:t>
             </a:fld>
             <a:endParaRPr lang="en-US" dirty="0"/>
           </a:p>
@@ -25728,7 +25742,7 @@
           <a:p>
             <a:fld id="{4AAD347D-5ACD-4C99-B74B-A9C85AD731AF}" type="datetimeFigureOut">
               <a:rPr lang="en-US" dirty="0"/>
-              <a:t>6/22/2017</a:t>
+              <a:t>6/23/2017</a:t>
             </a:fld>
             <a:endParaRPr lang="en-US" dirty="0"/>
           </a:p>
@@ -26440,7 +26454,7 @@
             <a:fld id="{B61BEF0D-F0BB-DE4B-95CE-6DB70DBA9567}" type="datetimeFigureOut">
               <a:rPr lang="en-US" smtClean="0"/>
               <a:pPr/>
-              <a:t>6/22/2017</a:t>
+              <a:t>6/23/2017</a:t>
             </a:fld>
             <a:endParaRPr lang="en-US" dirty="0"/>
           </a:p>
@@ -28584,20 +28598,6 @@
             </a:r>
           </a:p>
           <a:p>
-            <a:pPr lvl="1"/>
-            <a:r>
-              <a:rPr lang="en-US" dirty="0"/>
-              <a:t>Interactions between workers at a restaurant.</a:t>
-            </a:r>
-          </a:p>
-          <a:p>
-            <a:pPr lvl="1"/>
-            <a:r>
-              <a:rPr lang="en-US" dirty="0"/>
-              <a:t>Soda Machine</a:t>
-            </a:r>
-          </a:p>
-          <a:p>
             <a:r>
               <a:rPr lang="en-US" dirty="0"/>
               <a:t>Software and Frameworks</a:t>
@@ -28630,6 +28630,13 @@
               <a:rPr lang="en-US" dirty="0"/>
               <a:t>Angular</a:t>
             </a:r>
+          </a:p>
+          <a:p>
+            <a:r>
+              <a:rPr lang="en-US"/>
+              <a:t>Typescript…</a:t>
+            </a:r>
+            <a:endParaRPr lang="en-US" dirty="0"/>
           </a:p>
         </p:txBody>
       </p:sp>
@@ -29031,7 +29038,7 @@
           <a:p>
             <a:r>
               <a:rPr lang="en-US" dirty="0"/>
-              <a:t>Guidelines…</a:t>
+              <a:t>“Use the Angular…Luke.”</a:t>
             </a:r>
           </a:p>
         </p:txBody>
@@ -29061,12 +29068,6 @@
         <p:txBody>
           <a:bodyPr/>
           <a:lstStyle/>
-          <a:p>
-            <a:r>
-              <a:rPr lang="en-US" dirty="0"/>
-              <a:t>Do not create what already exists.</a:t>
-            </a:r>
-          </a:p>
           <a:p>
             <a:r>
               <a:rPr lang="en-US" dirty="0"/>
@@ -29547,12 +29548,6 @@
           <a:p>
             <a:r>
               <a:rPr lang="en-US" dirty="0"/>
-              <a:t>Authorization or Permissions?</a:t>
-            </a:r>
-          </a:p>
-          <a:p>
-            <a:r>
-              <a:rPr lang="en-US" dirty="0"/>
               <a:t>Business Logic</a:t>
             </a:r>
           </a:p>
@@ -29571,41 +29566,25 @@
           <a:p>
             <a:r>
               <a:rPr lang="en-US" dirty="0"/>
-              <a:t>Using Repositories (Web APIs) to retrieve and persist data</a:t>
-            </a:r>
-          </a:p>
-          <a:p>
-            <a:pPr lvl="1"/>
+              <a:t>Authorization or Permissions?</a:t>
+            </a:r>
+          </a:p>
+          <a:p>
             <a:r>
               <a:rPr lang="en-US" dirty="0"/>
-              <a:t>Creating requests for information.</a:t>
-            </a:r>
-          </a:p>
-          <a:p>
-            <a:pPr lvl="1"/>
+              <a:t>Retrieving and persisting data</a:t>
+            </a:r>
+          </a:p>
+          <a:p>
             <a:r>
               <a:rPr lang="en-US" dirty="0"/>
-              <a:t>Processing responses consistently.</a:t>
+              <a:t>Handling exceptions.</a:t>
             </a:r>
           </a:p>
           <a:p>
             <a:r>
               <a:rPr lang="en-US" dirty="0"/>
-              <a:t>Handling exceptions/</a:t>
-            </a:r>
-            <a:r>
-              <a:rPr lang="en-US" dirty="0" err="1"/>
-              <a:t>erros</a:t>
-            </a:r>
-            <a:r>
-              <a:rPr lang="en-US" dirty="0"/>
-              <a:t>.</a:t>
-            </a:r>
-          </a:p>
-          <a:p>
-            <a:r>
-              <a:rPr lang="en-US" dirty="0"/>
-              <a:t>Handling responses with messages.</a:t>
+              <a:t>Handling error responses from the backend.</a:t>
             </a:r>
           </a:p>
         </p:txBody>
@@ -31355,150 +31334,40 @@
           <a:chExt cx="0" cy="0"/>
         </a:xfrm>
       </p:grpSpPr>
-      <p:sp>
-        <p:nvSpPr>
-          <p:cNvPr id="2" name="Title 1">
+      <p:pic>
+        <p:nvPicPr>
+          <p:cNvPr id="4" name="Picture 3">
             <a:extLst>
               <a:ext uri="{FF2B5EF4-FFF2-40B4-BE49-F238E27FC236}">
-                <a16:creationId xmlns:a16="http://schemas.microsoft.com/office/drawing/2014/main" id="{7D8AF8FB-793E-41BD-8CC5-A923B5A8209E}"/>
+                <a16:creationId xmlns:a16="http://schemas.microsoft.com/office/drawing/2014/main" id="{8716116C-FBF1-4D43-BB44-9C538C7B7568}"/>
               </a:ext>
             </a:extLst>
           </p:cNvPr>
-          <p:cNvSpPr>
-            <a:spLocks noGrp="1"/>
-          </p:cNvSpPr>
-          <p:nvPr>
-            <p:ph type="title"/>
-          </p:nvPr>
-        </p:nvSpPr>
-        <p:spPr/>
-        <p:txBody>
-          <a:bodyPr/>
-          <a:lstStyle/>
-          <a:p>
-            <a:r>
-              <a:rPr lang="en-US"/>
-              <a:t>Web References</a:t>
-            </a:r>
-            <a:endParaRPr lang="en-US" dirty="0"/>
-          </a:p>
-        </p:txBody>
-      </p:sp>
-      <p:sp>
-        <p:nvSpPr>
-          <p:cNvPr id="3" name="Content Placeholder 2">
-            <a:extLst>
-              <a:ext uri="{FF2B5EF4-FFF2-40B4-BE49-F238E27FC236}">
-                <a16:creationId xmlns:a16="http://schemas.microsoft.com/office/drawing/2014/main" id="{3975127B-114D-4B36-BA13-4EB6781A2CEB}"/>
-              </a:ext>
-            </a:extLst>
-          </p:cNvPr>
-          <p:cNvSpPr>
-            <a:spLocks noGrp="1"/>
-          </p:cNvSpPr>
-          <p:nvPr>
-            <p:ph idx="1"/>
-          </p:nvPr>
-        </p:nvSpPr>
-        <p:spPr/>
-        <p:txBody>
-          <a:bodyPr>
-            <a:normAutofit/>
-          </a:bodyPr>
-          <a:lstStyle/>
-          <a:p>
-            <a:r>
-              <a:rPr lang="en-US">
-                <a:hlinkClick r:id="rId2"/>
-              </a:rPr>
-              <a:t>GoF Design patterns in .NET/C#</a:t>
-            </a:r>
-            <a:endParaRPr lang="en-US"/>
-          </a:p>
-          <a:p>
-            <a:r>
-              <a:rPr lang="en-US">
-                <a:hlinkClick r:id="rId3"/>
-              </a:rPr>
-              <a:t>Design Patterns General</a:t>
-            </a:r>
-            <a:endParaRPr lang="en-US"/>
-          </a:p>
-          <a:p>
-            <a:pPr lvl="1"/>
-            <a:r>
-              <a:rPr lang="en-US">
-                <a:hlinkClick r:id="rId3"/>
-              </a:rPr>
-              <a:t>Creational</a:t>
-            </a:r>
-            <a:endParaRPr lang="en-US"/>
-          </a:p>
-          <a:p>
-            <a:pPr lvl="1"/>
-            <a:r>
-              <a:rPr lang="en-US">
-                <a:hlinkClick r:id="rId4"/>
-              </a:rPr>
-              <a:t>Structural</a:t>
-            </a:r>
-            <a:endParaRPr lang="en-US"/>
-          </a:p>
-          <a:p>
-            <a:pPr lvl="1"/>
-            <a:r>
-              <a:rPr lang="en-US">
-                <a:hlinkClick r:id="rId5"/>
-              </a:rPr>
-              <a:t>Behavioral</a:t>
-            </a:r>
-            <a:endParaRPr lang="en-US"/>
-          </a:p>
-          <a:p>
-            <a:r>
-              <a:rPr lang="en-US"/>
-              <a:t>Principles:</a:t>
-            </a:r>
-          </a:p>
-          <a:p>
-            <a:pPr lvl="1"/>
-            <a:r>
-              <a:rPr lang="en-US">
-                <a:hlinkClick r:id="rId6"/>
-              </a:rPr>
-              <a:t>Single Responsibility</a:t>
-            </a:r>
-            <a:endParaRPr lang="en-US"/>
-          </a:p>
-          <a:p>
-            <a:pPr lvl="1"/>
-            <a:r>
-              <a:rPr lang="en-US">
-                <a:hlinkClick r:id="rId7"/>
-              </a:rPr>
-              <a:t>Separation of Concerns</a:t>
-            </a:r>
-            <a:endParaRPr lang="en-US"/>
-          </a:p>
-          <a:p>
-            <a:pPr lvl="1"/>
-            <a:r>
-              <a:rPr lang="en-US">
-                <a:hlinkClick r:id="rId8"/>
-              </a:rPr>
-              <a:t>S.O.L.I.D Principles</a:t>
-            </a:r>
-            <a:endParaRPr lang="en-US"/>
-          </a:p>
-          <a:p>
-            <a:endParaRPr lang="en-US" dirty="0"/>
-          </a:p>
-        </p:txBody>
-      </p:sp>
+          <p:cNvPicPr>
+            <a:picLocks noChangeAspect="1"/>
+          </p:cNvPicPr>
+          <p:nvPr/>
+        </p:nvPicPr>
+        <p:blipFill>
+          <a:blip r:embed="rId2"/>
+          <a:stretch>
+            <a:fillRect/>
+          </a:stretch>
+        </p:blipFill>
+        <p:spPr>
+          <a:xfrm>
+            <a:off x="688094" y="190869"/>
+            <a:ext cx="9165519" cy="5675447"/>
+          </a:xfrm>
+          <a:prstGeom prst="rect">
+            <a:avLst/>
+          </a:prstGeom>
+        </p:spPr>
+      </p:pic>
     </p:spTree>
     <p:extLst>
       <p:ext uri="{BB962C8B-B14F-4D97-AF65-F5344CB8AC3E}">
-        <p14:creationId xmlns:p14="http://schemas.microsoft.com/office/powerpoint/2010/main" val="1961233773"/>
+        <p14:creationId xmlns:p14="http://schemas.microsoft.com/office/powerpoint/2010/main" val="2562439553"/>
       </p:ext>
     </p:extLst>
   </p:cSld>
@@ -31530,7 +31399,7 @@
           <p:cNvPr id="2" name="Title 1">
             <a:extLst>
               <a:ext uri="{FF2B5EF4-FFF2-40B4-BE49-F238E27FC236}">
-                <a16:creationId xmlns:a16="http://schemas.microsoft.com/office/drawing/2014/main" id="{7D8AF8FB-793E-41BD-8CC5-A923B5A8209E}"/>
+                <a16:creationId xmlns:a16="http://schemas.microsoft.com/office/drawing/2014/main" id="{1D4E3875-CACF-46B2-B025-926FE971A44D}"/>
               </a:ext>
             </a:extLst>
           </p:cNvPr>
@@ -31547,10 +31416,9 @@
           <a:lstStyle/>
           <a:p>
             <a:r>
-              <a:rPr lang="en-US"/>
-              <a:t>Book References</a:t>
-            </a:r>
-            <a:endParaRPr lang="en-US" dirty="0"/>
+              <a:rPr lang="en-US" dirty="0"/>
+              <a:t>Demo(s)</a:t>
+            </a:r>
           </a:p>
         </p:txBody>
       </p:sp>
@@ -31559,7 +31427,7 @@
           <p:cNvPr id="3" name="Content Placeholder 2">
             <a:extLst>
               <a:ext uri="{FF2B5EF4-FFF2-40B4-BE49-F238E27FC236}">
-                <a16:creationId xmlns:a16="http://schemas.microsoft.com/office/drawing/2014/main" id="{3975127B-114D-4B36-BA13-4EB6781A2CEB}"/>
+                <a16:creationId xmlns:a16="http://schemas.microsoft.com/office/drawing/2014/main" id="{D6E8362C-E617-425C-9EDA-E7ABD935D82C}"/>
               </a:ext>
             </a:extLst>
           </p:cNvPr>
@@ -31572,99 +31440,47 @@
         </p:nvSpPr>
         <p:spPr/>
         <p:txBody>
-          <a:bodyPr>
-            <a:normAutofit fontScale="92500" lnSpcReduction="10000"/>
-          </a:bodyPr>
-          <a:lstStyle/>
-          <a:p>
-            <a:r>
-              <a:rPr lang="en-US">
-                <a:hlinkClick r:id="rId2"/>
-              </a:rPr>
-              <a:t>Design Patterns : Elements of Reusable Object-Oriented Software</a:t>
-            </a:r>
-            <a:endParaRPr lang="en-US"/>
+          <a:bodyPr/>
+          <a:lstStyle/>
+          <a:p>
+            <a:r>
+              <a:rPr lang="en-US" dirty="0"/>
+              <a:t>Angular Sample Application</a:t>
+            </a:r>
           </a:p>
           <a:p>
             <a:pPr lvl="1"/>
             <a:r>
-              <a:rPr lang="en-US"/>
-              <a:t>ISBN-13: 978-0201633610, ISBN-10: 0201633612</a:t>
-            </a:r>
-          </a:p>
-          <a:p>
-            <a:r>
-              <a:rPr lang="en-US">
-                <a:hlinkClick r:id="rId3"/>
-              </a:rPr>
-              <a:t>Head First Design Patterns</a:t>
-            </a:r>
-            <a:endParaRPr lang="en-US"/>
-          </a:p>
-          <a:p>
-            <a:pPr lvl="1"/>
-            <a:r>
-              <a:rPr lang="en-US"/>
-              <a:t>ISBN-13: 978-0596007126, ISBN-10: 0596007124</a:t>
-            </a:r>
-          </a:p>
-          <a:p>
-            <a:r>
-              <a:rPr lang="en-US">
-                <a:hlinkClick r:id="rId4"/>
-              </a:rPr>
-              <a:t>Clean Code</a:t>
-            </a:r>
-            <a:endParaRPr lang="en-US"/>
-          </a:p>
-          <a:p>
-            <a:pPr lvl="1"/>
-            <a:r>
-              <a:rPr lang="en-US"/>
-              <a:t>ISBN-13: 978-0132350884, ISBN-10: 0132350882</a:t>
-            </a:r>
-          </a:p>
-          <a:p>
-            <a:r>
-              <a:rPr lang="en-US">
-                <a:hlinkClick r:id="rId5"/>
-              </a:rPr>
-              <a:t>The Pragmatic Programmer</a:t>
-            </a:r>
-            <a:endParaRPr lang="en-US"/>
-          </a:p>
-          <a:p>
-            <a:pPr lvl="1"/>
-            <a:r>
-              <a:rPr lang="en-US"/>
-              <a:t>ISBN-13: 978-0201616224, ISBN-10: 020161622X</a:t>
-            </a:r>
-          </a:p>
-          <a:p>
-            <a:r>
-              <a:rPr lang="en-US">
-                <a:hlinkClick r:id="rId6"/>
-              </a:rPr>
-              <a:t>Patterns of Enterprise Application Architecture</a:t>
-            </a:r>
-            <a:endParaRPr lang="en-US"/>
-          </a:p>
-          <a:p>
-            <a:pPr lvl="1"/>
-            <a:r>
-              <a:rPr lang="en-US"/>
-              <a:t>ISBN-13: 978-0321127426, ISBN-10: 0321127420</a:t>
-            </a:r>
-          </a:p>
-          <a:p>
-            <a:endParaRPr lang="en-US" dirty="0"/>
+              <a:rPr lang="en-US" dirty="0"/>
+              <a:t>Rules</a:t>
+            </a:r>
+          </a:p>
+          <a:p>
+            <a:pPr lvl="2"/>
+            <a:r>
+              <a:rPr lang="en-US" dirty="0"/>
+              <a:t>Simple (Primitive)</a:t>
+            </a:r>
+          </a:p>
+          <a:p>
+            <a:pPr lvl="2"/>
+            <a:r>
+              <a:rPr lang="en-US" dirty="0"/>
+              <a:t>Complex (Composite)</a:t>
+            </a:r>
+          </a:p>
+          <a:p>
+            <a:r>
+              <a:rPr lang="en-US" dirty="0"/>
+              <a:t>Account Signup</a:t>
+            </a:r>
           </a:p>
         </p:txBody>
       </p:sp>
     </p:spTree>
     <p:extLst>
       <p:ext uri="{BB962C8B-B14F-4D97-AF65-F5344CB8AC3E}">
-        <p14:creationId xmlns:p14="http://schemas.microsoft.com/office/powerpoint/2010/main" val="214986796"/>
+        <p14:creationId xmlns:p14="http://schemas.microsoft.com/office/powerpoint/2010/main" val="1186205679"/>
       </p:ext>
     </p:extLst>
   </p:cSld>
@@ -31696,7 +31512,7 @@
           <p:cNvPr id="2" name="Title 1">
             <a:extLst>
               <a:ext uri="{FF2B5EF4-FFF2-40B4-BE49-F238E27FC236}">
-                <a16:creationId xmlns:a16="http://schemas.microsoft.com/office/drawing/2014/main" id="{7D8AF8FB-793E-41BD-8CC5-A923B5A8209E}"/>
+                <a16:creationId xmlns:a16="http://schemas.microsoft.com/office/drawing/2014/main" id="{1D4E3875-CACF-46B2-B025-926FE971A44D}"/>
               </a:ext>
             </a:extLst>
           </p:cNvPr>
@@ -31714,7 +31530,7 @@
           <a:p>
             <a:r>
               <a:rPr lang="en-US" dirty="0"/>
-              <a:t>Angular Resources</a:t>
+              <a:t>Composite Pattern Recap</a:t>
             </a:r>
           </a:p>
         </p:txBody>
@@ -31724,7 +31540,7 @@
           <p:cNvPr id="3" name="Content Placeholder 2">
             <a:extLst>
               <a:ext uri="{FF2B5EF4-FFF2-40B4-BE49-F238E27FC236}">
-                <a16:creationId xmlns:a16="http://schemas.microsoft.com/office/drawing/2014/main" id="{3975127B-114D-4B36-BA13-4EB6781A2CEB}"/>
+                <a16:creationId xmlns:a16="http://schemas.microsoft.com/office/drawing/2014/main" id="{D6E8362C-E617-425C-9EDA-E7ABD935D82C}"/>
               </a:ext>
             </a:extLst>
           </p:cNvPr>
@@ -31737,87 +31553,32 @@
         </p:nvSpPr>
         <p:spPr/>
         <p:txBody>
-          <a:bodyPr>
-            <a:normAutofit/>
-          </a:bodyPr>
-          <a:lstStyle/>
-          <a:p>
-            <a:r>
-              <a:rPr lang="en-US" dirty="0">
-                <a:hlinkClick r:id="rId2"/>
-              </a:rPr>
-              <a:t>https://angular.io</a:t>
-            </a:r>
+          <a:bodyPr/>
+          <a:lstStyle/>
+          <a:p>
             <a:r>
               <a:rPr lang="en-US" dirty="0"/>
-              <a:t>: </a:t>
-            </a:r>
-          </a:p>
-          <a:p>
-            <a:r>
-              <a:rPr lang="en-US" dirty="0">
-                <a:hlinkClick r:id="rId3"/>
-              </a:rPr>
-              <a:t>https://rangle.io</a:t>
-            </a:r>
+              <a:t>Simple to implement.</a:t>
+            </a:r>
+          </a:p>
+          <a:p>
             <a:r>
               <a:rPr lang="en-US" dirty="0"/>
-              <a:t>: </a:t>
-            </a:r>
-          </a:p>
-          <a:p>
-            <a:pPr lvl="1"/>
-            <a:r>
-              <a:rPr lang="en-US" dirty="0" err="1">
-                <a:hlinkClick r:id="rId4"/>
-              </a:rPr>
-              <a:t>Rangle’s</a:t>
-            </a:r>
-            <a:r>
-              <a:rPr lang="en-US" dirty="0">
-                <a:hlinkClick r:id="rId4"/>
-              </a:rPr>
-              <a:t> Angular 2 Training Book</a:t>
-            </a:r>
-            <a:endParaRPr lang="en-US" dirty="0"/>
-          </a:p>
-          <a:p>
-            <a:pPr lvl="1"/>
-            <a:r>
-              <a:rPr lang="en-US" dirty="0">
-                <a:hlinkClick r:id="rId5"/>
-              </a:rPr>
-              <a:t>Functional Forms</a:t>
-            </a:r>
-            <a:endParaRPr lang="en-US" dirty="0"/>
-          </a:p>
-          <a:p>
-            <a:r>
-              <a:rPr lang="en-US" dirty="0">
-                <a:hlinkClick r:id="rId6"/>
-              </a:rPr>
-              <a:t>Become a Ninja with Angular</a:t>
-            </a:r>
+              <a:t>Create simple/complex items in a hierarchy or tree-like view.</a:t>
+            </a:r>
+          </a:p>
+          <a:p>
             <a:r>
               <a:rPr lang="en-US" dirty="0"/>
-              <a:t>: sample chapters</a:t>
-            </a:r>
-          </a:p>
-          <a:p>
-            <a:r>
-              <a:rPr lang="en-US" dirty="0">
-                <a:hlinkClick r:id="rId7"/>
-              </a:rPr>
-              <a:t>Tour of Heroes Application with Multiple Modules</a:t>
-            </a:r>
-            <a:endParaRPr lang="en-US" dirty="0"/>
+              <a:t>Process/Handle either (simple/composite) types consistently.</a:t>
+            </a:r>
           </a:p>
         </p:txBody>
       </p:sp>
     </p:spTree>
     <p:extLst>
       <p:ext uri="{BB962C8B-B14F-4D97-AF65-F5344CB8AC3E}">
-        <p14:creationId xmlns:p14="http://schemas.microsoft.com/office/powerpoint/2010/main" val="3233442765"/>
+        <p14:creationId xmlns:p14="http://schemas.microsoft.com/office/powerpoint/2010/main" val="1458110016"/>
       </p:ext>
     </p:extLst>
   </p:cSld>
@@ -31971,6 +31732,717 @@
 </file>
 
 <file path=ppt/slides/slide40.xml><?xml version="1.0" encoding="utf-8"?>
+<p:sld xmlns:a="http://schemas.openxmlformats.org/drawingml/2006/main" xmlns:r="http://schemas.openxmlformats.org/officeDocument/2006/relationships" xmlns:p="http://schemas.openxmlformats.org/presentationml/2006/main">
+  <p:cSld>
+    <p:spTree>
+      <p:nvGrpSpPr>
+        <p:cNvPr id="1" name=""/>
+        <p:cNvGrpSpPr/>
+        <p:nvPr/>
+      </p:nvGrpSpPr>
+      <p:grpSpPr>
+        <a:xfrm>
+          <a:off x="0" y="0"/>
+          <a:ext cx="0" cy="0"/>
+          <a:chOff x="0" y="0"/>
+          <a:chExt cx="0" cy="0"/>
+        </a:xfrm>
+      </p:grpSpPr>
+      <p:sp>
+        <p:nvSpPr>
+          <p:cNvPr id="4" name="Title 3">
+            <a:extLst>
+              <a:ext uri="{FF2B5EF4-FFF2-40B4-BE49-F238E27FC236}">
+                <a16:creationId xmlns:a16="http://schemas.microsoft.com/office/drawing/2014/main" id="{203B918A-3F11-486B-981F-885DC949B4D3}"/>
+              </a:ext>
+            </a:extLst>
+          </p:cNvPr>
+          <p:cNvSpPr>
+            <a:spLocks noGrp="1"/>
+          </p:cNvSpPr>
+          <p:nvPr>
+            <p:ph type="title"/>
+          </p:nvPr>
+        </p:nvSpPr>
+        <p:spPr/>
+        <p:txBody>
+          <a:bodyPr/>
+          <a:lstStyle/>
+          <a:p>
+            <a:r>
+              <a:rPr lang="en-US" dirty="0"/>
+              <a:t>Conclusions</a:t>
+            </a:r>
+          </a:p>
+        </p:txBody>
+      </p:sp>
+      <p:sp>
+        <p:nvSpPr>
+          <p:cNvPr id="5" name="Text Placeholder 4">
+            <a:extLst>
+              <a:ext uri="{FF2B5EF4-FFF2-40B4-BE49-F238E27FC236}">
+                <a16:creationId xmlns:a16="http://schemas.microsoft.com/office/drawing/2014/main" id="{81470885-0111-4942-B5A5-7DBC42C3A073}"/>
+              </a:ext>
+            </a:extLst>
+          </p:cNvPr>
+          <p:cNvSpPr>
+            <a:spLocks noGrp="1"/>
+          </p:cNvSpPr>
+          <p:nvPr>
+            <p:ph type="body" idx="1"/>
+          </p:nvPr>
+        </p:nvSpPr>
+        <p:spPr/>
+        <p:txBody>
+          <a:bodyPr/>
+          <a:lstStyle/>
+          <a:p>
+            <a:endParaRPr lang="en-US" dirty="0"/>
+          </a:p>
+        </p:txBody>
+      </p:sp>
+    </p:spTree>
+    <p:extLst>
+      <p:ext uri="{BB962C8B-B14F-4D97-AF65-F5344CB8AC3E}">
+        <p14:creationId xmlns:p14="http://schemas.microsoft.com/office/powerpoint/2010/main" val="1089114915"/>
+      </p:ext>
+    </p:extLst>
+  </p:cSld>
+  <p:clrMapOvr>
+    <a:masterClrMapping/>
+  </p:clrMapOvr>
+</p:sld>
+</file>
+
+<file path=ppt/slides/slide41.xml><?xml version="1.0" encoding="utf-8"?>
+<p:sld xmlns:a="http://schemas.openxmlformats.org/drawingml/2006/main" xmlns:r="http://schemas.openxmlformats.org/officeDocument/2006/relationships" xmlns:p="http://schemas.openxmlformats.org/presentationml/2006/main">
+  <p:cSld>
+    <p:spTree>
+      <p:nvGrpSpPr>
+        <p:cNvPr id="1" name=""/>
+        <p:cNvGrpSpPr/>
+        <p:nvPr/>
+      </p:nvGrpSpPr>
+      <p:grpSpPr>
+        <a:xfrm>
+          <a:off x="0" y="0"/>
+          <a:ext cx="0" cy="0"/>
+          <a:chOff x="0" y="0"/>
+          <a:chExt cx="0" cy="0"/>
+        </a:xfrm>
+      </p:grpSpPr>
+      <p:sp>
+        <p:nvSpPr>
+          <p:cNvPr id="2" name="Title 1">
+            <a:extLst>
+              <a:ext uri="{FF2B5EF4-FFF2-40B4-BE49-F238E27FC236}">
+                <a16:creationId xmlns:a16="http://schemas.microsoft.com/office/drawing/2014/main" id="{1D4E3875-CACF-46B2-B025-926FE971A44D}"/>
+              </a:ext>
+            </a:extLst>
+          </p:cNvPr>
+          <p:cNvSpPr>
+            <a:spLocks noGrp="1"/>
+          </p:cNvSpPr>
+          <p:nvPr>
+            <p:ph type="title"/>
+          </p:nvPr>
+        </p:nvSpPr>
+        <p:spPr/>
+        <p:txBody>
+          <a:bodyPr/>
+          <a:lstStyle/>
+          <a:p>
+            <a:r>
+              <a:rPr lang="en-US" dirty="0"/>
+              <a:t>Final thoughts…</a:t>
+            </a:r>
+          </a:p>
+        </p:txBody>
+      </p:sp>
+      <p:sp>
+        <p:nvSpPr>
+          <p:cNvPr id="3" name="Content Placeholder 2">
+            <a:extLst>
+              <a:ext uri="{FF2B5EF4-FFF2-40B4-BE49-F238E27FC236}">
+                <a16:creationId xmlns:a16="http://schemas.microsoft.com/office/drawing/2014/main" id="{D6E8362C-E617-425C-9EDA-E7ABD935D82C}"/>
+              </a:ext>
+            </a:extLst>
+          </p:cNvPr>
+          <p:cNvSpPr>
+            <a:spLocks noGrp="1"/>
+          </p:cNvSpPr>
+          <p:nvPr>
+            <p:ph idx="1"/>
+          </p:nvPr>
+        </p:nvSpPr>
+        <p:spPr/>
+        <p:txBody>
+          <a:bodyPr/>
+          <a:lstStyle/>
+          <a:p>
+            <a:r>
+              <a:rPr lang="en-US" dirty="0"/>
+              <a:t>Business Logic is very important – yet challenging. </a:t>
+            </a:r>
+          </a:p>
+          <a:p>
+            <a:pPr lvl="1"/>
+            <a:r>
+              <a:rPr lang="en-US" dirty="0"/>
+              <a:t>Needs to be protected as a valuable resource.</a:t>
+            </a:r>
+          </a:p>
+          <a:p>
+            <a:r>
+              <a:rPr lang="en-US" dirty="0"/>
+              <a:t>Patterns and Frameworks help control the chaos.</a:t>
+            </a:r>
+          </a:p>
+          <a:p>
+            <a:pPr lvl="1"/>
+            <a:r>
+              <a:rPr lang="en-US" dirty="0"/>
+              <a:t>Understand and use the elements that Angular provides more fully.</a:t>
+            </a:r>
+          </a:p>
+          <a:p>
+            <a:r>
+              <a:rPr lang="en-US" dirty="0"/>
+              <a:t>Higher Quality Systems</a:t>
+            </a:r>
+          </a:p>
+          <a:p>
+            <a:pPr lvl="1"/>
+            <a:r>
+              <a:rPr lang="en-US" dirty="0"/>
+              <a:t>Testable</a:t>
+            </a:r>
+          </a:p>
+          <a:p>
+            <a:pPr lvl="1"/>
+            <a:r>
+              <a:rPr lang="en-US" dirty="0"/>
+              <a:t>Extensible</a:t>
+            </a:r>
+          </a:p>
+          <a:p>
+            <a:pPr lvl="1"/>
+            <a:r>
+              <a:rPr lang="en-US" dirty="0"/>
+              <a:t>Maintainable</a:t>
+            </a:r>
+          </a:p>
+          <a:p>
+            <a:r>
+              <a:rPr lang="en-US" dirty="0"/>
+              <a:t>Take time to learn and understand different design patterns.</a:t>
+            </a:r>
+          </a:p>
+        </p:txBody>
+      </p:sp>
+    </p:spTree>
+    <p:extLst>
+      <p:ext uri="{BB962C8B-B14F-4D97-AF65-F5344CB8AC3E}">
+        <p14:creationId xmlns:p14="http://schemas.microsoft.com/office/powerpoint/2010/main" val="63581996"/>
+      </p:ext>
+    </p:extLst>
+  </p:cSld>
+  <p:clrMapOvr>
+    <a:masterClrMapping/>
+  </p:clrMapOvr>
+</p:sld>
+</file>
+
+<file path=ppt/slides/slide42.xml><?xml version="1.0" encoding="utf-8"?>
+<p:sld xmlns:a="http://schemas.openxmlformats.org/drawingml/2006/main" xmlns:r="http://schemas.openxmlformats.org/officeDocument/2006/relationships" xmlns:p="http://schemas.openxmlformats.org/presentationml/2006/main">
+  <p:cSld>
+    <p:spTree>
+      <p:nvGrpSpPr>
+        <p:cNvPr id="1" name=""/>
+        <p:cNvGrpSpPr/>
+        <p:nvPr/>
+      </p:nvGrpSpPr>
+      <p:grpSpPr>
+        <a:xfrm>
+          <a:off x="0" y="0"/>
+          <a:ext cx="0" cy="0"/>
+          <a:chOff x="0" y="0"/>
+          <a:chExt cx="0" cy="0"/>
+        </a:xfrm>
+      </p:grpSpPr>
+      <p:sp>
+        <p:nvSpPr>
+          <p:cNvPr id="2" name="Title 1">
+            <a:extLst>
+              <a:ext uri="{FF2B5EF4-FFF2-40B4-BE49-F238E27FC236}">
+                <a16:creationId xmlns:a16="http://schemas.microsoft.com/office/drawing/2014/main" id="{7D8AF8FB-793E-41BD-8CC5-A923B5A8209E}"/>
+              </a:ext>
+            </a:extLst>
+          </p:cNvPr>
+          <p:cNvSpPr>
+            <a:spLocks noGrp="1"/>
+          </p:cNvSpPr>
+          <p:nvPr>
+            <p:ph type="title"/>
+          </p:nvPr>
+        </p:nvSpPr>
+        <p:spPr/>
+        <p:txBody>
+          <a:bodyPr/>
+          <a:lstStyle/>
+          <a:p>
+            <a:r>
+              <a:rPr lang="en-US"/>
+              <a:t>Web References</a:t>
+            </a:r>
+            <a:endParaRPr lang="en-US" dirty="0"/>
+          </a:p>
+        </p:txBody>
+      </p:sp>
+      <p:sp>
+        <p:nvSpPr>
+          <p:cNvPr id="3" name="Content Placeholder 2">
+            <a:extLst>
+              <a:ext uri="{FF2B5EF4-FFF2-40B4-BE49-F238E27FC236}">
+                <a16:creationId xmlns:a16="http://schemas.microsoft.com/office/drawing/2014/main" id="{3975127B-114D-4B36-BA13-4EB6781A2CEB}"/>
+              </a:ext>
+            </a:extLst>
+          </p:cNvPr>
+          <p:cNvSpPr>
+            <a:spLocks noGrp="1"/>
+          </p:cNvSpPr>
+          <p:nvPr>
+            <p:ph idx="1"/>
+          </p:nvPr>
+        </p:nvSpPr>
+        <p:spPr/>
+        <p:txBody>
+          <a:bodyPr>
+            <a:normAutofit/>
+          </a:bodyPr>
+          <a:lstStyle/>
+          <a:p>
+            <a:r>
+              <a:rPr lang="en-US">
+                <a:hlinkClick r:id="rId2"/>
+              </a:rPr>
+              <a:t>GoF Design patterns in .NET/C#</a:t>
+            </a:r>
+            <a:endParaRPr lang="en-US"/>
+          </a:p>
+          <a:p>
+            <a:r>
+              <a:rPr lang="en-US">
+                <a:hlinkClick r:id="rId3"/>
+              </a:rPr>
+              <a:t>Design Patterns General</a:t>
+            </a:r>
+            <a:endParaRPr lang="en-US"/>
+          </a:p>
+          <a:p>
+            <a:pPr lvl="1"/>
+            <a:r>
+              <a:rPr lang="en-US">
+                <a:hlinkClick r:id="rId3"/>
+              </a:rPr>
+              <a:t>Creational</a:t>
+            </a:r>
+            <a:endParaRPr lang="en-US"/>
+          </a:p>
+          <a:p>
+            <a:pPr lvl="1"/>
+            <a:r>
+              <a:rPr lang="en-US">
+                <a:hlinkClick r:id="rId4"/>
+              </a:rPr>
+              <a:t>Structural</a:t>
+            </a:r>
+            <a:endParaRPr lang="en-US"/>
+          </a:p>
+          <a:p>
+            <a:pPr lvl="1"/>
+            <a:r>
+              <a:rPr lang="en-US">
+                <a:hlinkClick r:id="rId5"/>
+              </a:rPr>
+              <a:t>Behavioral</a:t>
+            </a:r>
+            <a:endParaRPr lang="en-US"/>
+          </a:p>
+          <a:p>
+            <a:r>
+              <a:rPr lang="en-US"/>
+              <a:t>Principles:</a:t>
+            </a:r>
+          </a:p>
+          <a:p>
+            <a:pPr lvl="1"/>
+            <a:r>
+              <a:rPr lang="en-US">
+                <a:hlinkClick r:id="rId6"/>
+              </a:rPr>
+              <a:t>Single Responsibility</a:t>
+            </a:r>
+            <a:endParaRPr lang="en-US"/>
+          </a:p>
+          <a:p>
+            <a:pPr lvl="1"/>
+            <a:r>
+              <a:rPr lang="en-US">
+                <a:hlinkClick r:id="rId7"/>
+              </a:rPr>
+              <a:t>Separation of Concerns</a:t>
+            </a:r>
+            <a:endParaRPr lang="en-US"/>
+          </a:p>
+          <a:p>
+            <a:pPr lvl="1"/>
+            <a:r>
+              <a:rPr lang="en-US">
+                <a:hlinkClick r:id="rId8"/>
+              </a:rPr>
+              <a:t>S.O.L.I.D Principles</a:t>
+            </a:r>
+            <a:endParaRPr lang="en-US"/>
+          </a:p>
+          <a:p>
+            <a:endParaRPr lang="en-US" dirty="0"/>
+          </a:p>
+        </p:txBody>
+      </p:sp>
+    </p:spTree>
+    <p:extLst>
+      <p:ext uri="{BB962C8B-B14F-4D97-AF65-F5344CB8AC3E}">
+        <p14:creationId xmlns:p14="http://schemas.microsoft.com/office/powerpoint/2010/main" val="1961233773"/>
+      </p:ext>
+    </p:extLst>
+  </p:cSld>
+  <p:clrMapOvr>
+    <a:masterClrMapping/>
+  </p:clrMapOvr>
+</p:sld>
+</file>
+
+<file path=ppt/slides/slide43.xml><?xml version="1.0" encoding="utf-8"?>
+<p:sld xmlns:a="http://schemas.openxmlformats.org/drawingml/2006/main" xmlns:r="http://schemas.openxmlformats.org/officeDocument/2006/relationships" xmlns:p="http://schemas.openxmlformats.org/presentationml/2006/main">
+  <p:cSld>
+    <p:spTree>
+      <p:nvGrpSpPr>
+        <p:cNvPr id="1" name=""/>
+        <p:cNvGrpSpPr/>
+        <p:nvPr/>
+      </p:nvGrpSpPr>
+      <p:grpSpPr>
+        <a:xfrm>
+          <a:off x="0" y="0"/>
+          <a:ext cx="0" cy="0"/>
+          <a:chOff x="0" y="0"/>
+          <a:chExt cx="0" cy="0"/>
+        </a:xfrm>
+      </p:grpSpPr>
+      <p:sp>
+        <p:nvSpPr>
+          <p:cNvPr id="2" name="Title 1">
+            <a:extLst>
+              <a:ext uri="{FF2B5EF4-FFF2-40B4-BE49-F238E27FC236}">
+                <a16:creationId xmlns:a16="http://schemas.microsoft.com/office/drawing/2014/main" id="{7D8AF8FB-793E-41BD-8CC5-A923B5A8209E}"/>
+              </a:ext>
+            </a:extLst>
+          </p:cNvPr>
+          <p:cNvSpPr>
+            <a:spLocks noGrp="1"/>
+          </p:cNvSpPr>
+          <p:nvPr>
+            <p:ph type="title"/>
+          </p:nvPr>
+        </p:nvSpPr>
+        <p:spPr/>
+        <p:txBody>
+          <a:bodyPr/>
+          <a:lstStyle/>
+          <a:p>
+            <a:r>
+              <a:rPr lang="en-US"/>
+              <a:t>Book References</a:t>
+            </a:r>
+            <a:endParaRPr lang="en-US" dirty="0"/>
+          </a:p>
+        </p:txBody>
+      </p:sp>
+      <p:sp>
+        <p:nvSpPr>
+          <p:cNvPr id="3" name="Content Placeholder 2">
+            <a:extLst>
+              <a:ext uri="{FF2B5EF4-FFF2-40B4-BE49-F238E27FC236}">
+                <a16:creationId xmlns:a16="http://schemas.microsoft.com/office/drawing/2014/main" id="{3975127B-114D-4B36-BA13-4EB6781A2CEB}"/>
+              </a:ext>
+            </a:extLst>
+          </p:cNvPr>
+          <p:cNvSpPr>
+            <a:spLocks noGrp="1"/>
+          </p:cNvSpPr>
+          <p:nvPr>
+            <p:ph idx="1"/>
+          </p:nvPr>
+        </p:nvSpPr>
+        <p:spPr/>
+        <p:txBody>
+          <a:bodyPr>
+            <a:normAutofit fontScale="92500" lnSpcReduction="10000"/>
+          </a:bodyPr>
+          <a:lstStyle/>
+          <a:p>
+            <a:r>
+              <a:rPr lang="en-US">
+                <a:hlinkClick r:id="rId2"/>
+              </a:rPr>
+              <a:t>Design Patterns : Elements of Reusable Object-Oriented Software</a:t>
+            </a:r>
+            <a:endParaRPr lang="en-US"/>
+          </a:p>
+          <a:p>
+            <a:pPr lvl="1"/>
+            <a:r>
+              <a:rPr lang="en-US"/>
+              <a:t>ISBN-13: 978-0201633610, ISBN-10: 0201633612</a:t>
+            </a:r>
+          </a:p>
+          <a:p>
+            <a:r>
+              <a:rPr lang="en-US">
+                <a:hlinkClick r:id="rId3"/>
+              </a:rPr>
+              <a:t>Head First Design Patterns</a:t>
+            </a:r>
+            <a:endParaRPr lang="en-US"/>
+          </a:p>
+          <a:p>
+            <a:pPr lvl="1"/>
+            <a:r>
+              <a:rPr lang="en-US"/>
+              <a:t>ISBN-13: 978-0596007126, ISBN-10: 0596007124</a:t>
+            </a:r>
+          </a:p>
+          <a:p>
+            <a:r>
+              <a:rPr lang="en-US">
+                <a:hlinkClick r:id="rId4"/>
+              </a:rPr>
+              <a:t>Clean Code</a:t>
+            </a:r>
+            <a:endParaRPr lang="en-US"/>
+          </a:p>
+          <a:p>
+            <a:pPr lvl="1"/>
+            <a:r>
+              <a:rPr lang="en-US"/>
+              <a:t>ISBN-13: 978-0132350884, ISBN-10: 0132350882</a:t>
+            </a:r>
+          </a:p>
+          <a:p>
+            <a:r>
+              <a:rPr lang="en-US">
+                <a:hlinkClick r:id="rId5"/>
+              </a:rPr>
+              <a:t>The Pragmatic Programmer</a:t>
+            </a:r>
+            <a:endParaRPr lang="en-US"/>
+          </a:p>
+          <a:p>
+            <a:pPr lvl="1"/>
+            <a:r>
+              <a:rPr lang="en-US"/>
+              <a:t>ISBN-13: 978-0201616224, ISBN-10: 020161622X</a:t>
+            </a:r>
+          </a:p>
+          <a:p>
+            <a:r>
+              <a:rPr lang="en-US">
+                <a:hlinkClick r:id="rId6"/>
+              </a:rPr>
+              <a:t>Patterns of Enterprise Application Architecture</a:t>
+            </a:r>
+            <a:endParaRPr lang="en-US"/>
+          </a:p>
+          <a:p>
+            <a:pPr lvl="1"/>
+            <a:r>
+              <a:rPr lang="en-US"/>
+              <a:t>ISBN-13: 978-0321127426, ISBN-10: 0321127420</a:t>
+            </a:r>
+          </a:p>
+          <a:p>
+            <a:endParaRPr lang="en-US" dirty="0"/>
+          </a:p>
+        </p:txBody>
+      </p:sp>
+    </p:spTree>
+    <p:extLst>
+      <p:ext uri="{BB962C8B-B14F-4D97-AF65-F5344CB8AC3E}">
+        <p14:creationId xmlns:p14="http://schemas.microsoft.com/office/powerpoint/2010/main" val="214986796"/>
+      </p:ext>
+    </p:extLst>
+  </p:cSld>
+  <p:clrMapOvr>
+    <a:masterClrMapping/>
+  </p:clrMapOvr>
+</p:sld>
+</file>
+
+<file path=ppt/slides/slide44.xml><?xml version="1.0" encoding="utf-8"?>
+<p:sld xmlns:a="http://schemas.openxmlformats.org/drawingml/2006/main" xmlns:r="http://schemas.openxmlformats.org/officeDocument/2006/relationships" xmlns:p="http://schemas.openxmlformats.org/presentationml/2006/main">
+  <p:cSld>
+    <p:spTree>
+      <p:nvGrpSpPr>
+        <p:cNvPr id="1" name=""/>
+        <p:cNvGrpSpPr/>
+        <p:nvPr/>
+      </p:nvGrpSpPr>
+      <p:grpSpPr>
+        <a:xfrm>
+          <a:off x="0" y="0"/>
+          <a:ext cx="0" cy="0"/>
+          <a:chOff x="0" y="0"/>
+          <a:chExt cx="0" cy="0"/>
+        </a:xfrm>
+      </p:grpSpPr>
+      <p:sp>
+        <p:nvSpPr>
+          <p:cNvPr id="2" name="Title 1">
+            <a:extLst>
+              <a:ext uri="{FF2B5EF4-FFF2-40B4-BE49-F238E27FC236}">
+                <a16:creationId xmlns:a16="http://schemas.microsoft.com/office/drawing/2014/main" id="{7D8AF8FB-793E-41BD-8CC5-A923B5A8209E}"/>
+              </a:ext>
+            </a:extLst>
+          </p:cNvPr>
+          <p:cNvSpPr>
+            <a:spLocks noGrp="1"/>
+          </p:cNvSpPr>
+          <p:nvPr>
+            <p:ph type="title"/>
+          </p:nvPr>
+        </p:nvSpPr>
+        <p:spPr/>
+        <p:txBody>
+          <a:bodyPr/>
+          <a:lstStyle/>
+          <a:p>
+            <a:r>
+              <a:rPr lang="en-US" dirty="0"/>
+              <a:t>Angular Resources</a:t>
+            </a:r>
+          </a:p>
+        </p:txBody>
+      </p:sp>
+      <p:sp>
+        <p:nvSpPr>
+          <p:cNvPr id="3" name="Content Placeholder 2">
+            <a:extLst>
+              <a:ext uri="{FF2B5EF4-FFF2-40B4-BE49-F238E27FC236}">
+                <a16:creationId xmlns:a16="http://schemas.microsoft.com/office/drawing/2014/main" id="{3975127B-114D-4B36-BA13-4EB6781A2CEB}"/>
+              </a:ext>
+            </a:extLst>
+          </p:cNvPr>
+          <p:cNvSpPr>
+            <a:spLocks noGrp="1"/>
+          </p:cNvSpPr>
+          <p:nvPr>
+            <p:ph idx="1"/>
+          </p:nvPr>
+        </p:nvSpPr>
+        <p:spPr/>
+        <p:txBody>
+          <a:bodyPr>
+            <a:normAutofit/>
+          </a:bodyPr>
+          <a:lstStyle/>
+          <a:p>
+            <a:r>
+              <a:rPr lang="en-US" dirty="0">
+                <a:hlinkClick r:id="rId2"/>
+              </a:rPr>
+              <a:t>https://angular.io</a:t>
+            </a:r>
+            <a:r>
+              <a:rPr lang="en-US" dirty="0"/>
+              <a:t>: </a:t>
+            </a:r>
+          </a:p>
+          <a:p>
+            <a:r>
+              <a:rPr lang="en-US" dirty="0">
+                <a:hlinkClick r:id="rId3"/>
+              </a:rPr>
+              <a:t>https://rangle.io</a:t>
+            </a:r>
+            <a:r>
+              <a:rPr lang="en-US" dirty="0"/>
+              <a:t>: </a:t>
+            </a:r>
+          </a:p>
+          <a:p>
+            <a:pPr lvl="1"/>
+            <a:r>
+              <a:rPr lang="en-US" dirty="0" err="1">
+                <a:hlinkClick r:id="rId4"/>
+              </a:rPr>
+              <a:t>Rangle’s</a:t>
+            </a:r>
+            <a:r>
+              <a:rPr lang="en-US" dirty="0">
+                <a:hlinkClick r:id="rId4"/>
+              </a:rPr>
+              <a:t> Angular 2 Training Book</a:t>
+            </a:r>
+            <a:endParaRPr lang="en-US" dirty="0"/>
+          </a:p>
+          <a:p>
+            <a:pPr lvl="1"/>
+            <a:r>
+              <a:rPr lang="en-US" dirty="0">
+                <a:hlinkClick r:id="rId5"/>
+              </a:rPr>
+              <a:t>Functional Forms</a:t>
+            </a:r>
+            <a:endParaRPr lang="en-US" dirty="0"/>
+          </a:p>
+          <a:p>
+            <a:r>
+              <a:rPr lang="en-US" dirty="0">
+                <a:hlinkClick r:id="rId6"/>
+              </a:rPr>
+              <a:t>Become a Ninja with Angular</a:t>
+            </a:r>
+            <a:r>
+              <a:rPr lang="en-US" dirty="0"/>
+              <a:t>: sample chapters</a:t>
+            </a:r>
+          </a:p>
+          <a:p>
+            <a:r>
+              <a:rPr lang="en-US" dirty="0">
+                <a:hlinkClick r:id="rId7"/>
+              </a:rPr>
+              <a:t>Tour of Heroes Application with Multiple Modules</a:t>
+            </a:r>
+            <a:endParaRPr lang="en-US" dirty="0"/>
+          </a:p>
+        </p:txBody>
+      </p:sp>
+    </p:spTree>
+    <p:extLst>
+      <p:ext uri="{BB962C8B-B14F-4D97-AF65-F5344CB8AC3E}">
+        <p14:creationId xmlns:p14="http://schemas.microsoft.com/office/powerpoint/2010/main" val="3233442765"/>
+      </p:ext>
+    </p:extLst>
+  </p:cSld>
+  <p:clrMapOvr>
+    <a:masterClrMapping/>
+  </p:clrMapOvr>
+</p:sld>
+</file>
+
+<file path=ppt/slides/slide45.xml><?xml version="1.0" encoding="utf-8"?>
 <p:sld xmlns:a="http://schemas.openxmlformats.org/drawingml/2006/main" xmlns:r="http://schemas.openxmlformats.org/officeDocument/2006/relationships" xmlns:p="http://schemas.openxmlformats.org/presentationml/2006/main">
   <p:cSld>
     <p:spTree>

</xml_diff>

<commit_message>
updated doc with images;
</commit_message>
<xml_diff>
--- a/Presentation/Better Business Logic with Typescript.pptx
+++ b/Presentation/Better Business Logic with Typescript.pptx
@@ -976,7 +976,7 @@
             <a:fld id="{B61BEF0D-F0BB-DE4B-95CE-6DB70DBA9567}" type="datetimeFigureOut">
               <a:rPr lang="en-US" dirty="0"/>
               <a:pPr/>
-              <a:t>6/23/2017</a:t>
+              <a:t>12/28/2017</a:t>
             </a:fld>
             <a:endParaRPr lang="en-US" dirty="0"/>
           </a:p>
@@ -1229,7 +1229,7 @@
             <a:fld id="{B61BEF0D-F0BB-DE4B-95CE-6DB70DBA9567}" type="datetimeFigureOut">
               <a:rPr lang="en-US" dirty="0"/>
               <a:pPr/>
-              <a:t>6/23/2017</a:t>
+              <a:t>12/28/2017</a:t>
             </a:fld>
             <a:endParaRPr lang="en-US" dirty="0"/>
           </a:p>
@@ -1545,7 +1545,7 @@
             <a:fld id="{B61BEF0D-F0BB-DE4B-95CE-6DB70DBA9567}" type="datetimeFigureOut">
               <a:rPr lang="en-US" dirty="0"/>
               <a:pPr/>
-              <a:t>6/23/2017</a:t>
+              <a:t>12/28/2017</a:t>
             </a:fld>
             <a:endParaRPr lang="en-US" dirty="0"/>
           </a:p>
@@ -1888,7 +1888,7 @@
             <a:fld id="{B61BEF0D-F0BB-DE4B-95CE-6DB70DBA9567}" type="datetimeFigureOut">
               <a:rPr lang="en-US" dirty="0"/>
               <a:pPr/>
-              <a:t>6/23/2017</a:t>
+              <a:t>12/28/2017</a:t>
             </a:fld>
             <a:endParaRPr lang="en-US" dirty="0"/>
           </a:p>
@@ -2204,7 +2204,7 @@
             <a:fld id="{B61BEF0D-F0BB-DE4B-95CE-6DB70DBA9567}" type="datetimeFigureOut">
               <a:rPr lang="en-US" dirty="0"/>
               <a:pPr/>
-              <a:t>6/23/2017</a:t>
+              <a:t>12/28/2017</a:t>
             </a:fld>
             <a:endParaRPr lang="en-US" dirty="0"/>
           </a:p>
@@ -2599,7 +2599,7 @@
             <a:fld id="{B61BEF0D-F0BB-DE4B-95CE-6DB70DBA9567}" type="datetimeFigureOut">
               <a:rPr lang="en-US" dirty="0"/>
               <a:pPr/>
-              <a:t>6/23/2017</a:t>
+              <a:t>12/28/2017</a:t>
             </a:fld>
             <a:endParaRPr lang="en-US" dirty="0"/>
           </a:p>
@@ -2770,7 +2770,7 @@
           <a:p>
             <a:fld id="{55C6B4A9-1611-4792-9094-5F34BCA07E0B}" type="datetimeFigureOut">
               <a:rPr lang="en-US" dirty="0"/>
-              <a:t>6/23/2017</a:t>
+              <a:t>12/28/2017</a:t>
             </a:fld>
             <a:endParaRPr lang="en-US" dirty="0"/>
           </a:p>
@@ -2951,7 +2951,7 @@
             <a:fld id="{B61BEF0D-F0BB-DE4B-95CE-6DB70DBA9567}" type="datetimeFigureOut">
               <a:rPr lang="en-US" dirty="0"/>
               <a:pPr/>
-              <a:t>6/23/2017</a:t>
+              <a:t>12/28/2017</a:t>
             </a:fld>
             <a:endParaRPr lang="en-US" dirty="0"/>
           </a:p>
@@ -3152,7 +3152,7 @@
           <a:p>
             <a:fld id="{48A87A34-81AB-432B-8DAE-1953F412C126}" type="datetimeFigureOut">
               <a:rPr lang="en-US" dirty="0"/>
-              <a:t>6/23/2017</a:t>
+              <a:t>12/28/2017</a:t>
             </a:fld>
             <a:endParaRPr lang="en-US" dirty="0"/>
           </a:p>
@@ -3363,7 +3363,7 @@
           <a:p>
             <a:fld id="{48A87A34-81AB-432B-8DAE-1953F412C126}" type="datetimeFigureOut">
               <a:rPr lang="en-US" dirty="0"/>
-              <a:t>6/23/2017</a:t>
+              <a:t>12/28/2017</a:t>
             </a:fld>
             <a:endParaRPr lang="en-US" dirty="0"/>
           </a:p>
@@ -3642,7 +3642,7 @@
           <a:p>
             <a:fld id="{48A87A34-81AB-432B-8DAE-1953F412C126}" type="datetimeFigureOut">
               <a:rPr lang="en-US" dirty="0"/>
-              <a:t>6/23/2017</a:t>
+              <a:t>12/28/2017</a:t>
             </a:fld>
             <a:endParaRPr lang="en-US" dirty="0"/>
           </a:p>
@@ -3850,7 +3850,7 @@
             <a:fld id="{B61BEF0D-F0BB-DE4B-95CE-6DB70DBA9567}" type="datetimeFigureOut">
               <a:rPr lang="en-US" dirty="0"/>
               <a:pPr/>
-              <a:t>6/23/2017</a:t>
+              <a:t>12/28/2017</a:t>
             </a:fld>
             <a:endParaRPr lang="en-US" dirty="0"/>
           </a:p>
@@ -4088,7 +4088,7 @@
           <a:p>
             <a:fld id="{48A87A34-81AB-432B-8DAE-1953F412C126}" type="datetimeFigureOut">
               <a:rPr lang="en-US" dirty="0"/>
-              <a:t>6/23/2017</a:t>
+              <a:t>12/28/2017</a:t>
             </a:fld>
             <a:endParaRPr lang="en-US" dirty="0"/>
           </a:p>
@@ -4504,7 +4504,7 @@
           <a:p>
             <a:fld id="{48A87A34-81AB-432B-8DAE-1953F412C126}" type="datetimeFigureOut">
               <a:rPr lang="en-US" dirty="0"/>
-              <a:t>6/23/2017</a:t>
+              <a:t>12/28/2017</a:t>
             </a:fld>
             <a:endParaRPr lang="en-US" dirty="0"/>
           </a:p>
@@ -4653,7 +4653,7 @@
           <a:p>
             <a:fld id="{48A87A34-81AB-432B-8DAE-1953F412C126}" type="datetimeFigureOut">
               <a:rPr lang="en-US" dirty="0"/>
-              <a:t>6/23/2017</a:t>
+              <a:t>12/28/2017</a:t>
             </a:fld>
             <a:endParaRPr lang="en-US" dirty="0"/>
           </a:p>
@@ -4779,7 +4779,7 @@
           <a:p>
             <a:fld id="{48A87A34-81AB-432B-8DAE-1953F412C126}" type="datetimeFigureOut">
               <a:rPr lang="en-US" dirty="0"/>
-              <a:t>6/23/2017</a:t>
+              <a:t>12/28/2017</a:t>
             </a:fld>
             <a:endParaRPr lang="en-US" dirty="0"/>
           </a:p>
@@ -5030,7 +5030,7 @@
           <a:p>
             <a:fld id="{48A87A34-81AB-432B-8DAE-1953F412C126}" type="datetimeFigureOut">
               <a:rPr lang="en-US" dirty="0"/>
-              <a:t>6/23/2017</a:t>
+              <a:t>12/28/2017</a:t>
             </a:fld>
             <a:endParaRPr lang="en-US" dirty="0"/>
           </a:p>
@@ -5476,7 +5476,7 @@
             <a:fld id="{48A87A34-81AB-432B-8DAE-1953F412C126}" type="datetimeFigureOut">
               <a:rPr lang="en-US" dirty="0"/>
               <a:pPr/>
-              <a:t>6/23/2017</a:t>
+              <a:t>12/28/2017</a:t>
             </a:fld>
             <a:endParaRPr lang="en-US" dirty="0"/>
           </a:p>
@@ -5682,7 +5682,7 @@
           <a:p>
             <a:fld id="{48A87A34-81AB-432B-8DAE-1953F412C126}" type="datetimeFigureOut">
               <a:rPr lang="en-US" dirty="0"/>
-              <a:t>6/23/2017</a:t>
+              <a:t>12/28/2017</a:t>
             </a:fld>
             <a:endParaRPr lang="en-US" dirty="0"/>
           </a:p>
@@ -5897,7 +5897,7 @@
           <a:p>
             <a:fld id="{48A87A34-81AB-432B-8DAE-1953F412C126}" type="datetimeFigureOut">
               <a:rPr lang="en-US" dirty="0"/>
-              <a:t>6/23/2017</a:t>
+              <a:t>12/28/2017</a:t>
             </a:fld>
             <a:endParaRPr lang="en-US" dirty="0"/>
           </a:p>
@@ -6175,7 +6175,7 @@
           <a:p>
             <a:fld id="{4AAD347D-5ACD-4C99-B74B-A9C85AD731AF}" type="datetimeFigureOut">
               <a:rPr lang="en-US" dirty="0"/>
-              <a:t>6/23/2017</a:t>
+              <a:t>12/28/2017</a:t>
             </a:fld>
             <a:endParaRPr lang="en-US" dirty="0"/>
           </a:p>
@@ -6345,7 +6345,7 @@
           <a:p>
             <a:fld id="{4509A250-FF31-4206-8172-F9D3106AACB1}" type="datetimeFigureOut">
               <a:rPr lang="en-US" dirty="0"/>
-              <a:t>6/23/2017</a:t>
+              <a:t>12/28/2017</a:t>
             </a:fld>
             <a:endParaRPr lang="en-US" dirty="0"/>
           </a:p>
@@ -6593,7 +6593,7 @@
             <a:fld id="{B61BEF0D-F0BB-DE4B-95CE-6DB70DBA9567}" type="datetimeFigureOut">
               <a:rPr lang="en-US" dirty="0"/>
               <a:pPr/>
-              <a:t>6/23/2017</a:t>
+              <a:t>12/28/2017</a:t>
             </a:fld>
             <a:endParaRPr lang="en-US" dirty="0"/>
           </a:p>
@@ -6841,7 +6841,7 @@
           <a:p>
             <a:fld id="{9796027F-7875-4030-9381-8BD8C4F21935}" type="datetimeFigureOut">
               <a:rPr lang="en-US" dirty="0"/>
-              <a:t>6/23/2017</a:t>
+              <a:t>12/28/2017</a:t>
             </a:fld>
             <a:endParaRPr lang="en-US" dirty="0"/>
           </a:p>
@@ -7133,7 +7133,7 @@
           <a:p>
             <a:fld id="{9796027F-7875-4030-9381-8BD8C4F21935}" type="datetimeFigureOut">
               <a:rPr lang="en-US" dirty="0"/>
-              <a:t>6/23/2017</a:t>
+              <a:t>12/28/2017</a:t>
             </a:fld>
             <a:endParaRPr lang="en-US" dirty="0"/>
           </a:p>
@@ -7577,7 +7577,7 @@
           <a:p>
             <a:fld id="{9796027F-7875-4030-9381-8BD8C4F21935}" type="datetimeFigureOut">
               <a:rPr lang="en-US" dirty="0"/>
-              <a:t>6/23/2017</a:t>
+              <a:t>12/28/2017</a:t>
             </a:fld>
             <a:endParaRPr lang="en-US" dirty="0"/>
           </a:p>
@@ -7695,7 +7695,7 @@
           <a:p>
             <a:fld id="{4509A250-FF31-4206-8172-F9D3106AACB1}" type="datetimeFigureOut">
               <a:rPr lang="en-US" dirty="0"/>
-              <a:t>6/23/2017</a:t>
+              <a:t>12/28/2017</a:t>
             </a:fld>
             <a:endParaRPr lang="en-US" dirty="0"/>
           </a:p>
@@ -7790,7 +7790,7 @@
           <a:p>
             <a:fld id="{4509A250-FF31-4206-8172-F9D3106AACB1}" type="datetimeFigureOut">
               <a:rPr lang="en-US" dirty="0"/>
-              <a:t>6/23/2017</a:t>
+              <a:t>12/28/2017</a:t>
             </a:fld>
             <a:endParaRPr lang="en-US" dirty="0"/>
           </a:p>
@@ -8069,7 +8069,7 @@
           <a:p>
             <a:fld id="{4509A250-FF31-4206-8172-F9D3106AACB1}" type="datetimeFigureOut">
               <a:rPr lang="en-US" dirty="0"/>
-              <a:t>6/23/2017</a:t>
+              <a:t>12/28/2017</a:t>
             </a:fld>
             <a:endParaRPr lang="en-US" dirty="0"/>
           </a:p>
@@ -8344,7 +8344,7 @@
           <a:p>
             <a:fld id="{4509A250-FF31-4206-8172-F9D3106AACB1}" type="datetimeFigureOut">
               <a:rPr lang="en-US" dirty="0"/>
-              <a:t>6/23/2017</a:t>
+              <a:t>12/28/2017</a:t>
             </a:fld>
             <a:endParaRPr lang="en-US" dirty="0"/>
           </a:p>
@@ -8619,7 +8619,7 @@
           <a:p>
             <a:fld id="{4509A250-FF31-4206-8172-F9D3106AACB1}" type="datetimeFigureOut">
               <a:rPr lang="en-US" dirty="0"/>
-              <a:t>6/23/2017</a:t>
+              <a:t>12/28/2017</a:t>
             </a:fld>
             <a:endParaRPr lang="en-US" dirty="0"/>
           </a:p>
@@ -8813,7 +8813,7 @@
           <a:p>
             <a:fld id="{4509A250-FF31-4206-8172-F9D3106AACB1}" type="datetimeFigureOut">
               <a:rPr lang="en-US" dirty="0"/>
-              <a:t>6/23/2017</a:t>
+              <a:t>12/28/2017</a:t>
             </a:fld>
             <a:endParaRPr lang="en-US" dirty="0"/>
           </a:p>
@@ -9086,7 +9086,7 @@
           <a:p>
             <a:fld id="{4509A250-FF31-4206-8172-F9D3106AACB1}" type="datetimeFigureOut">
               <a:rPr lang="en-US" dirty="0"/>
-              <a:t>6/23/2017</a:t>
+              <a:t>12/28/2017</a:t>
             </a:fld>
             <a:endParaRPr lang="en-US" dirty="0"/>
           </a:p>
@@ -9412,7 +9412,7 @@
           <a:p>
             <a:fld id="{EB712588-04B1-427B-82EE-E8DB90309F08}" type="datetimeFigureOut">
               <a:rPr lang="en-US" dirty="0"/>
-              <a:t>6/23/2017</a:t>
+              <a:t>12/28/2017</a:t>
             </a:fld>
             <a:endParaRPr lang="en-US" dirty="0"/>
           </a:p>
@@ -9659,7 +9659,7 @@
           <a:p>
             <a:fld id="{4509A250-FF31-4206-8172-F9D3106AACB1}" type="datetimeFigureOut">
               <a:rPr lang="en-US" dirty="0"/>
-              <a:t>6/23/2017</a:t>
+              <a:t>12/28/2017</a:t>
             </a:fld>
             <a:endParaRPr lang="en-US" dirty="0"/>
           </a:p>
@@ -10282,7 +10282,7 @@
           <a:p>
             <a:fld id="{4509A250-FF31-4206-8172-F9D3106AACB1}" type="datetimeFigureOut">
               <a:rPr lang="en-US" dirty="0"/>
-              <a:t>6/23/2017</a:t>
+              <a:t>12/28/2017</a:t>
             </a:fld>
             <a:endParaRPr lang="en-US" dirty="0"/>
           </a:p>
@@ -11142,7 +11142,7 @@
           <a:p>
             <a:fld id="{4509A250-FF31-4206-8172-F9D3106AACB1}" type="datetimeFigureOut">
               <a:rPr lang="en-US" dirty="0"/>
-              <a:t>6/23/2017</a:t>
+              <a:t>12/28/2017</a:t>
             </a:fld>
             <a:endParaRPr lang="en-US" dirty="0"/>
           </a:p>
@@ -11312,7 +11312,7 @@
           <a:p>
             <a:fld id="{4509A250-FF31-4206-8172-F9D3106AACB1}" type="datetimeFigureOut">
               <a:rPr lang="en-US" dirty="0"/>
-              <a:t>6/23/2017</a:t>
+              <a:t>12/28/2017</a:t>
             </a:fld>
             <a:endParaRPr lang="en-US" dirty="0"/>
           </a:p>
@@ -11492,7 +11492,7 @@
           <a:p>
             <a:fld id="{4509A250-FF31-4206-8172-F9D3106AACB1}" type="datetimeFigureOut">
               <a:rPr lang="en-US" dirty="0"/>
-              <a:t>6/23/2017</a:t>
+              <a:t>12/28/2017</a:t>
             </a:fld>
             <a:endParaRPr lang="en-US" dirty="0"/>
           </a:p>
@@ -11649,7 +11649,7 @@
           <a:p>
             <a:fld id="{90786BE5-D2A3-4BF0-8B30-D7403E61B3DC}" type="datetimeFigureOut">
               <a:rPr lang="en-US" smtClean="0"/>
-              <a:t>6/23/2017</a:t>
+              <a:t>12/28/2017</a:t>
             </a:fld>
             <a:endParaRPr lang="en-US" dirty="0"/>
           </a:p>
@@ -11936,7 +11936,7 @@
           <a:p>
             <a:fld id="{4AAD347D-5ACD-4C99-B74B-A9C85AD731AF}" type="datetimeFigureOut">
               <a:rPr lang="en-US" dirty="0"/>
-              <a:t>6/23/2017</a:t>
+              <a:t>12/28/2017</a:t>
             </a:fld>
             <a:endParaRPr lang="en-US" dirty="0"/>
           </a:p>
@@ -12106,7 +12106,7 @@
           <a:p>
             <a:fld id="{4509A250-FF31-4206-8172-F9D3106AACB1}" type="datetimeFigureOut">
               <a:rPr lang="en-US" dirty="0"/>
-              <a:t>6/23/2017</a:t>
+              <a:t>12/28/2017</a:t>
             </a:fld>
             <a:endParaRPr lang="en-US" dirty="0"/>
           </a:p>
@@ -12353,7 +12353,7 @@
           <a:p>
             <a:fld id="{9796027F-7875-4030-9381-8BD8C4F21935}" type="datetimeFigureOut">
               <a:rPr lang="en-US" dirty="0"/>
-              <a:t>6/23/2017</a:t>
+              <a:t>12/28/2017</a:t>
             </a:fld>
             <a:endParaRPr lang="en-US" dirty="0"/>
           </a:p>
@@ -12645,7 +12645,7 @@
           <a:p>
             <a:fld id="{9796027F-7875-4030-9381-8BD8C4F21935}" type="datetimeFigureOut">
               <a:rPr lang="en-US" dirty="0"/>
-              <a:t>6/23/2017</a:t>
+              <a:t>12/28/2017</a:t>
             </a:fld>
             <a:endParaRPr lang="en-US" dirty="0"/>
           </a:p>
@@ -13020,7 +13020,7 @@
             <a:fld id="{B61BEF0D-F0BB-DE4B-95CE-6DB70DBA9567}" type="datetimeFigureOut">
               <a:rPr lang="en-US" dirty="0"/>
               <a:pPr/>
-              <a:t>6/23/2017</a:t>
+              <a:t>12/28/2017</a:t>
             </a:fld>
             <a:endParaRPr lang="en-US" dirty="0"/>
           </a:p>
@@ -13465,7 +13465,7 @@
           <a:p>
             <a:fld id="{9796027F-7875-4030-9381-8BD8C4F21935}" type="datetimeFigureOut">
               <a:rPr lang="en-US" dirty="0"/>
-              <a:t>6/23/2017</a:t>
+              <a:t>12/28/2017</a:t>
             </a:fld>
             <a:endParaRPr lang="en-US" dirty="0"/>
           </a:p>
@@ -13583,7 +13583,7 @@
           <a:p>
             <a:fld id="{4509A250-FF31-4206-8172-F9D3106AACB1}" type="datetimeFigureOut">
               <a:rPr lang="en-US" dirty="0"/>
-              <a:t>6/23/2017</a:t>
+              <a:t>12/28/2017</a:t>
             </a:fld>
             <a:endParaRPr lang="en-US" dirty="0"/>
           </a:p>
@@ -13678,7 +13678,7 @@
           <a:p>
             <a:fld id="{4509A250-FF31-4206-8172-F9D3106AACB1}" type="datetimeFigureOut">
               <a:rPr lang="en-US" dirty="0"/>
-              <a:t>6/23/2017</a:t>
+              <a:t>12/28/2017</a:t>
             </a:fld>
             <a:endParaRPr lang="en-US" dirty="0"/>
           </a:p>
@@ -13957,7 +13957,7 @@
           <a:p>
             <a:fld id="{4509A250-FF31-4206-8172-F9D3106AACB1}" type="datetimeFigureOut">
               <a:rPr lang="en-US" dirty="0"/>
-              <a:t>6/23/2017</a:t>
+              <a:t>12/28/2017</a:t>
             </a:fld>
             <a:endParaRPr lang="en-US" dirty="0"/>
           </a:p>
@@ -14232,7 +14232,7 @@
           <a:p>
             <a:fld id="{4509A250-FF31-4206-8172-F9D3106AACB1}" type="datetimeFigureOut">
               <a:rPr lang="en-US" dirty="0"/>
-              <a:t>6/23/2017</a:t>
+              <a:t>12/28/2017</a:t>
             </a:fld>
             <a:endParaRPr lang="en-US" dirty="0"/>
           </a:p>
@@ -14507,7 +14507,7 @@
           <a:p>
             <a:fld id="{4509A250-FF31-4206-8172-F9D3106AACB1}" type="datetimeFigureOut">
               <a:rPr lang="en-US" dirty="0"/>
-              <a:t>6/23/2017</a:t>
+              <a:t>12/28/2017</a:t>
             </a:fld>
             <a:endParaRPr lang="en-US" dirty="0"/>
           </a:p>
@@ -14701,7 +14701,7 @@
           <a:p>
             <a:fld id="{4509A250-FF31-4206-8172-F9D3106AACB1}" type="datetimeFigureOut">
               <a:rPr lang="en-US" dirty="0"/>
-              <a:t>6/23/2017</a:t>
+              <a:t>12/28/2017</a:t>
             </a:fld>
             <a:endParaRPr lang="en-US" dirty="0"/>
           </a:p>
@@ -14974,7 +14974,7 @@
           <a:p>
             <a:fld id="{4509A250-FF31-4206-8172-F9D3106AACB1}" type="datetimeFigureOut">
               <a:rPr lang="en-US" dirty="0"/>
-              <a:t>6/23/2017</a:t>
+              <a:t>12/28/2017</a:t>
             </a:fld>
             <a:endParaRPr lang="en-US" dirty="0"/>
           </a:p>
@@ -15315,7 +15315,7 @@
           <a:p>
             <a:fld id="{4509A250-FF31-4206-8172-F9D3106AACB1}" type="datetimeFigureOut">
               <a:rPr lang="en-US" dirty="0"/>
-              <a:t>6/23/2017</a:t>
+              <a:t>12/28/2017</a:t>
             </a:fld>
             <a:endParaRPr lang="en-US" dirty="0"/>
           </a:p>
@@ -15938,7 +15938,7 @@
           <a:p>
             <a:fld id="{4509A250-FF31-4206-8172-F9D3106AACB1}" type="datetimeFigureOut">
               <a:rPr lang="en-US" dirty="0"/>
-              <a:t>6/23/2017</a:t>
+              <a:t>12/28/2017</a:t>
             </a:fld>
             <a:endParaRPr lang="en-US" dirty="0"/>
           </a:p>
@@ -16062,7 +16062,7 @@
             <a:fld id="{B61BEF0D-F0BB-DE4B-95CE-6DB70DBA9567}" type="datetimeFigureOut">
               <a:rPr lang="en-US" dirty="0"/>
               <a:pPr/>
-              <a:t>6/23/2017</a:t>
+              <a:t>12/28/2017</a:t>
             </a:fld>
             <a:endParaRPr lang="en-US" dirty="0"/>
           </a:p>
@@ -16923,7 +16923,7 @@
           <a:p>
             <a:fld id="{4509A250-FF31-4206-8172-F9D3106AACB1}" type="datetimeFigureOut">
               <a:rPr lang="en-US" dirty="0"/>
-              <a:t>6/23/2017</a:t>
+              <a:t>12/28/2017</a:t>
             </a:fld>
             <a:endParaRPr lang="en-US" dirty="0"/>
           </a:p>
@@ -17093,7 +17093,7 @@
           <a:p>
             <a:fld id="{4509A250-FF31-4206-8172-F9D3106AACB1}" type="datetimeFigureOut">
               <a:rPr lang="en-US" dirty="0"/>
-              <a:t>6/23/2017</a:t>
+              <a:t>12/28/2017</a:t>
             </a:fld>
             <a:endParaRPr lang="en-US" dirty="0"/>
           </a:p>
@@ -17273,7 +17273,7 @@
           <a:p>
             <a:fld id="{4509A250-FF31-4206-8172-F9D3106AACB1}" type="datetimeFigureOut">
               <a:rPr lang="en-US" dirty="0"/>
-              <a:t>6/23/2017</a:t>
+              <a:t>12/28/2017</a:t>
             </a:fld>
             <a:endParaRPr lang="en-US" dirty="0"/>
           </a:p>
@@ -17429,7 +17429,7 @@
           <a:effectLst/>
           <a:extLst>
             <a:ext uri="{91240B29-F687-4f45-9708-019B960494DF}">
-              <a14:hiddenLine xmlns:a14="http://schemas.microsoft.com/office/drawing/2010/main" xmlns="" w="9525">
+              <a14:hiddenLine xmlns="" xmlns:a14="http://schemas.microsoft.com/office/drawing/2010/main" w="9525">
                 <a:solidFill>
                   <a:srgbClr val="000000"/>
                 </a:solidFill>
@@ -17622,7 +17622,7 @@
             <a:fld id="{B61BEF0D-F0BB-DE4B-95CE-6DB70DBA9567}" type="datetimeFigureOut">
               <a:rPr lang="en-US" smtClean="0"/>
               <a:pPr/>
-              <a:t>6/23/2017</a:t>
+              <a:t>12/28/2017</a:t>
             </a:fld>
             <a:endParaRPr lang="en-US" dirty="0"/>
           </a:p>
@@ -17778,7 +17778,7 @@
           <a:ln/>
           <a:extLst>
             <a:ext uri="{91240B29-F687-4f45-9708-019B960494DF}">
-              <a14:hiddenLine xmlns:a14="http://schemas.microsoft.com/office/drawing/2010/main" xmlns="" w="9525">
+              <a14:hiddenLine xmlns="" xmlns:a14="http://schemas.microsoft.com/office/drawing/2010/main" w="9525">
                 <a:solidFill>
                   <a:srgbClr val="000000"/>
                 </a:solidFill>
@@ -17907,7 +17907,7 @@
             <a:fld id="{B61BEF0D-F0BB-DE4B-95CE-6DB70DBA9567}" type="datetimeFigureOut">
               <a:rPr lang="en-US" smtClean="0"/>
               <a:pPr/>
-              <a:t>6/23/2017</a:t>
+              <a:t>12/28/2017</a:t>
             </a:fld>
             <a:endParaRPr lang="en-US" dirty="0"/>
           </a:p>
@@ -18252,7 +18252,7 @@
             <a:fld id="{B61BEF0D-F0BB-DE4B-95CE-6DB70DBA9567}" type="datetimeFigureOut">
               <a:rPr lang="en-US" smtClean="0"/>
               <a:pPr/>
-              <a:t>6/23/2017</a:t>
+              <a:t>12/28/2017</a:t>
             </a:fld>
             <a:endParaRPr lang="en-US" dirty="0"/>
           </a:p>
@@ -18408,7 +18408,7 @@
           <a:ln/>
           <a:extLst>
             <a:ext uri="{91240B29-F687-4f45-9708-019B960494DF}">
-              <a14:hiddenLine xmlns:a14="http://schemas.microsoft.com/office/drawing/2010/main" xmlns="" w="9525">
+              <a14:hiddenLine xmlns="" xmlns:a14="http://schemas.microsoft.com/office/drawing/2010/main" w="9525">
                 <a:solidFill>
                   <a:srgbClr val="000000"/>
                 </a:solidFill>
@@ -18592,7 +18592,7 @@
           <a:p>
             <a:fld id="{EB712588-04B1-427B-82EE-E8DB90309F08}" type="datetimeFigureOut">
               <a:rPr lang="en-US" smtClean="0"/>
-              <a:t>6/23/2017</a:t>
+              <a:t>12/28/2017</a:t>
             </a:fld>
             <a:endParaRPr lang="en-US" dirty="0"/>
           </a:p>
@@ -18747,7 +18747,7 @@
           <a:ln/>
           <a:extLst>
             <a:ext uri="{91240B29-F687-4f45-9708-019B960494DF}">
-              <a14:hiddenLine xmlns:a14="http://schemas.microsoft.com/office/drawing/2010/main" xmlns="" w="9525">
+              <a14:hiddenLine xmlns="" xmlns:a14="http://schemas.microsoft.com/office/drawing/2010/main" w="9525">
                 <a:solidFill>
                   <a:srgbClr val="000000"/>
                 </a:solidFill>
@@ -19070,7 +19070,7 @@
             <a:fld id="{B61BEF0D-F0BB-DE4B-95CE-6DB70DBA9567}" type="datetimeFigureOut">
               <a:rPr lang="en-US" smtClean="0"/>
               <a:pPr/>
-              <a:t>6/23/2017</a:t>
+              <a:t>12/28/2017</a:t>
             </a:fld>
             <a:endParaRPr lang="en-US" dirty="0"/>
           </a:p>
@@ -19226,7 +19226,7 @@
           <a:ln/>
           <a:extLst>
             <a:ext uri="{91240B29-F687-4f45-9708-019B960494DF}">
-              <a14:hiddenLine xmlns:a14="http://schemas.microsoft.com/office/drawing/2010/main" xmlns="" w="9525">
+              <a14:hiddenLine xmlns="" xmlns:a14="http://schemas.microsoft.com/office/drawing/2010/main" w="9525">
                 <a:solidFill>
                   <a:srgbClr val="000000"/>
                 </a:solidFill>
@@ -19293,7 +19293,7 @@
             <a:fld id="{B61BEF0D-F0BB-DE4B-95CE-6DB70DBA9567}" type="datetimeFigureOut">
               <a:rPr lang="en-US" smtClean="0"/>
               <a:pPr/>
-              <a:t>6/23/2017</a:t>
+              <a:t>12/28/2017</a:t>
             </a:fld>
             <a:endParaRPr lang="en-US" dirty="0"/>
           </a:p>
@@ -19390,7 +19390,7 @@
             <a:fld id="{B61BEF0D-F0BB-DE4B-95CE-6DB70DBA9567}" type="datetimeFigureOut">
               <a:rPr lang="en-US" smtClean="0"/>
               <a:pPr/>
-              <a:t>6/23/2017</a:t>
+              <a:t>12/28/2017</a:t>
             </a:fld>
             <a:endParaRPr lang="en-US" dirty="0"/>
           </a:p>
@@ -19487,7 +19487,7 @@
             <a:fld id="{B61BEF0D-F0BB-DE4B-95CE-6DB70DBA9567}" type="datetimeFigureOut">
               <a:rPr lang="en-US" dirty="0"/>
               <a:pPr/>
-              <a:t>6/23/2017</a:t>
+              <a:t>12/28/2017</a:t>
             </a:fld>
             <a:endParaRPr lang="en-US" dirty="0"/>
           </a:p>
@@ -19756,7 +19756,7 @@
           <a:ln/>
           <a:extLst>
             <a:ext uri="{91240B29-F687-4f45-9708-019B960494DF}">
-              <a14:hiddenLine xmlns:a14="http://schemas.microsoft.com/office/drawing/2010/main" xmlns="" w="9525">
+              <a14:hiddenLine xmlns="" xmlns:a14="http://schemas.microsoft.com/office/drawing/2010/main" w="9525">
                 <a:solidFill>
                   <a:srgbClr val="000000"/>
                 </a:solidFill>
@@ -19955,7 +19955,7 @@
           <a:p>
             <a:fld id="{42A54C80-263E-416B-A8E0-580EDEADCBDC}" type="datetimeFigureOut">
               <a:rPr lang="en-US" smtClean="0"/>
-              <a:t>6/23/2017</a:t>
+              <a:t>12/28/2017</a:t>
             </a:fld>
             <a:endParaRPr lang="en-US" dirty="0"/>
           </a:p>
@@ -20269,7 +20269,7 @@
             <a:fld id="{B61BEF0D-F0BB-DE4B-95CE-6DB70DBA9567}" type="datetimeFigureOut">
               <a:rPr lang="en-US" smtClean="0"/>
               <a:pPr/>
-              <a:t>6/23/2017</a:t>
+              <a:t>12/28/2017</a:t>
             </a:fld>
             <a:endParaRPr lang="en-US" dirty="0"/>
           </a:p>
@@ -20599,7 +20599,7 @@
             <a:fld id="{B61BEF0D-F0BB-DE4B-95CE-6DB70DBA9567}" type="datetimeFigureOut">
               <a:rPr lang="en-US" smtClean="0"/>
               <a:pPr/>
-              <a:t>6/23/2017</a:t>
+              <a:t>12/28/2017</a:t>
             </a:fld>
             <a:endParaRPr lang="en-US" dirty="0"/>
           </a:p>
@@ -21089,7 +21089,7 @@
             <a:fld id="{B61BEF0D-F0BB-DE4B-95CE-6DB70DBA9567}" type="datetimeFigureOut">
               <a:rPr lang="en-US" smtClean="0"/>
               <a:pPr/>
-              <a:t>6/23/2017</a:t>
+              <a:t>12/28/2017</a:t>
             </a:fld>
             <a:endParaRPr lang="en-US" dirty="0"/>
           </a:p>
@@ -21460,7 +21460,7 @@
             <a:fld id="{B61BEF0D-F0BB-DE4B-95CE-6DB70DBA9567}" type="datetimeFigureOut">
               <a:rPr lang="en-US" smtClean="0"/>
               <a:pPr/>
-              <a:t>6/23/2017</a:t>
+              <a:t>12/28/2017</a:t>
             </a:fld>
             <a:endParaRPr lang="en-US" dirty="0"/>
           </a:p>
@@ -21616,7 +21616,7 @@
           <a:ln/>
           <a:extLst>
             <a:ext uri="{91240B29-F687-4f45-9708-019B960494DF}">
-              <a14:hiddenLine xmlns:a14="http://schemas.microsoft.com/office/drawing/2010/main" xmlns="" w="9525">
+              <a14:hiddenLine xmlns="" xmlns:a14="http://schemas.microsoft.com/office/drawing/2010/main" w="9525">
                 <a:solidFill>
                   <a:srgbClr val="000000"/>
                 </a:solidFill>
@@ -21734,7 +21734,7 @@
           <a:p>
             <a:fld id="{55C6B4A9-1611-4792-9094-5F34BCA07E0B}" type="datetimeFigureOut">
               <a:rPr lang="en-US" smtClean="0"/>
-              <a:t>6/23/2017</a:t>
+              <a:t>12/28/2017</a:t>
             </a:fld>
             <a:endParaRPr lang="en-US" dirty="0"/>
           </a:p>
@@ -21891,7 +21891,7 @@
           <a:ln/>
           <a:extLst>
             <a:ext uri="{91240B29-F687-4f45-9708-019B960494DF}">
-              <a14:hiddenLine xmlns:a14="http://schemas.microsoft.com/office/drawing/2010/main" xmlns="" w="9525">
+              <a14:hiddenLine xmlns="" xmlns:a14="http://schemas.microsoft.com/office/drawing/2010/main" w="9525">
                 <a:solidFill>
                   <a:srgbClr val="000000"/>
                 </a:solidFill>
@@ -22020,7 +22020,7 @@
             <a:fld id="{B61BEF0D-F0BB-DE4B-95CE-6DB70DBA9567}" type="datetimeFigureOut">
               <a:rPr lang="en-US" smtClean="0"/>
               <a:pPr/>
-              <a:t>6/23/2017</a:t>
+              <a:t>12/28/2017</a:t>
             </a:fld>
             <a:endParaRPr lang="en-US" dirty="0"/>
           </a:p>
@@ -22276,7 +22276,7 @@
           <a:p>
             <a:fld id="{42A54C80-263E-416B-A8E0-580EDEADCBDC}" type="datetimeFigureOut">
               <a:rPr lang="en-US" dirty="0"/>
-              <a:t>6/23/2017</a:t>
+              <a:t>12/28/2017</a:t>
             </a:fld>
             <a:endParaRPr lang="en-US" dirty="0"/>
           </a:p>
@@ -22540,7 +22540,7 @@
             <a:fld id="{B61BEF0D-F0BB-DE4B-95CE-6DB70DBA9567}" type="datetimeFigureOut">
               <a:rPr lang="en-US" dirty="0"/>
               <a:pPr/>
-              <a:t>6/23/2017</a:t>
+              <a:t>12/28/2017</a:t>
             </a:fld>
             <a:endParaRPr lang="en-US" dirty="0"/>
           </a:p>
@@ -23285,7 +23285,7 @@
             <a:fld id="{B61BEF0D-F0BB-DE4B-95CE-6DB70DBA9567}" type="datetimeFigureOut">
               <a:rPr lang="en-US" dirty="0"/>
               <a:pPr/>
-              <a:t>6/23/2017</a:t>
+              <a:t>12/28/2017</a:t>
             </a:fld>
             <a:endParaRPr lang="en-US" dirty="0"/>
           </a:p>
@@ -24023,7 +24023,7 @@
             <a:fld id="{48A87A34-81AB-432B-8DAE-1953F412C126}" type="datetimeFigureOut">
               <a:rPr lang="en-US" dirty="0"/>
               <a:pPr/>
-              <a:t>6/23/2017</a:t>
+              <a:t>12/28/2017</a:t>
             </a:fld>
             <a:endParaRPr lang="en-US" dirty="0"/>
           </a:p>
@@ -24861,7 +24861,7 @@
           <a:p>
             <a:fld id="{4AAD347D-5ACD-4C99-B74B-A9C85AD731AF}" type="datetimeFigureOut">
               <a:rPr lang="en-US" dirty="0"/>
-              <a:t>6/23/2017</a:t>
+              <a:t>12/28/2017</a:t>
             </a:fld>
             <a:endParaRPr lang="en-US" dirty="0"/>
           </a:p>
@@ -25742,7 +25742,7 @@
           <a:p>
             <a:fld id="{4AAD347D-5ACD-4C99-B74B-A9C85AD731AF}" type="datetimeFigureOut">
               <a:rPr lang="en-US" dirty="0"/>
-              <a:t>6/23/2017</a:t>
+              <a:t>12/28/2017</a:t>
             </a:fld>
             <a:endParaRPr lang="en-US" dirty="0"/>
           </a:p>
@@ -26454,7 +26454,7 @@
             <a:fld id="{B61BEF0D-F0BB-DE4B-95CE-6DB70DBA9567}" type="datetimeFigureOut">
               <a:rPr lang="en-US" smtClean="0"/>
               <a:pPr/>
-              <a:t>6/23/2017</a:t>
+              <a:t>12/28/2017</a:t>
             </a:fld>
             <a:endParaRPr lang="en-US" dirty="0"/>
           </a:p>
@@ -27567,6 +27567,18 @@
             </a:r>
           </a:p>
           <a:p>
+            <a:r>
+              <a:rPr lang="en-US" dirty="0"/>
+              <a:t>Are there different kinds of modules?</a:t>
+            </a:r>
+          </a:p>
+          <a:p>
+            <a:r>
+              <a:rPr lang="en-US" dirty="0"/>
+              <a:t>What kind of modules does my application need? </a:t>
+            </a:r>
+          </a:p>
+          <a:p>
             <a:pPr lvl="1"/>
             <a:endParaRPr lang="en-US" dirty="0"/>
           </a:p>
@@ -27654,7 +27666,7 @@
         </p:spPr>
         <p:txBody>
           <a:bodyPr>
-            <a:normAutofit fontScale="77500" lnSpcReduction="20000"/>
+            <a:normAutofit fontScale="70000" lnSpcReduction="20000"/>
           </a:bodyPr>
           <a:lstStyle/>
           <a:p>
@@ -27808,6 +27820,39 @@
               <a:latin typeface="Source Code Pro Light" panose="020B0409030403020204" pitchFamily="49" charset="0"/>
               <a:ea typeface="Source Code Pro Light" panose="020B0409030403020204" pitchFamily="49" charset="0"/>
             </a:endParaRPr>
+          </a:p>
+          <a:p>
+            <a:r>
+              <a:rPr lang="en-US" b="1" dirty="0"/>
+              <a:t>Infrastructure:</a:t>
+            </a:r>
+            <a:r>
+              <a:rPr lang="en-US" dirty="0"/>
+              <a:t> Base/Foundation</a:t>
+            </a:r>
+          </a:p>
+          <a:p>
+            <a:pPr lvl="1"/>
+            <a:r>
+              <a:rPr lang="en-US" dirty="0"/>
+              <a:t>Base and Framework (</a:t>
+            </a:r>
+            <a:r>
+              <a:rPr lang="en-US" dirty="0" err="1"/>
+              <a:t>i</a:t>
+            </a:r>
+            <a:r>
+              <a:rPr lang="en-US" dirty="0"/>
+              <a:t>..e, </a:t>
+            </a:r>
+            <a:r>
+              <a:rPr lang="en-US" dirty="0" err="1"/>
+              <a:t>buildmotion</a:t>
+            </a:r>
+            <a:r>
+              <a:rPr lang="en-US" dirty="0"/>
+              <a:t>-foundation, angular-actions, angular-rules-engine)</a:t>
+            </a:r>
           </a:p>
           <a:p>
             <a:r>
@@ -29587,6 +29632,12 @@
               <a:t>Handling error responses from the backend.</a:t>
             </a:r>
           </a:p>
+          <a:p>
+            <a:r>
+              <a:rPr lang="en-US" dirty="0"/>
+              <a:t>Notifications to Users</a:t>
+            </a:r>
+          </a:p>
         </p:txBody>
       </p:sp>
     </p:spTree>
@@ -29793,7 +29844,7 @@
         <p:spPr/>
         <p:txBody>
           <a:bodyPr>
-            <a:normAutofit lnSpcReduction="10000"/>
+            <a:normAutofit fontScale="77500" lnSpcReduction="20000"/>
           </a:bodyPr>
           <a:lstStyle/>
           <a:p>
@@ -29917,6 +29968,25 @@
             <a:r>
               <a:rPr lang="en-US" dirty="0"/>
               <a:t>.</a:t>
+            </a:r>
+          </a:p>
+          <a:p>
+            <a:r>
+              <a:rPr lang="en-US" dirty="0"/>
+              <a:t>Design Patterns</a:t>
+            </a:r>
+          </a:p>
+          <a:p>
+            <a:pPr lvl="1"/>
+            <a:r>
+              <a:rPr lang="en-US" dirty="0"/>
+              <a:t>Template Method (Lifecycle/Pipeline)</a:t>
+            </a:r>
+          </a:p>
+          <a:p>
+            <a:r>
+              <a:rPr lang="en-US" dirty="0"/>
+              <a:t>100% Testable</a:t>
             </a:r>
           </a:p>
           <a:p>
@@ -32690,22 +32760,21 @@
           <a:lstStyle/>
           <a:p>
             <a:r>
-              <a:rPr lang="en-US"/>
+              <a:rPr lang="en-US" dirty="0"/>
               <a:t>Heart of the application.</a:t>
             </a:r>
           </a:p>
           <a:p>
             <a:r>
-              <a:rPr lang="en-US"/>
+              <a:rPr lang="en-US" dirty="0"/>
               <a:t>Defines the business domain.</a:t>
             </a:r>
           </a:p>
           <a:p>
             <a:r>
-              <a:rPr lang="en-US"/>
+              <a:rPr lang="en-US" dirty="0"/>
               <a:t>Domain specific algorithms, intellectual property, etc.</a:t>
             </a:r>
-            <a:endParaRPr lang="en-US" dirty="0"/>
           </a:p>
         </p:txBody>
       </p:sp>
@@ -32792,37 +32861,37 @@
           <a:lstStyle/>
           <a:p>
             <a:r>
-              <a:rPr lang="en-US"/>
+              <a:rPr lang="en-US" dirty="0"/>
               <a:t>Inconsistent implementation causes problems with extensibility/maintainability.</a:t>
             </a:r>
           </a:p>
           <a:p>
             <a:r>
-              <a:rPr lang="en-US"/>
+              <a:rPr lang="en-US" dirty="0"/>
               <a:t>Architecture, design, or implementation makes it difficult to test.</a:t>
             </a:r>
           </a:p>
           <a:p>
             <a:r>
-              <a:rPr lang="en-US"/>
+              <a:rPr lang="en-US" dirty="0"/>
               <a:t>Different implementation styles by different developers create inconsistent code base.</a:t>
             </a:r>
           </a:p>
           <a:p>
             <a:r>
-              <a:rPr lang="en-US"/>
+              <a:rPr lang="en-US" dirty="0"/>
               <a:t>Single Responsibility Principle not followed - parts of code do too much.</a:t>
             </a:r>
           </a:p>
           <a:p>
             <a:r>
-              <a:rPr lang="en-US"/>
+              <a:rPr lang="en-US" dirty="0"/>
               <a:t>Separation of Concerns Principle not followed - parts of the code cross boundaries. BL contained in different layers of the application (UI, services, BL layer, database).</a:t>
             </a:r>
           </a:p>
           <a:p>
             <a:r>
-              <a:rPr lang="en-US"/>
+              <a:rPr lang="en-US" dirty="0"/>
               <a:t>Lack of structure or use of defined patterns.</a:t>
             </a:r>
           </a:p>

</xml_diff>